<commit_message>
Changed the data manager to thread to avoid hang the main UI.
</commit_message>
<xml_diff>
--- a/doc/DesignDoc.pptx
+++ b/doc/DesignDoc.pptx
@@ -4,6 +4,9 @@
   <p:sldMasterIdLst>
     <p:sldMasterId id="2147483648" r:id="rId1"/>
   </p:sldMasterIdLst>
+  <p:notesMasterIdLst>
+    <p:notesMasterId r:id="rId6"/>
+  </p:notesMasterIdLst>
   <p:sldIdLst>
     <p:sldId id="256" r:id="rId2"/>
     <p:sldId id="257" r:id="rId3"/>
@@ -115,6 +118,440 @@
 </p:presentation>
 </file>
 
+<file path=ppt/notesMasters/notesMaster1.xml><?xml version="1.0" encoding="utf-8"?>
+<p:notesMaster xmlns:a="http://schemas.openxmlformats.org/drawingml/2006/main" xmlns:r="http://schemas.openxmlformats.org/officeDocument/2006/relationships" xmlns:p="http://schemas.openxmlformats.org/presentationml/2006/main">
+  <p:cSld>
+    <p:bg>
+      <p:bgRef idx="1001">
+        <a:schemeClr val="bg1"/>
+      </p:bgRef>
+    </p:bg>
+    <p:spTree>
+      <p:nvGrpSpPr>
+        <p:cNvPr id="1" name=""/>
+        <p:cNvGrpSpPr/>
+        <p:nvPr/>
+      </p:nvGrpSpPr>
+      <p:grpSpPr>
+        <a:xfrm>
+          <a:off x="0" y="0"/>
+          <a:ext cx="0" cy="0"/>
+          <a:chOff x="0" y="0"/>
+          <a:chExt cx="0" cy="0"/>
+        </a:xfrm>
+      </p:grpSpPr>
+      <p:sp>
+        <p:nvSpPr>
+          <p:cNvPr id="2" name="Header Placeholder 1"/>
+          <p:cNvSpPr>
+            <a:spLocks noGrp="1"/>
+          </p:cNvSpPr>
+          <p:nvPr>
+            <p:ph type="hdr" sz="quarter"/>
+          </p:nvPr>
+        </p:nvSpPr>
+        <p:spPr>
+          <a:xfrm>
+            <a:off x="0" y="0"/>
+            <a:ext cx="2971800" cy="458788"/>
+          </a:xfrm>
+          <a:prstGeom prst="rect">
+            <a:avLst/>
+          </a:prstGeom>
+        </p:spPr>
+        <p:txBody>
+          <a:bodyPr vert="horz" lIns="91440" tIns="45720" rIns="91440" bIns="45720" rtlCol="0"/>
+          <a:lstStyle>
+            <a:lvl1pPr algn="l">
+              <a:defRPr sz="1200"/>
+            </a:lvl1pPr>
+          </a:lstStyle>
+          <a:p>
+            <a:endParaRPr lang="en-SG"/>
+          </a:p>
+        </p:txBody>
+      </p:sp>
+      <p:sp>
+        <p:nvSpPr>
+          <p:cNvPr id="3" name="Date Placeholder 2"/>
+          <p:cNvSpPr>
+            <a:spLocks noGrp="1"/>
+          </p:cNvSpPr>
+          <p:nvPr>
+            <p:ph type="dt" idx="1"/>
+          </p:nvPr>
+        </p:nvSpPr>
+        <p:spPr>
+          <a:xfrm>
+            <a:off x="3884613" y="0"/>
+            <a:ext cx="2971800" cy="458788"/>
+          </a:xfrm>
+          <a:prstGeom prst="rect">
+            <a:avLst/>
+          </a:prstGeom>
+        </p:spPr>
+        <p:txBody>
+          <a:bodyPr vert="horz" lIns="91440" tIns="45720" rIns="91440" bIns="45720" rtlCol="0"/>
+          <a:lstStyle>
+            <a:lvl1pPr algn="r">
+              <a:defRPr sz="1200"/>
+            </a:lvl1pPr>
+          </a:lstStyle>
+          <a:p>
+            <a:fld id="{7239669B-9393-4524-8478-58B4C4E08612}" type="datetimeFigureOut">
+              <a:rPr lang="en-SG" smtClean="0"/>
+              <a:t>19/1/2022</a:t>
+            </a:fld>
+            <a:endParaRPr lang="en-SG"/>
+          </a:p>
+        </p:txBody>
+      </p:sp>
+      <p:sp>
+        <p:nvSpPr>
+          <p:cNvPr id="4" name="Slide Image Placeholder 3"/>
+          <p:cNvSpPr>
+            <a:spLocks noGrp="1" noRot="1" noChangeAspect="1"/>
+          </p:cNvSpPr>
+          <p:nvPr>
+            <p:ph type="sldImg" idx="2"/>
+          </p:nvPr>
+        </p:nvSpPr>
+        <p:spPr>
+          <a:xfrm>
+            <a:off x="685800" y="1143000"/>
+            <a:ext cx="5486400" cy="3086100"/>
+          </a:xfrm>
+          <a:prstGeom prst="rect">
+            <a:avLst/>
+          </a:prstGeom>
+          <a:noFill/>
+          <a:ln w="12700">
+            <a:solidFill>
+              <a:prstClr val="black"/>
+            </a:solidFill>
+          </a:ln>
+        </p:spPr>
+        <p:txBody>
+          <a:bodyPr vert="horz" lIns="91440" tIns="45720" rIns="91440" bIns="45720" rtlCol="0" anchor="ctr"/>
+          <a:lstStyle/>
+          <a:p>
+            <a:endParaRPr lang="en-SG"/>
+          </a:p>
+        </p:txBody>
+      </p:sp>
+      <p:sp>
+        <p:nvSpPr>
+          <p:cNvPr id="5" name="Notes Placeholder 4"/>
+          <p:cNvSpPr>
+            <a:spLocks noGrp="1"/>
+          </p:cNvSpPr>
+          <p:nvPr>
+            <p:ph type="body" sz="quarter" idx="3"/>
+          </p:nvPr>
+        </p:nvSpPr>
+        <p:spPr>
+          <a:xfrm>
+            <a:off x="685800" y="4400550"/>
+            <a:ext cx="5486400" cy="3600450"/>
+          </a:xfrm>
+          <a:prstGeom prst="rect">
+            <a:avLst/>
+          </a:prstGeom>
+        </p:spPr>
+        <p:txBody>
+          <a:bodyPr vert="horz" lIns="91440" tIns="45720" rIns="91440" bIns="45720" rtlCol="0"/>
+          <a:lstStyle/>
+          <a:p>
+            <a:pPr lvl="0"/>
+            <a:r>
+              <a:rPr lang="en-US"/>
+              <a:t>Click to edit Master text styles</a:t>
+            </a:r>
+          </a:p>
+          <a:p>
+            <a:pPr lvl="1"/>
+            <a:r>
+              <a:rPr lang="en-US"/>
+              <a:t>Second level</a:t>
+            </a:r>
+          </a:p>
+          <a:p>
+            <a:pPr lvl="2"/>
+            <a:r>
+              <a:rPr lang="en-US"/>
+              <a:t>Third level</a:t>
+            </a:r>
+          </a:p>
+          <a:p>
+            <a:pPr lvl="3"/>
+            <a:r>
+              <a:rPr lang="en-US"/>
+              <a:t>Fourth level</a:t>
+            </a:r>
+          </a:p>
+          <a:p>
+            <a:pPr lvl="4"/>
+            <a:r>
+              <a:rPr lang="en-US"/>
+              <a:t>Fifth level</a:t>
+            </a:r>
+            <a:endParaRPr lang="en-SG"/>
+          </a:p>
+        </p:txBody>
+      </p:sp>
+      <p:sp>
+        <p:nvSpPr>
+          <p:cNvPr id="6" name="Footer Placeholder 5"/>
+          <p:cNvSpPr>
+            <a:spLocks noGrp="1"/>
+          </p:cNvSpPr>
+          <p:nvPr>
+            <p:ph type="ftr" sz="quarter" idx="4"/>
+          </p:nvPr>
+        </p:nvSpPr>
+        <p:spPr>
+          <a:xfrm>
+            <a:off x="0" y="8685213"/>
+            <a:ext cx="2971800" cy="458787"/>
+          </a:xfrm>
+          <a:prstGeom prst="rect">
+            <a:avLst/>
+          </a:prstGeom>
+        </p:spPr>
+        <p:txBody>
+          <a:bodyPr vert="horz" lIns="91440" tIns="45720" rIns="91440" bIns="45720" rtlCol="0" anchor="b"/>
+          <a:lstStyle>
+            <a:lvl1pPr algn="l">
+              <a:defRPr sz="1200"/>
+            </a:lvl1pPr>
+          </a:lstStyle>
+          <a:p>
+            <a:endParaRPr lang="en-SG"/>
+          </a:p>
+        </p:txBody>
+      </p:sp>
+      <p:sp>
+        <p:nvSpPr>
+          <p:cNvPr id="7" name="Slide Number Placeholder 6"/>
+          <p:cNvSpPr>
+            <a:spLocks noGrp="1"/>
+          </p:cNvSpPr>
+          <p:nvPr>
+            <p:ph type="sldNum" sz="quarter" idx="5"/>
+          </p:nvPr>
+        </p:nvSpPr>
+        <p:spPr>
+          <a:xfrm>
+            <a:off x="3884613" y="8685213"/>
+            <a:ext cx="2971800" cy="458787"/>
+          </a:xfrm>
+          <a:prstGeom prst="rect">
+            <a:avLst/>
+          </a:prstGeom>
+        </p:spPr>
+        <p:txBody>
+          <a:bodyPr vert="horz" lIns="91440" tIns="45720" rIns="91440" bIns="45720" rtlCol="0" anchor="b"/>
+          <a:lstStyle>
+            <a:lvl1pPr algn="r">
+              <a:defRPr sz="1200"/>
+            </a:lvl1pPr>
+          </a:lstStyle>
+          <a:p>
+            <a:fld id="{53B4A8C2-B84E-4E51-87BA-1E1FD4CDFCA9}" type="slidenum">
+              <a:rPr lang="en-SG" smtClean="0"/>
+              <a:t>‹#›</a:t>
+            </a:fld>
+            <a:endParaRPr lang="en-SG"/>
+          </a:p>
+        </p:txBody>
+      </p:sp>
+    </p:spTree>
+    <p:extLst>
+      <p:ext uri="{BB962C8B-B14F-4D97-AF65-F5344CB8AC3E}">
+        <p14:creationId xmlns:p14="http://schemas.microsoft.com/office/powerpoint/2010/main" val="778265069"/>
+      </p:ext>
+    </p:extLst>
+  </p:cSld>
+  <p:clrMap bg1="lt1" tx1="dk1" bg2="lt2" tx2="dk2" accent1="accent1" accent2="accent2" accent3="accent3" accent4="accent4" accent5="accent5" accent6="accent6" hlink="hlink" folHlink="folHlink"/>
+  <p:notesStyle>
+    <a:lvl1pPr marL="0" algn="l" defTabSz="914400" rtl="0" eaLnBrk="1" latinLnBrk="0" hangingPunct="1">
+      <a:defRPr sz="1200" kern="1200">
+        <a:solidFill>
+          <a:schemeClr val="tx1"/>
+        </a:solidFill>
+        <a:latin typeface="+mn-lt"/>
+        <a:ea typeface="+mn-ea"/>
+        <a:cs typeface="+mn-cs"/>
+      </a:defRPr>
+    </a:lvl1pPr>
+    <a:lvl2pPr marL="457200" algn="l" defTabSz="914400" rtl="0" eaLnBrk="1" latinLnBrk="0" hangingPunct="1">
+      <a:defRPr sz="1200" kern="1200">
+        <a:solidFill>
+          <a:schemeClr val="tx1"/>
+        </a:solidFill>
+        <a:latin typeface="+mn-lt"/>
+        <a:ea typeface="+mn-ea"/>
+        <a:cs typeface="+mn-cs"/>
+      </a:defRPr>
+    </a:lvl2pPr>
+    <a:lvl3pPr marL="914400" algn="l" defTabSz="914400" rtl="0" eaLnBrk="1" latinLnBrk="0" hangingPunct="1">
+      <a:defRPr sz="1200" kern="1200">
+        <a:solidFill>
+          <a:schemeClr val="tx1"/>
+        </a:solidFill>
+        <a:latin typeface="+mn-lt"/>
+        <a:ea typeface="+mn-ea"/>
+        <a:cs typeface="+mn-cs"/>
+      </a:defRPr>
+    </a:lvl3pPr>
+    <a:lvl4pPr marL="1371600" algn="l" defTabSz="914400" rtl="0" eaLnBrk="1" latinLnBrk="0" hangingPunct="1">
+      <a:defRPr sz="1200" kern="1200">
+        <a:solidFill>
+          <a:schemeClr val="tx1"/>
+        </a:solidFill>
+        <a:latin typeface="+mn-lt"/>
+        <a:ea typeface="+mn-ea"/>
+        <a:cs typeface="+mn-cs"/>
+      </a:defRPr>
+    </a:lvl4pPr>
+    <a:lvl5pPr marL="1828800" algn="l" defTabSz="914400" rtl="0" eaLnBrk="1" latinLnBrk="0" hangingPunct="1">
+      <a:defRPr sz="1200" kern="1200">
+        <a:solidFill>
+          <a:schemeClr val="tx1"/>
+        </a:solidFill>
+        <a:latin typeface="+mn-lt"/>
+        <a:ea typeface="+mn-ea"/>
+        <a:cs typeface="+mn-cs"/>
+      </a:defRPr>
+    </a:lvl5pPr>
+    <a:lvl6pPr marL="2286000" algn="l" defTabSz="914400" rtl="0" eaLnBrk="1" latinLnBrk="0" hangingPunct="1">
+      <a:defRPr sz="1200" kern="1200">
+        <a:solidFill>
+          <a:schemeClr val="tx1"/>
+        </a:solidFill>
+        <a:latin typeface="+mn-lt"/>
+        <a:ea typeface="+mn-ea"/>
+        <a:cs typeface="+mn-cs"/>
+      </a:defRPr>
+    </a:lvl6pPr>
+    <a:lvl7pPr marL="2743200" algn="l" defTabSz="914400" rtl="0" eaLnBrk="1" latinLnBrk="0" hangingPunct="1">
+      <a:defRPr sz="1200" kern="1200">
+        <a:solidFill>
+          <a:schemeClr val="tx1"/>
+        </a:solidFill>
+        <a:latin typeface="+mn-lt"/>
+        <a:ea typeface="+mn-ea"/>
+        <a:cs typeface="+mn-cs"/>
+      </a:defRPr>
+    </a:lvl7pPr>
+    <a:lvl8pPr marL="3200400" algn="l" defTabSz="914400" rtl="0" eaLnBrk="1" latinLnBrk="0" hangingPunct="1">
+      <a:defRPr sz="1200" kern="1200">
+        <a:solidFill>
+          <a:schemeClr val="tx1"/>
+        </a:solidFill>
+        <a:latin typeface="+mn-lt"/>
+        <a:ea typeface="+mn-ea"/>
+        <a:cs typeface="+mn-cs"/>
+      </a:defRPr>
+    </a:lvl8pPr>
+    <a:lvl9pPr marL="3657600" algn="l" defTabSz="914400" rtl="0" eaLnBrk="1" latinLnBrk="0" hangingPunct="1">
+      <a:defRPr sz="1200" kern="1200">
+        <a:solidFill>
+          <a:schemeClr val="tx1"/>
+        </a:solidFill>
+        <a:latin typeface="+mn-lt"/>
+        <a:ea typeface="+mn-ea"/>
+        <a:cs typeface="+mn-cs"/>
+      </a:defRPr>
+    </a:lvl9pPr>
+  </p:notesStyle>
+</p:notesMaster>
+</file>
+
+<file path=ppt/notesSlides/notesSlide1.xml><?xml version="1.0" encoding="utf-8"?>
+<p:notes xmlns:a="http://schemas.openxmlformats.org/drawingml/2006/main" xmlns:r="http://schemas.openxmlformats.org/officeDocument/2006/relationships" xmlns:p="http://schemas.openxmlformats.org/presentationml/2006/main">
+  <p:cSld>
+    <p:spTree>
+      <p:nvGrpSpPr>
+        <p:cNvPr id="1" name=""/>
+        <p:cNvGrpSpPr/>
+        <p:nvPr/>
+      </p:nvGrpSpPr>
+      <p:grpSpPr>
+        <a:xfrm>
+          <a:off x="0" y="0"/>
+          <a:ext cx="0" cy="0"/>
+          <a:chOff x="0" y="0"/>
+          <a:chExt cx="0" cy="0"/>
+        </a:xfrm>
+      </p:grpSpPr>
+      <p:sp>
+        <p:nvSpPr>
+          <p:cNvPr id="2" name="Slide Image Placeholder 1"/>
+          <p:cNvSpPr>
+            <a:spLocks noGrp="1" noRot="1" noChangeAspect="1"/>
+          </p:cNvSpPr>
+          <p:nvPr>
+            <p:ph type="sldImg"/>
+          </p:nvPr>
+        </p:nvSpPr>
+        <p:spPr/>
+      </p:sp>
+      <p:sp>
+        <p:nvSpPr>
+          <p:cNvPr id="3" name="Notes Placeholder 2"/>
+          <p:cNvSpPr>
+            <a:spLocks noGrp="1"/>
+          </p:cNvSpPr>
+          <p:nvPr>
+            <p:ph type="body" idx="1"/>
+          </p:nvPr>
+        </p:nvSpPr>
+        <p:spPr/>
+        <p:txBody>
+          <a:bodyPr/>
+          <a:lstStyle/>
+          <a:p>
+            <a:endParaRPr lang="en-SG" dirty="0"/>
+          </a:p>
+        </p:txBody>
+      </p:sp>
+      <p:sp>
+        <p:nvSpPr>
+          <p:cNvPr id="4" name="Slide Number Placeholder 3"/>
+          <p:cNvSpPr>
+            <a:spLocks noGrp="1"/>
+          </p:cNvSpPr>
+          <p:nvPr>
+            <p:ph type="sldNum" sz="quarter" idx="5"/>
+          </p:nvPr>
+        </p:nvSpPr>
+        <p:spPr/>
+        <p:txBody>
+          <a:bodyPr/>
+          <a:lstStyle/>
+          <a:p>
+            <a:fld id="{53B4A8C2-B84E-4E51-87BA-1E1FD4CDFCA9}" type="slidenum">
+              <a:rPr lang="en-SG" smtClean="0"/>
+              <a:t>4</a:t>
+            </a:fld>
+            <a:endParaRPr lang="en-SG"/>
+          </a:p>
+        </p:txBody>
+      </p:sp>
+    </p:spTree>
+    <p:extLst>
+      <p:ext uri="{BB962C8B-B14F-4D97-AF65-F5344CB8AC3E}">
+        <p14:creationId xmlns:p14="http://schemas.microsoft.com/office/powerpoint/2010/main" val="1589532828"/>
+      </p:ext>
+    </p:extLst>
+  </p:cSld>
+  <p:clrMapOvr>
+    <a:masterClrMapping/>
+  </p:clrMapOvr>
+</p:notes>
+</file>
+
 <file path=ppt/slideLayouts/slideLayout1.xml><?xml version="1.0" encoding="utf-8"?>
 <p:sldLayout xmlns:a="http://schemas.openxmlformats.org/drawingml/2006/main" xmlns:r="http://schemas.openxmlformats.org/officeDocument/2006/relationships" xmlns:p="http://schemas.openxmlformats.org/presentationml/2006/main" type="title" preserve="1">
   <p:cSld name="Title Slide">
@@ -264,7 +701,7 @@
           <a:p>
             <a:fld id="{3EE4F038-F769-451C-BBC3-FD9377DA62B8}" type="datetimeFigureOut">
               <a:rPr lang="en-SG" smtClean="0"/>
-              <a:t>18/1/2022</a:t>
+              <a:t>19/1/2022</a:t>
             </a:fld>
             <a:endParaRPr lang="en-SG"/>
           </a:p>
@@ -464,7 +901,7 @@
           <a:p>
             <a:fld id="{3EE4F038-F769-451C-BBC3-FD9377DA62B8}" type="datetimeFigureOut">
               <a:rPr lang="en-SG" smtClean="0"/>
-              <a:t>18/1/2022</a:t>
+              <a:t>19/1/2022</a:t>
             </a:fld>
             <a:endParaRPr lang="en-SG"/>
           </a:p>
@@ -674,7 +1111,7 @@
           <a:p>
             <a:fld id="{3EE4F038-F769-451C-BBC3-FD9377DA62B8}" type="datetimeFigureOut">
               <a:rPr lang="en-SG" smtClean="0"/>
-              <a:t>18/1/2022</a:t>
+              <a:t>19/1/2022</a:t>
             </a:fld>
             <a:endParaRPr lang="en-SG"/>
           </a:p>
@@ -874,7 +1311,7 @@
           <a:p>
             <a:fld id="{3EE4F038-F769-451C-BBC3-FD9377DA62B8}" type="datetimeFigureOut">
               <a:rPr lang="en-SG" smtClean="0"/>
-              <a:t>18/1/2022</a:t>
+              <a:t>19/1/2022</a:t>
             </a:fld>
             <a:endParaRPr lang="en-SG"/>
           </a:p>
@@ -1150,7 +1587,7 @@
           <a:p>
             <a:fld id="{3EE4F038-F769-451C-BBC3-FD9377DA62B8}" type="datetimeFigureOut">
               <a:rPr lang="en-SG" smtClean="0"/>
-              <a:t>18/1/2022</a:t>
+              <a:t>19/1/2022</a:t>
             </a:fld>
             <a:endParaRPr lang="en-SG"/>
           </a:p>
@@ -1418,7 +1855,7 @@
           <a:p>
             <a:fld id="{3EE4F038-F769-451C-BBC3-FD9377DA62B8}" type="datetimeFigureOut">
               <a:rPr lang="en-SG" smtClean="0"/>
-              <a:t>18/1/2022</a:t>
+              <a:t>19/1/2022</a:t>
             </a:fld>
             <a:endParaRPr lang="en-SG"/>
           </a:p>
@@ -1833,7 +2270,7 @@
           <a:p>
             <a:fld id="{3EE4F038-F769-451C-BBC3-FD9377DA62B8}" type="datetimeFigureOut">
               <a:rPr lang="en-SG" smtClean="0"/>
-              <a:t>18/1/2022</a:t>
+              <a:t>19/1/2022</a:t>
             </a:fld>
             <a:endParaRPr lang="en-SG"/>
           </a:p>
@@ -1975,7 +2412,7 @@
           <a:p>
             <a:fld id="{3EE4F038-F769-451C-BBC3-FD9377DA62B8}" type="datetimeFigureOut">
               <a:rPr lang="en-SG" smtClean="0"/>
-              <a:t>18/1/2022</a:t>
+              <a:t>19/1/2022</a:t>
             </a:fld>
             <a:endParaRPr lang="en-SG"/>
           </a:p>
@@ -2088,7 +2525,7 @@
           <a:p>
             <a:fld id="{3EE4F038-F769-451C-BBC3-FD9377DA62B8}" type="datetimeFigureOut">
               <a:rPr lang="en-SG" smtClean="0"/>
-              <a:t>18/1/2022</a:t>
+              <a:t>19/1/2022</a:t>
             </a:fld>
             <a:endParaRPr lang="en-SG"/>
           </a:p>
@@ -2401,7 +2838,7 @@
           <a:p>
             <a:fld id="{3EE4F038-F769-451C-BBC3-FD9377DA62B8}" type="datetimeFigureOut">
               <a:rPr lang="en-SG" smtClean="0"/>
-              <a:t>18/1/2022</a:t>
+              <a:t>19/1/2022</a:t>
             </a:fld>
             <a:endParaRPr lang="en-SG"/>
           </a:p>
@@ -2690,7 +3127,7 @@
           <a:p>
             <a:fld id="{3EE4F038-F769-451C-BBC3-FD9377DA62B8}" type="datetimeFigureOut">
               <a:rPr lang="en-SG" smtClean="0"/>
-              <a:t>18/1/2022</a:t>
+              <a:t>19/1/2022</a:t>
             </a:fld>
             <a:endParaRPr lang="en-SG"/>
           </a:p>
@@ -2933,7 +3370,7 @@
           <a:p>
             <a:fld id="{3EE4F038-F769-451C-BBC3-FD9377DA62B8}" type="datetimeFigureOut">
               <a:rPr lang="en-SG" smtClean="0"/>
-              <a:t>18/1/2022</a:t>
+              <a:t>19/1/2022</a:t>
             </a:fld>
             <a:endParaRPr lang="en-SG"/>
           </a:p>
@@ -6715,7 +7152,7 @@
           <p:nvPr/>
         </p:nvPicPr>
         <p:blipFill>
-          <a:blip r:embed="rId2">
+          <a:blip r:embed="rId3">
             <a:extLst>
               <a:ext uri="{28A0092B-C50C-407E-A947-70E740481C1C}">
                 <a14:useLocalDpi xmlns:a14="http://schemas.microsoft.com/office/drawing/2010/main" val="0"/>
@@ -6798,7 +7235,7 @@
           <p:nvPr/>
         </p:nvPicPr>
         <p:blipFill>
-          <a:blip r:embed="rId2">
+          <a:blip r:embed="rId3">
             <a:extLst>
               <a:ext uri="{28A0092B-C50C-407E-A947-70E740481C1C}">
                 <a14:useLocalDpi xmlns:a14="http://schemas.microsoft.com/office/drawing/2010/main" val="0"/>
@@ -7010,7 +7447,7 @@
           <p:nvPr/>
         </p:nvPicPr>
         <p:blipFill>
-          <a:blip r:embed="rId3">
+          <a:blip r:embed="rId4">
             <a:extLst>
               <a:ext uri="{28A0092B-C50C-407E-A947-70E740481C1C}">
                 <a14:useLocalDpi xmlns:a14="http://schemas.microsoft.com/office/drawing/2010/main" val="0"/>
@@ -7098,7 +7535,7 @@
           <p:nvPr/>
         </p:nvPicPr>
         <p:blipFill rotWithShape="1">
-          <a:blip r:embed="rId4">
+          <a:blip r:embed="rId5">
             <a:extLst>
               <a:ext uri="{28A0092B-C50C-407E-A947-70E740481C1C}">
                 <a14:useLocalDpi xmlns:a14="http://schemas.microsoft.com/office/drawing/2010/main" val="0"/>
@@ -7148,7 +7585,7 @@
           <p:nvPr/>
         </p:nvPicPr>
         <p:blipFill>
-          <a:blip r:embed="rId5">
+          <a:blip r:embed="rId6">
             <a:extLst>
               <a:ext uri="{28A0092B-C50C-407E-A947-70E740481C1C}">
                 <a14:useLocalDpi xmlns:a14="http://schemas.microsoft.com/office/drawing/2010/main" val="0"/>
@@ -7277,7 +7714,7 @@
           <p:nvPr/>
         </p:nvPicPr>
         <p:blipFill>
-          <a:blip r:embed="rId6">
+          <a:blip r:embed="rId7">
             <a:extLst>
               <a:ext uri="{28A0092B-C50C-407E-A947-70E740481C1C}">
                 <a14:useLocalDpi xmlns:a14="http://schemas.microsoft.com/office/drawing/2010/main" val="0"/>
@@ -7303,6 +7740,855 @@
           </a:ln>
         </p:spPr>
       </p:pic>
+      <p:sp>
+        <p:nvSpPr>
+          <p:cNvPr id="7" name="Rectangle 6">
+            <a:extLst>
+              <a:ext uri="{FF2B5EF4-FFF2-40B4-BE49-F238E27FC236}">
+                <a16:creationId xmlns:a16="http://schemas.microsoft.com/office/drawing/2014/main" id="{27AECD61-8EBB-4E03-BDE9-24936927430C}"/>
+              </a:ext>
+            </a:extLst>
+          </p:cNvPr>
+          <p:cNvSpPr/>
+          <p:nvPr/>
+        </p:nvSpPr>
+        <p:spPr>
+          <a:xfrm>
+            <a:off x="6868409" y="3429000"/>
+            <a:ext cx="2608960" cy="1061001"/>
+          </a:xfrm>
+          <a:prstGeom prst="rect">
+            <a:avLst/>
+          </a:prstGeom>
+        </p:spPr>
+        <p:style>
+          <a:lnRef idx="2">
+            <a:schemeClr val="accent3">
+              <a:shade val="50000"/>
+            </a:schemeClr>
+          </a:lnRef>
+          <a:fillRef idx="1">
+            <a:schemeClr val="accent3"/>
+          </a:fillRef>
+          <a:effectRef idx="0">
+            <a:schemeClr val="accent3"/>
+          </a:effectRef>
+          <a:fontRef idx="minor">
+            <a:schemeClr val="lt1"/>
+          </a:fontRef>
+        </p:style>
+        <p:txBody>
+          <a:bodyPr rtlCol="0" anchor="ctr"/>
+          <a:lstStyle/>
+          <a:p>
+            <a:pPr algn="ctr"/>
+            <a:endParaRPr lang="en-SG" dirty="0"/>
+          </a:p>
+        </p:txBody>
+      </p:sp>
+      <p:sp>
+        <p:nvSpPr>
+          <p:cNvPr id="19" name="TextBox 18">
+            <a:extLst>
+              <a:ext uri="{FF2B5EF4-FFF2-40B4-BE49-F238E27FC236}">
+                <a16:creationId xmlns:a16="http://schemas.microsoft.com/office/drawing/2014/main" id="{1EE01227-C839-4571-B005-7D46427BE03B}"/>
+              </a:ext>
+            </a:extLst>
+          </p:cNvPr>
+          <p:cNvSpPr txBox="1"/>
+          <p:nvPr/>
+        </p:nvSpPr>
+        <p:spPr>
+          <a:xfrm>
+            <a:off x="6906252" y="3422722"/>
+            <a:ext cx="2558603" cy="362894"/>
+          </a:xfrm>
+          <a:prstGeom prst="rect">
+            <a:avLst/>
+          </a:prstGeom>
+          <a:noFill/>
+          <a:ln w="3175">
+            <a:noFill/>
+          </a:ln>
+        </p:spPr>
+        <p:txBody>
+          <a:bodyPr wrap="square" lIns="36000" tIns="36000" rIns="36000" bIns="36000" rtlCol="0">
+            <a:noAutofit/>
+          </a:bodyPr>
+          <a:lstStyle/>
+          <a:p>
+            <a:r>
+              <a:rPr lang="en-US" sz="1000" b="0" dirty="0">
+                <a:effectLst/>
+                <a:latin typeface="Consolas" panose="020B0609020204030204" pitchFamily="49" charset="0"/>
+              </a:rPr>
+              <a:t>Quantum crypto attack resistance confidence level (0-10):</a:t>
+            </a:r>
+          </a:p>
+          <a:p>
+            <a:endParaRPr lang="en-SG" sz="1000" b="1" dirty="0"/>
+          </a:p>
+        </p:txBody>
+      </p:sp>
+      <p:sp>
+        <p:nvSpPr>
+          <p:cNvPr id="11" name="Rectangle 10">
+            <a:extLst>
+              <a:ext uri="{FF2B5EF4-FFF2-40B4-BE49-F238E27FC236}">
+                <a16:creationId xmlns:a16="http://schemas.microsoft.com/office/drawing/2014/main" id="{4DECE26D-E40E-4F26-BC43-0CE9036E4C06}"/>
+              </a:ext>
+            </a:extLst>
+          </p:cNvPr>
+          <p:cNvSpPr/>
+          <p:nvPr/>
+        </p:nvSpPr>
+        <p:spPr>
+          <a:xfrm>
+            <a:off x="6906252" y="3818494"/>
+            <a:ext cx="182219" cy="186578"/>
+          </a:xfrm>
+          <a:prstGeom prst="rect">
+            <a:avLst/>
+          </a:prstGeom>
+          <a:solidFill>
+            <a:srgbClr val="C00000"/>
+          </a:solidFill>
+        </p:spPr>
+        <p:style>
+          <a:lnRef idx="2">
+            <a:schemeClr val="accent1">
+              <a:shade val="50000"/>
+            </a:schemeClr>
+          </a:lnRef>
+          <a:fillRef idx="1">
+            <a:schemeClr val="accent1"/>
+          </a:fillRef>
+          <a:effectRef idx="0">
+            <a:schemeClr val="accent1"/>
+          </a:effectRef>
+          <a:fontRef idx="minor">
+            <a:schemeClr val="lt1"/>
+          </a:fontRef>
+        </p:style>
+        <p:txBody>
+          <a:bodyPr rtlCol="0" anchor="ctr"/>
+          <a:lstStyle/>
+          <a:p>
+            <a:pPr algn="ctr"/>
+            <a:r>
+              <a:rPr lang="en-US" sz="1000" dirty="0">
+                <a:solidFill>
+                  <a:schemeClr val="bg1"/>
+                </a:solidFill>
+              </a:rPr>
+              <a:t>0</a:t>
+            </a:r>
+            <a:endParaRPr lang="en-SG" sz="1000" dirty="0">
+              <a:solidFill>
+                <a:schemeClr val="bg1"/>
+              </a:solidFill>
+            </a:endParaRPr>
+          </a:p>
+        </p:txBody>
+      </p:sp>
+      <p:sp>
+        <p:nvSpPr>
+          <p:cNvPr id="20" name="Rectangle 19">
+            <a:extLst>
+              <a:ext uri="{FF2B5EF4-FFF2-40B4-BE49-F238E27FC236}">
+                <a16:creationId xmlns:a16="http://schemas.microsoft.com/office/drawing/2014/main" id="{E31EE8E2-451F-4731-A3D7-0704E01212FA}"/>
+              </a:ext>
+            </a:extLst>
+          </p:cNvPr>
+          <p:cNvSpPr/>
+          <p:nvPr/>
+        </p:nvSpPr>
+        <p:spPr>
+          <a:xfrm>
+            <a:off x="7138100" y="3818494"/>
+            <a:ext cx="182219" cy="186578"/>
+          </a:xfrm>
+          <a:prstGeom prst="rect">
+            <a:avLst/>
+          </a:prstGeom>
+          <a:solidFill>
+            <a:srgbClr val="C20507"/>
+          </a:solidFill>
+        </p:spPr>
+        <p:style>
+          <a:lnRef idx="2">
+            <a:schemeClr val="accent1">
+              <a:shade val="50000"/>
+            </a:schemeClr>
+          </a:lnRef>
+          <a:fillRef idx="1">
+            <a:schemeClr val="accent1"/>
+          </a:fillRef>
+          <a:effectRef idx="0">
+            <a:schemeClr val="accent1"/>
+          </a:effectRef>
+          <a:fontRef idx="minor">
+            <a:schemeClr val="lt1"/>
+          </a:fontRef>
+        </p:style>
+        <p:txBody>
+          <a:bodyPr rtlCol="0" anchor="ctr"/>
+          <a:lstStyle/>
+          <a:p>
+            <a:pPr algn="ctr"/>
+            <a:r>
+              <a:rPr lang="en-US" sz="1000" dirty="0">
+                <a:solidFill>
+                  <a:schemeClr val="bg1"/>
+                </a:solidFill>
+              </a:rPr>
+              <a:t>1</a:t>
+            </a:r>
+            <a:endParaRPr lang="en-SG" sz="1000" dirty="0">
+              <a:solidFill>
+                <a:schemeClr val="bg1"/>
+              </a:solidFill>
+            </a:endParaRPr>
+          </a:p>
+        </p:txBody>
+      </p:sp>
+      <p:sp>
+        <p:nvSpPr>
+          <p:cNvPr id="22" name="Rectangle 21">
+            <a:extLst>
+              <a:ext uri="{FF2B5EF4-FFF2-40B4-BE49-F238E27FC236}">
+                <a16:creationId xmlns:a16="http://schemas.microsoft.com/office/drawing/2014/main" id="{DFDEDAB3-C3ED-4ABC-8293-72E0125498F9}"/>
+              </a:ext>
+            </a:extLst>
+          </p:cNvPr>
+          <p:cNvSpPr/>
+          <p:nvPr/>
+        </p:nvSpPr>
+        <p:spPr>
+          <a:xfrm>
+            <a:off x="7369948" y="3818494"/>
+            <a:ext cx="182219" cy="186578"/>
+          </a:xfrm>
+          <a:prstGeom prst="rect">
+            <a:avLst/>
+          </a:prstGeom>
+          <a:solidFill>
+            <a:srgbClr val="FF0D0D"/>
+          </a:solidFill>
+        </p:spPr>
+        <p:style>
+          <a:lnRef idx="2">
+            <a:schemeClr val="accent1">
+              <a:shade val="50000"/>
+            </a:schemeClr>
+          </a:lnRef>
+          <a:fillRef idx="1">
+            <a:schemeClr val="accent1"/>
+          </a:fillRef>
+          <a:effectRef idx="0">
+            <a:schemeClr val="accent1"/>
+          </a:effectRef>
+          <a:fontRef idx="minor">
+            <a:schemeClr val="lt1"/>
+          </a:fontRef>
+        </p:style>
+        <p:txBody>
+          <a:bodyPr rtlCol="0" anchor="ctr"/>
+          <a:lstStyle/>
+          <a:p>
+            <a:pPr algn="ctr"/>
+            <a:r>
+              <a:rPr lang="en-US" sz="1000" dirty="0">
+                <a:solidFill>
+                  <a:schemeClr val="bg1"/>
+                </a:solidFill>
+              </a:rPr>
+              <a:t>2</a:t>
+            </a:r>
+            <a:endParaRPr lang="en-SG" sz="1000" dirty="0">
+              <a:solidFill>
+                <a:schemeClr val="bg1"/>
+              </a:solidFill>
+            </a:endParaRPr>
+          </a:p>
+        </p:txBody>
+      </p:sp>
+      <p:sp>
+        <p:nvSpPr>
+          <p:cNvPr id="23" name="Rectangle 22">
+            <a:extLst>
+              <a:ext uri="{FF2B5EF4-FFF2-40B4-BE49-F238E27FC236}">
+                <a16:creationId xmlns:a16="http://schemas.microsoft.com/office/drawing/2014/main" id="{5EEF74EF-4A8A-440E-A298-F3D83FBA1721}"/>
+              </a:ext>
+            </a:extLst>
+          </p:cNvPr>
+          <p:cNvSpPr/>
+          <p:nvPr/>
+        </p:nvSpPr>
+        <p:spPr>
+          <a:xfrm>
+            <a:off x="7598944" y="3819580"/>
+            <a:ext cx="182219" cy="186578"/>
+          </a:xfrm>
+          <a:prstGeom prst="rect">
+            <a:avLst/>
+          </a:prstGeom>
+          <a:solidFill>
+            <a:srgbClr val="FF4911"/>
+          </a:solidFill>
+        </p:spPr>
+        <p:style>
+          <a:lnRef idx="2">
+            <a:schemeClr val="accent1">
+              <a:shade val="50000"/>
+            </a:schemeClr>
+          </a:lnRef>
+          <a:fillRef idx="1">
+            <a:schemeClr val="accent1"/>
+          </a:fillRef>
+          <a:effectRef idx="0">
+            <a:schemeClr val="accent1"/>
+          </a:effectRef>
+          <a:fontRef idx="minor">
+            <a:schemeClr val="lt1"/>
+          </a:fontRef>
+        </p:style>
+        <p:txBody>
+          <a:bodyPr rtlCol="0" anchor="ctr"/>
+          <a:lstStyle/>
+          <a:p>
+            <a:pPr algn="ctr"/>
+            <a:r>
+              <a:rPr lang="en-US" sz="1000" dirty="0">
+                <a:solidFill>
+                  <a:schemeClr val="bg1"/>
+                </a:solidFill>
+              </a:rPr>
+              <a:t>3</a:t>
+            </a:r>
+            <a:endParaRPr lang="en-SG" sz="1000" dirty="0">
+              <a:solidFill>
+                <a:schemeClr val="bg1"/>
+              </a:solidFill>
+            </a:endParaRPr>
+          </a:p>
+        </p:txBody>
+      </p:sp>
+      <p:sp>
+        <p:nvSpPr>
+          <p:cNvPr id="24" name="Rectangle 23">
+            <a:extLst>
+              <a:ext uri="{FF2B5EF4-FFF2-40B4-BE49-F238E27FC236}">
+                <a16:creationId xmlns:a16="http://schemas.microsoft.com/office/drawing/2014/main" id="{7E3A0A7A-E56B-46AB-B3C1-C4D5B34EE275}"/>
+              </a:ext>
+            </a:extLst>
+          </p:cNvPr>
+          <p:cNvSpPr/>
+          <p:nvPr/>
+        </p:nvSpPr>
+        <p:spPr>
+          <a:xfrm>
+            <a:off x="7831192" y="3819822"/>
+            <a:ext cx="182219" cy="186578"/>
+          </a:xfrm>
+          <a:prstGeom prst="rect">
+            <a:avLst/>
+          </a:prstGeom>
+          <a:solidFill>
+            <a:srgbClr val="FF8E15"/>
+          </a:solidFill>
+        </p:spPr>
+        <p:style>
+          <a:lnRef idx="2">
+            <a:schemeClr val="accent1">
+              <a:shade val="50000"/>
+            </a:schemeClr>
+          </a:lnRef>
+          <a:fillRef idx="1">
+            <a:schemeClr val="accent1"/>
+          </a:fillRef>
+          <a:effectRef idx="0">
+            <a:schemeClr val="accent1"/>
+          </a:effectRef>
+          <a:fontRef idx="minor">
+            <a:schemeClr val="lt1"/>
+          </a:fontRef>
+        </p:style>
+        <p:txBody>
+          <a:bodyPr rtlCol="0" anchor="ctr"/>
+          <a:lstStyle/>
+          <a:p>
+            <a:pPr algn="ctr"/>
+            <a:r>
+              <a:rPr lang="en-US" sz="1000" dirty="0">
+                <a:solidFill>
+                  <a:schemeClr val="bg1"/>
+                </a:solidFill>
+              </a:rPr>
+              <a:t>4</a:t>
+            </a:r>
+            <a:endParaRPr lang="en-SG" sz="1000" dirty="0">
+              <a:solidFill>
+                <a:schemeClr val="bg1"/>
+              </a:solidFill>
+            </a:endParaRPr>
+          </a:p>
+        </p:txBody>
+      </p:sp>
+      <p:sp>
+        <p:nvSpPr>
+          <p:cNvPr id="25" name="Rectangle 24">
+            <a:extLst>
+              <a:ext uri="{FF2B5EF4-FFF2-40B4-BE49-F238E27FC236}">
+                <a16:creationId xmlns:a16="http://schemas.microsoft.com/office/drawing/2014/main" id="{C888E64D-9FF6-422D-A828-9C1AB6CE9842}"/>
+              </a:ext>
+            </a:extLst>
+          </p:cNvPr>
+          <p:cNvSpPr/>
+          <p:nvPr/>
+        </p:nvSpPr>
+        <p:spPr>
+          <a:xfrm>
+            <a:off x="8060520" y="3818693"/>
+            <a:ext cx="182219" cy="186578"/>
+          </a:xfrm>
+          <a:prstGeom prst="rect">
+            <a:avLst/>
+          </a:prstGeom>
+          <a:solidFill>
+            <a:srgbClr val="FAB733"/>
+          </a:solidFill>
+        </p:spPr>
+        <p:style>
+          <a:lnRef idx="2">
+            <a:schemeClr val="accent1">
+              <a:shade val="50000"/>
+            </a:schemeClr>
+          </a:lnRef>
+          <a:fillRef idx="1">
+            <a:schemeClr val="accent1"/>
+          </a:fillRef>
+          <a:effectRef idx="0">
+            <a:schemeClr val="accent1"/>
+          </a:effectRef>
+          <a:fontRef idx="minor">
+            <a:schemeClr val="lt1"/>
+          </a:fontRef>
+        </p:style>
+        <p:txBody>
+          <a:bodyPr rtlCol="0" anchor="ctr"/>
+          <a:lstStyle/>
+          <a:p>
+            <a:pPr algn="ctr"/>
+            <a:r>
+              <a:rPr lang="en-US" sz="1000" dirty="0">
+                <a:solidFill>
+                  <a:schemeClr val="bg1"/>
+                </a:solidFill>
+              </a:rPr>
+              <a:t>5</a:t>
+            </a:r>
+            <a:endParaRPr lang="en-SG" sz="1000" dirty="0">
+              <a:solidFill>
+                <a:schemeClr val="bg1"/>
+              </a:solidFill>
+            </a:endParaRPr>
+          </a:p>
+        </p:txBody>
+      </p:sp>
+      <p:sp>
+        <p:nvSpPr>
+          <p:cNvPr id="26" name="Rectangle 25">
+            <a:extLst>
+              <a:ext uri="{FF2B5EF4-FFF2-40B4-BE49-F238E27FC236}">
+                <a16:creationId xmlns:a16="http://schemas.microsoft.com/office/drawing/2014/main" id="{AE569534-C636-4B61-9E3E-E37BD6619058}"/>
+              </a:ext>
+            </a:extLst>
+          </p:cNvPr>
+          <p:cNvSpPr/>
+          <p:nvPr/>
+        </p:nvSpPr>
+        <p:spPr>
+          <a:xfrm>
+            <a:off x="8288306" y="3819580"/>
+            <a:ext cx="182219" cy="186578"/>
+          </a:xfrm>
+          <a:prstGeom prst="rect">
+            <a:avLst/>
+          </a:prstGeom>
+          <a:solidFill>
+            <a:srgbClr val="ACB334"/>
+          </a:solidFill>
+        </p:spPr>
+        <p:style>
+          <a:lnRef idx="2">
+            <a:schemeClr val="accent1">
+              <a:shade val="50000"/>
+            </a:schemeClr>
+          </a:lnRef>
+          <a:fillRef idx="1">
+            <a:schemeClr val="accent1"/>
+          </a:fillRef>
+          <a:effectRef idx="0">
+            <a:schemeClr val="accent1"/>
+          </a:effectRef>
+          <a:fontRef idx="minor">
+            <a:schemeClr val="lt1"/>
+          </a:fontRef>
+        </p:style>
+        <p:txBody>
+          <a:bodyPr rtlCol="0" anchor="ctr"/>
+          <a:lstStyle/>
+          <a:p>
+            <a:pPr algn="ctr"/>
+            <a:r>
+              <a:rPr lang="en-US" sz="1000" dirty="0">
+                <a:solidFill>
+                  <a:schemeClr val="bg1"/>
+                </a:solidFill>
+              </a:rPr>
+              <a:t>6</a:t>
+            </a:r>
+            <a:endParaRPr lang="en-SG" sz="1000" dirty="0">
+              <a:solidFill>
+                <a:schemeClr val="bg1"/>
+              </a:solidFill>
+            </a:endParaRPr>
+          </a:p>
+        </p:txBody>
+      </p:sp>
+      <p:sp>
+        <p:nvSpPr>
+          <p:cNvPr id="27" name="Rectangle 26">
+            <a:extLst>
+              <a:ext uri="{FF2B5EF4-FFF2-40B4-BE49-F238E27FC236}">
+                <a16:creationId xmlns:a16="http://schemas.microsoft.com/office/drawing/2014/main" id="{87AFEFD5-9C70-42AE-ABA9-1CED65135422}"/>
+              </a:ext>
+            </a:extLst>
+          </p:cNvPr>
+          <p:cNvSpPr/>
+          <p:nvPr/>
+        </p:nvSpPr>
+        <p:spPr>
+          <a:xfrm>
+            <a:off x="8532611" y="3820766"/>
+            <a:ext cx="182219" cy="186578"/>
+          </a:xfrm>
+          <a:prstGeom prst="rect">
+            <a:avLst/>
+          </a:prstGeom>
+          <a:solidFill>
+            <a:srgbClr val="ACB761"/>
+          </a:solidFill>
+        </p:spPr>
+        <p:style>
+          <a:lnRef idx="2">
+            <a:schemeClr val="accent1">
+              <a:shade val="50000"/>
+            </a:schemeClr>
+          </a:lnRef>
+          <a:fillRef idx="1">
+            <a:schemeClr val="accent1"/>
+          </a:fillRef>
+          <a:effectRef idx="0">
+            <a:schemeClr val="accent1"/>
+          </a:effectRef>
+          <a:fontRef idx="minor">
+            <a:schemeClr val="lt1"/>
+          </a:fontRef>
+        </p:style>
+        <p:txBody>
+          <a:bodyPr rtlCol="0" anchor="ctr"/>
+          <a:lstStyle/>
+          <a:p>
+            <a:pPr algn="ctr"/>
+            <a:r>
+              <a:rPr lang="en-US" sz="1000" dirty="0">
+                <a:solidFill>
+                  <a:schemeClr val="bg1"/>
+                </a:solidFill>
+              </a:rPr>
+              <a:t>7</a:t>
+            </a:r>
+            <a:endParaRPr lang="en-SG" sz="1000" dirty="0">
+              <a:solidFill>
+                <a:schemeClr val="bg1"/>
+              </a:solidFill>
+            </a:endParaRPr>
+          </a:p>
+        </p:txBody>
+      </p:sp>
+      <p:sp>
+        <p:nvSpPr>
+          <p:cNvPr id="29" name="Rectangle 28">
+            <a:extLst>
+              <a:ext uri="{FF2B5EF4-FFF2-40B4-BE49-F238E27FC236}">
+                <a16:creationId xmlns:a16="http://schemas.microsoft.com/office/drawing/2014/main" id="{42E58BDE-7310-4180-8FF5-545FB203E79D}"/>
+              </a:ext>
+            </a:extLst>
+          </p:cNvPr>
+          <p:cNvSpPr/>
+          <p:nvPr/>
+        </p:nvSpPr>
+        <p:spPr>
+          <a:xfrm>
+            <a:off x="8764006" y="3819580"/>
+            <a:ext cx="182219" cy="186578"/>
+          </a:xfrm>
+          <a:prstGeom prst="rect">
+            <a:avLst/>
+          </a:prstGeom>
+          <a:solidFill>
+            <a:srgbClr val="69B34C"/>
+          </a:solidFill>
+        </p:spPr>
+        <p:style>
+          <a:lnRef idx="2">
+            <a:schemeClr val="accent1">
+              <a:shade val="50000"/>
+            </a:schemeClr>
+          </a:lnRef>
+          <a:fillRef idx="1">
+            <a:schemeClr val="accent1"/>
+          </a:fillRef>
+          <a:effectRef idx="0">
+            <a:schemeClr val="accent1"/>
+          </a:effectRef>
+          <a:fontRef idx="minor">
+            <a:schemeClr val="lt1"/>
+          </a:fontRef>
+        </p:style>
+        <p:txBody>
+          <a:bodyPr rtlCol="0" anchor="ctr"/>
+          <a:lstStyle/>
+          <a:p>
+            <a:pPr algn="ctr"/>
+            <a:r>
+              <a:rPr lang="en-US" sz="1000" dirty="0">
+                <a:solidFill>
+                  <a:schemeClr val="bg1"/>
+                </a:solidFill>
+              </a:rPr>
+              <a:t>8</a:t>
+            </a:r>
+            <a:endParaRPr lang="en-SG" sz="1000" dirty="0">
+              <a:solidFill>
+                <a:schemeClr val="bg1"/>
+              </a:solidFill>
+            </a:endParaRPr>
+          </a:p>
+        </p:txBody>
+      </p:sp>
+      <p:sp>
+        <p:nvSpPr>
+          <p:cNvPr id="31" name="Rectangle 30">
+            <a:extLst>
+              <a:ext uri="{FF2B5EF4-FFF2-40B4-BE49-F238E27FC236}">
+                <a16:creationId xmlns:a16="http://schemas.microsoft.com/office/drawing/2014/main" id="{FAAD5B93-28F7-41C2-AB3B-45A40CA263BF}"/>
+              </a:ext>
+            </a:extLst>
+          </p:cNvPr>
+          <p:cNvSpPr/>
+          <p:nvPr/>
+        </p:nvSpPr>
+        <p:spPr>
+          <a:xfrm>
+            <a:off x="8991470" y="3821852"/>
+            <a:ext cx="182219" cy="186578"/>
+          </a:xfrm>
+          <a:prstGeom prst="rect">
+            <a:avLst/>
+          </a:prstGeom>
+          <a:solidFill>
+            <a:srgbClr val="00563F"/>
+          </a:solidFill>
+        </p:spPr>
+        <p:style>
+          <a:lnRef idx="2">
+            <a:schemeClr val="accent1">
+              <a:shade val="50000"/>
+            </a:schemeClr>
+          </a:lnRef>
+          <a:fillRef idx="1">
+            <a:schemeClr val="accent1"/>
+          </a:fillRef>
+          <a:effectRef idx="0">
+            <a:schemeClr val="accent1"/>
+          </a:effectRef>
+          <a:fontRef idx="minor">
+            <a:schemeClr val="lt1"/>
+          </a:fontRef>
+        </p:style>
+        <p:txBody>
+          <a:bodyPr rtlCol="0" anchor="ctr"/>
+          <a:lstStyle/>
+          <a:p>
+            <a:pPr algn="ctr"/>
+            <a:r>
+              <a:rPr lang="en-US" sz="1000" dirty="0">
+                <a:solidFill>
+                  <a:schemeClr val="bg1"/>
+                </a:solidFill>
+              </a:rPr>
+              <a:t>9</a:t>
+            </a:r>
+            <a:endParaRPr lang="en-SG" sz="1000" dirty="0">
+              <a:solidFill>
+                <a:schemeClr val="bg1"/>
+              </a:solidFill>
+            </a:endParaRPr>
+          </a:p>
+        </p:txBody>
+      </p:sp>
+      <p:sp>
+        <p:nvSpPr>
+          <p:cNvPr id="32" name="Rectangle 31">
+            <a:extLst>
+              <a:ext uri="{FF2B5EF4-FFF2-40B4-BE49-F238E27FC236}">
+                <a16:creationId xmlns:a16="http://schemas.microsoft.com/office/drawing/2014/main" id="{CD8C5D69-433E-46D8-B7BC-E0B4981CEF09}"/>
+              </a:ext>
+            </a:extLst>
+          </p:cNvPr>
+          <p:cNvSpPr/>
+          <p:nvPr/>
+        </p:nvSpPr>
+        <p:spPr>
+          <a:xfrm>
+            <a:off x="9219677" y="3823525"/>
+            <a:ext cx="182220" cy="181547"/>
+          </a:xfrm>
+          <a:prstGeom prst="rect">
+            <a:avLst/>
+          </a:prstGeom>
+          <a:solidFill>
+            <a:srgbClr val="00563F"/>
+          </a:solidFill>
+        </p:spPr>
+        <p:style>
+          <a:lnRef idx="2">
+            <a:schemeClr val="accent1">
+              <a:shade val="50000"/>
+            </a:schemeClr>
+          </a:lnRef>
+          <a:fillRef idx="1">
+            <a:schemeClr val="accent1"/>
+          </a:fillRef>
+          <a:effectRef idx="0">
+            <a:schemeClr val="accent1"/>
+          </a:effectRef>
+          <a:fontRef idx="minor">
+            <a:schemeClr val="lt1"/>
+          </a:fontRef>
+        </p:style>
+        <p:txBody>
+          <a:bodyPr rtlCol="0" anchor="ctr"/>
+          <a:lstStyle/>
+          <a:p>
+            <a:endParaRPr lang="en-SG" sz="800" dirty="0">
+              <a:solidFill>
+                <a:schemeClr val="bg1"/>
+              </a:solidFill>
+            </a:endParaRPr>
+          </a:p>
+        </p:txBody>
+      </p:sp>
+      <p:sp>
+        <p:nvSpPr>
+          <p:cNvPr id="33" name="TextBox 32">
+            <a:extLst>
+              <a:ext uri="{FF2B5EF4-FFF2-40B4-BE49-F238E27FC236}">
+                <a16:creationId xmlns:a16="http://schemas.microsoft.com/office/drawing/2014/main" id="{70FCE96D-1D90-492C-95E2-6A1CF2C0F281}"/>
+              </a:ext>
+            </a:extLst>
+          </p:cNvPr>
+          <p:cNvSpPr txBox="1"/>
+          <p:nvPr/>
+        </p:nvSpPr>
+        <p:spPr>
+          <a:xfrm>
+            <a:off x="9203927" y="3799573"/>
+            <a:ext cx="273442" cy="226591"/>
+          </a:xfrm>
+          <a:prstGeom prst="rect">
+            <a:avLst/>
+          </a:prstGeom>
+          <a:noFill/>
+          <a:ln w="3175">
+            <a:noFill/>
+          </a:ln>
+        </p:spPr>
+        <p:txBody>
+          <a:bodyPr wrap="square" lIns="36000" tIns="36000" rIns="36000" bIns="36000" rtlCol="0">
+            <a:noAutofit/>
+          </a:bodyPr>
+          <a:lstStyle/>
+          <a:p>
+            <a:r>
+              <a:rPr lang="en-US" sz="1000" b="1" dirty="0">
+                <a:solidFill>
+                  <a:schemeClr val="bg1"/>
+                </a:solidFill>
+              </a:rPr>
+              <a:t>10</a:t>
+            </a:r>
+            <a:endParaRPr lang="en-SG" sz="1000" b="1" dirty="0">
+              <a:solidFill>
+                <a:schemeClr val="bg1"/>
+              </a:solidFill>
+            </a:endParaRPr>
+          </a:p>
+        </p:txBody>
+      </p:sp>
+      <p:sp>
+        <p:nvSpPr>
+          <p:cNvPr id="34" name="TextBox 33">
+            <a:extLst>
+              <a:ext uri="{FF2B5EF4-FFF2-40B4-BE49-F238E27FC236}">
+                <a16:creationId xmlns:a16="http://schemas.microsoft.com/office/drawing/2014/main" id="{F9779408-4774-4ACC-B7C0-D5BFC199E705}"/>
+              </a:ext>
+            </a:extLst>
+          </p:cNvPr>
+          <p:cNvSpPr txBox="1"/>
+          <p:nvPr/>
+        </p:nvSpPr>
+        <p:spPr>
+          <a:xfrm>
+            <a:off x="6894646" y="4044666"/>
+            <a:ext cx="2747316" cy="362894"/>
+          </a:xfrm>
+          <a:prstGeom prst="rect">
+            <a:avLst/>
+          </a:prstGeom>
+          <a:noFill/>
+          <a:ln w="3175">
+            <a:noFill/>
+          </a:ln>
+        </p:spPr>
+        <p:txBody>
+          <a:bodyPr wrap="square" lIns="36000" tIns="36000" rIns="36000" bIns="36000" rtlCol="0">
+            <a:noAutofit/>
+          </a:bodyPr>
+          <a:lstStyle/>
+          <a:p>
+            <a:r>
+              <a:rPr lang="en-US" sz="1000" b="0" dirty="0">
+                <a:effectLst/>
+                <a:latin typeface="Consolas" panose="020B0609020204030204" pitchFamily="49" charset="0"/>
+              </a:rPr>
+              <a:t>0: Vulnerable for any Quantum attack</a:t>
+            </a:r>
+          </a:p>
+          <a:p>
+            <a:r>
+              <a:rPr lang="en-US" sz="1000" dirty="0">
+                <a:latin typeface="Consolas" panose="020B0609020204030204" pitchFamily="49" charset="0"/>
+              </a:rPr>
+              <a:t>10:Defensive for most Quantum attack</a:t>
+            </a:r>
+            <a:endParaRPr lang="en-SG" sz="1000" b="1" dirty="0"/>
+          </a:p>
+        </p:txBody>
+      </p:sp>
     </p:spTree>
     <p:extLst>
       <p:ext uri="{BB962C8B-B14F-4D97-AF65-F5344CB8AC3E}">
@@ -7609,4 +8895,299 @@
     </a:ext>
   </a:extLst>
 </a:theme>
+</file>
+
+<file path=ppt/theme/theme2.xml><?xml version="1.0" encoding="utf-8"?>
+<a:theme xmlns:a="http://schemas.openxmlformats.org/drawingml/2006/main" name="Office Theme">
+  <a:themeElements>
+    <a:clrScheme name="Office">
+      <a:dk1>
+        <a:sysClr val="windowText" lastClr="000000"/>
+      </a:dk1>
+      <a:lt1>
+        <a:sysClr val="window" lastClr="FFFFFF"/>
+      </a:lt1>
+      <a:dk2>
+        <a:srgbClr val="44546A"/>
+      </a:dk2>
+      <a:lt2>
+        <a:srgbClr val="E7E6E6"/>
+      </a:lt2>
+      <a:accent1>
+        <a:srgbClr val="4472C4"/>
+      </a:accent1>
+      <a:accent2>
+        <a:srgbClr val="ED7D31"/>
+      </a:accent2>
+      <a:accent3>
+        <a:srgbClr val="A5A5A5"/>
+      </a:accent3>
+      <a:accent4>
+        <a:srgbClr val="FFC000"/>
+      </a:accent4>
+      <a:accent5>
+        <a:srgbClr val="5B9BD5"/>
+      </a:accent5>
+      <a:accent6>
+        <a:srgbClr val="70AD47"/>
+      </a:accent6>
+      <a:hlink>
+        <a:srgbClr val="0563C1"/>
+      </a:hlink>
+      <a:folHlink>
+        <a:srgbClr val="954F72"/>
+      </a:folHlink>
+    </a:clrScheme>
+    <a:fontScheme name="Office">
+      <a:majorFont>
+        <a:latin typeface="Calibri Light" panose="020F0302020204030204"/>
+        <a:ea typeface=""/>
+        <a:cs typeface=""/>
+        <a:font script="Jpan" typeface="游ゴシック Light"/>
+        <a:font script="Hang" typeface="맑은 고딕"/>
+        <a:font script="Hans" typeface="等线 Light"/>
+        <a:font script="Hant" typeface="新細明體"/>
+        <a:font script="Arab" typeface="Times New Roman"/>
+        <a:font script="Hebr" typeface="Times New Roman"/>
+        <a:font script="Thai" typeface="Angsana New"/>
+        <a:font script="Ethi" typeface="Nyala"/>
+        <a:font script="Beng" typeface="Vrinda"/>
+        <a:font script="Gujr" typeface="Shruti"/>
+        <a:font script="Khmr" typeface="MoolBoran"/>
+        <a:font script="Knda" typeface="Tunga"/>
+        <a:font script="Guru" typeface="Raavi"/>
+        <a:font script="Cans" typeface="Euphemia"/>
+        <a:font script="Cher" typeface="Plantagenet Cherokee"/>
+        <a:font script="Yiii" typeface="Microsoft Yi Baiti"/>
+        <a:font script="Tibt" typeface="Microsoft Himalaya"/>
+        <a:font script="Thaa" typeface="MV Boli"/>
+        <a:font script="Deva" typeface="Mangal"/>
+        <a:font script="Telu" typeface="Gautami"/>
+        <a:font script="Taml" typeface="Latha"/>
+        <a:font script="Syrc" typeface="Estrangelo Edessa"/>
+        <a:font script="Orya" typeface="Kalinga"/>
+        <a:font script="Mlym" typeface="Kartika"/>
+        <a:font script="Laoo" typeface="DokChampa"/>
+        <a:font script="Sinh" typeface="Iskoola Pota"/>
+        <a:font script="Mong" typeface="Mongolian Baiti"/>
+        <a:font script="Viet" typeface="Times New Roman"/>
+        <a:font script="Uigh" typeface="Microsoft Uighur"/>
+        <a:font script="Geor" typeface="Sylfaen"/>
+        <a:font script="Armn" typeface="Arial"/>
+        <a:font script="Bugi" typeface="Leelawadee UI"/>
+        <a:font script="Bopo" typeface="Microsoft JhengHei"/>
+        <a:font script="Java" typeface="Javanese Text"/>
+        <a:font script="Lisu" typeface="Segoe UI"/>
+        <a:font script="Mymr" typeface="Myanmar Text"/>
+        <a:font script="Nkoo" typeface="Ebrima"/>
+        <a:font script="Olck" typeface="Nirmala UI"/>
+        <a:font script="Osma" typeface="Ebrima"/>
+        <a:font script="Phag" typeface="Phagspa"/>
+        <a:font script="Syrn" typeface="Estrangelo Edessa"/>
+        <a:font script="Syrj" typeface="Estrangelo Edessa"/>
+        <a:font script="Syre" typeface="Estrangelo Edessa"/>
+        <a:font script="Sora" typeface="Nirmala UI"/>
+        <a:font script="Tale" typeface="Microsoft Tai Le"/>
+        <a:font script="Talu" typeface="Microsoft New Tai Lue"/>
+        <a:font script="Tfng" typeface="Ebrima"/>
+      </a:majorFont>
+      <a:minorFont>
+        <a:latin typeface="Calibri" panose="020F0502020204030204"/>
+        <a:ea typeface=""/>
+        <a:cs typeface=""/>
+        <a:font script="Jpan" typeface="游ゴシック"/>
+        <a:font script="Hang" typeface="맑은 고딕"/>
+        <a:font script="Hans" typeface="等线"/>
+        <a:font script="Hant" typeface="新細明體"/>
+        <a:font script="Arab" typeface="Arial"/>
+        <a:font script="Hebr" typeface="Arial"/>
+        <a:font script="Thai" typeface="Cordia New"/>
+        <a:font script="Ethi" typeface="Nyala"/>
+        <a:font script="Beng" typeface="Vrinda"/>
+        <a:font script="Gujr" typeface="Shruti"/>
+        <a:font script="Khmr" typeface="DaunPenh"/>
+        <a:font script="Knda" typeface="Tunga"/>
+        <a:font script="Guru" typeface="Raavi"/>
+        <a:font script="Cans" typeface="Euphemia"/>
+        <a:font script="Cher" typeface="Plantagenet Cherokee"/>
+        <a:font script="Yiii" typeface="Microsoft Yi Baiti"/>
+        <a:font script="Tibt" typeface="Microsoft Himalaya"/>
+        <a:font script="Thaa" typeface="MV Boli"/>
+        <a:font script="Deva" typeface="Mangal"/>
+        <a:font script="Telu" typeface="Gautami"/>
+        <a:font script="Taml" typeface="Latha"/>
+        <a:font script="Syrc" typeface="Estrangelo Edessa"/>
+        <a:font script="Orya" typeface="Kalinga"/>
+        <a:font script="Mlym" typeface="Kartika"/>
+        <a:font script="Laoo" typeface="DokChampa"/>
+        <a:font script="Sinh" typeface="Iskoola Pota"/>
+        <a:font script="Mong" typeface="Mongolian Baiti"/>
+        <a:font script="Viet" typeface="Arial"/>
+        <a:font script="Uigh" typeface="Microsoft Uighur"/>
+        <a:font script="Geor" typeface="Sylfaen"/>
+        <a:font script="Armn" typeface="Arial"/>
+        <a:font script="Bugi" typeface="Leelawadee UI"/>
+        <a:font script="Bopo" typeface="Microsoft JhengHei"/>
+        <a:font script="Java" typeface="Javanese Text"/>
+        <a:font script="Lisu" typeface="Segoe UI"/>
+        <a:font script="Mymr" typeface="Myanmar Text"/>
+        <a:font script="Nkoo" typeface="Ebrima"/>
+        <a:font script="Olck" typeface="Nirmala UI"/>
+        <a:font script="Osma" typeface="Ebrima"/>
+        <a:font script="Phag" typeface="Phagspa"/>
+        <a:font script="Syrn" typeface="Estrangelo Edessa"/>
+        <a:font script="Syrj" typeface="Estrangelo Edessa"/>
+        <a:font script="Syre" typeface="Estrangelo Edessa"/>
+        <a:font script="Sora" typeface="Nirmala UI"/>
+        <a:font script="Tale" typeface="Microsoft Tai Le"/>
+        <a:font script="Talu" typeface="Microsoft New Tai Lue"/>
+        <a:font script="Tfng" typeface="Ebrima"/>
+      </a:minorFont>
+    </a:fontScheme>
+    <a:fmtScheme name="Office">
+      <a:fillStyleLst>
+        <a:solidFill>
+          <a:schemeClr val="phClr"/>
+        </a:solidFill>
+        <a:gradFill rotWithShape="1">
+          <a:gsLst>
+            <a:gs pos="0">
+              <a:schemeClr val="phClr">
+                <a:lumMod val="110000"/>
+                <a:satMod val="105000"/>
+                <a:tint val="67000"/>
+              </a:schemeClr>
+            </a:gs>
+            <a:gs pos="50000">
+              <a:schemeClr val="phClr">
+                <a:lumMod val="105000"/>
+                <a:satMod val="103000"/>
+                <a:tint val="73000"/>
+              </a:schemeClr>
+            </a:gs>
+            <a:gs pos="100000">
+              <a:schemeClr val="phClr">
+                <a:lumMod val="105000"/>
+                <a:satMod val="109000"/>
+                <a:tint val="81000"/>
+              </a:schemeClr>
+            </a:gs>
+          </a:gsLst>
+          <a:lin ang="5400000" scaled="0"/>
+        </a:gradFill>
+        <a:gradFill rotWithShape="1">
+          <a:gsLst>
+            <a:gs pos="0">
+              <a:schemeClr val="phClr">
+                <a:satMod val="103000"/>
+                <a:lumMod val="102000"/>
+                <a:tint val="94000"/>
+              </a:schemeClr>
+            </a:gs>
+            <a:gs pos="50000">
+              <a:schemeClr val="phClr">
+                <a:satMod val="110000"/>
+                <a:lumMod val="100000"/>
+                <a:shade val="100000"/>
+              </a:schemeClr>
+            </a:gs>
+            <a:gs pos="100000">
+              <a:schemeClr val="phClr">
+                <a:lumMod val="99000"/>
+                <a:satMod val="120000"/>
+                <a:shade val="78000"/>
+              </a:schemeClr>
+            </a:gs>
+          </a:gsLst>
+          <a:lin ang="5400000" scaled="0"/>
+        </a:gradFill>
+      </a:fillStyleLst>
+      <a:lnStyleLst>
+        <a:ln w="6350" cap="flat" cmpd="sng" algn="ctr">
+          <a:solidFill>
+            <a:schemeClr val="phClr"/>
+          </a:solidFill>
+          <a:prstDash val="solid"/>
+          <a:miter lim="800000"/>
+        </a:ln>
+        <a:ln w="12700" cap="flat" cmpd="sng" algn="ctr">
+          <a:solidFill>
+            <a:schemeClr val="phClr"/>
+          </a:solidFill>
+          <a:prstDash val="solid"/>
+          <a:miter lim="800000"/>
+        </a:ln>
+        <a:ln w="19050" cap="flat" cmpd="sng" algn="ctr">
+          <a:solidFill>
+            <a:schemeClr val="phClr"/>
+          </a:solidFill>
+          <a:prstDash val="solid"/>
+          <a:miter lim="800000"/>
+        </a:ln>
+      </a:lnStyleLst>
+      <a:effectStyleLst>
+        <a:effectStyle>
+          <a:effectLst/>
+        </a:effectStyle>
+        <a:effectStyle>
+          <a:effectLst/>
+        </a:effectStyle>
+        <a:effectStyle>
+          <a:effectLst>
+            <a:outerShdw blurRad="57150" dist="19050" dir="5400000" algn="ctr" rotWithShape="0">
+              <a:srgbClr val="000000">
+                <a:alpha val="63000"/>
+              </a:srgbClr>
+            </a:outerShdw>
+          </a:effectLst>
+        </a:effectStyle>
+      </a:effectStyleLst>
+      <a:bgFillStyleLst>
+        <a:solidFill>
+          <a:schemeClr val="phClr"/>
+        </a:solidFill>
+        <a:solidFill>
+          <a:schemeClr val="phClr">
+            <a:tint val="95000"/>
+            <a:satMod val="170000"/>
+          </a:schemeClr>
+        </a:solidFill>
+        <a:gradFill rotWithShape="1">
+          <a:gsLst>
+            <a:gs pos="0">
+              <a:schemeClr val="phClr">
+                <a:tint val="93000"/>
+                <a:satMod val="150000"/>
+                <a:shade val="98000"/>
+                <a:lumMod val="102000"/>
+              </a:schemeClr>
+            </a:gs>
+            <a:gs pos="50000">
+              <a:schemeClr val="phClr">
+                <a:tint val="98000"/>
+                <a:satMod val="130000"/>
+                <a:shade val="90000"/>
+                <a:lumMod val="103000"/>
+              </a:schemeClr>
+            </a:gs>
+            <a:gs pos="100000">
+              <a:schemeClr val="phClr">
+                <a:shade val="63000"/>
+                <a:satMod val="120000"/>
+              </a:schemeClr>
+            </a:gs>
+          </a:gsLst>
+          <a:lin ang="5400000" scaled="0"/>
+        </a:gradFill>
+      </a:bgFillStyleLst>
+    </a:fmtScheme>
+  </a:themeElements>
+  <a:objectDefaults/>
+  <a:extraClrSchemeLst/>
+  <a:extLst>
+    <a:ext uri="{05A4C25C-085E-4340-85A3-A5531E510DB2}">
+      <thm15:themeFamily xmlns:thm15="http://schemas.microsoft.com/office/thememl/2012/main" name="Office Theme" id="{62F939B6-93AF-4DB8-9C6B-D6C7DFDC589F}" vid="{4A3C46E8-61CC-4603-A589-7422A47A8E4A}"/>
+    </a:ext>
+  </a:extLst>
+</a:theme>
 </file>
</xml_diff>

<commit_message>
Append  the readme TOC.
</commit_message>
<xml_diff>
--- a/doc/DesignDoc.pptx
+++ b/doc/DesignDoc.pptx
@@ -201,7 +201,7 @@
           <a:p>
             <a:fld id="{7239669B-9393-4524-8478-58B4C4E08612}" type="datetimeFigureOut">
               <a:rPr lang="en-SG" smtClean="0"/>
-              <a:t>21/1/2022</a:t>
+              <a:t>21/3/2022</a:t>
             </a:fld>
             <a:endParaRPr lang="en-SG"/>
           </a:p>
@@ -786,7 +786,7 @@
           <a:p>
             <a:fld id="{3EE4F038-F769-451C-BBC3-FD9377DA62B8}" type="datetimeFigureOut">
               <a:rPr lang="en-SG" smtClean="0"/>
-              <a:t>21/1/2022</a:t>
+              <a:t>21/3/2022</a:t>
             </a:fld>
             <a:endParaRPr lang="en-SG"/>
           </a:p>
@@ -986,7 +986,7 @@
           <a:p>
             <a:fld id="{3EE4F038-F769-451C-BBC3-FD9377DA62B8}" type="datetimeFigureOut">
               <a:rPr lang="en-SG" smtClean="0"/>
-              <a:t>21/1/2022</a:t>
+              <a:t>21/3/2022</a:t>
             </a:fld>
             <a:endParaRPr lang="en-SG"/>
           </a:p>
@@ -1196,7 +1196,7 @@
           <a:p>
             <a:fld id="{3EE4F038-F769-451C-BBC3-FD9377DA62B8}" type="datetimeFigureOut">
               <a:rPr lang="en-SG" smtClean="0"/>
-              <a:t>21/1/2022</a:t>
+              <a:t>21/3/2022</a:t>
             </a:fld>
             <a:endParaRPr lang="en-SG"/>
           </a:p>
@@ -1396,7 +1396,7 @@
           <a:p>
             <a:fld id="{3EE4F038-F769-451C-BBC3-FD9377DA62B8}" type="datetimeFigureOut">
               <a:rPr lang="en-SG" smtClean="0"/>
-              <a:t>21/1/2022</a:t>
+              <a:t>21/3/2022</a:t>
             </a:fld>
             <a:endParaRPr lang="en-SG"/>
           </a:p>
@@ -1672,7 +1672,7 @@
           <a:p>
             <a:fld id="{3EE4F038-F769-451C-BBC3-FD9377DA62B8}" type="datetimeFigureOut">
               <a:rPr lang="en-SG" smtClean="0"/>
-              <a:t>21/1/2022</a:t>
+              <a:t>21/3/2022</a:t>
             </a:fld>
             <a:endParaRPr lang="en-SG"/>
           </a:p>
@@ -1940,7 +1940,7 @@
           <a:p>
             <a:fld id="{3EE4F038-F769-451C-BBC3-FD9377DA62B8}" type="datetimeFigureOut">
               <a:rPr lang="en-SG" smtClean="0"/>
-              <a:t>21/1/2022</a:t>
+              <a:t>21/3/2022</a:t>
             </a:fld>
             <a:endParaRPr lang="en-SG"/>
           </a:p>
@@ -2355,7 +2355,7 @@
           <a:p>
             <a:fld id="{3EE4F038-F769-451C-BBC3-FD9377DA62B8}" type="datetimeFigureOut">
               <a:rPr lang="en-SG" smtClean="0"/>
-              <a:t>21/1/2022</a:t>
+              <a:t>21/3/2022</a:t>
             </a:fld>
             <a:endParaRPr lang="en-SG"/>
           </a:p>
@@ -2497,7 +2497,7 @@
           <a:p>
             <a:fld id="{3EE4F038-F769-451C-BBC3-FD9377DA62B8}" type="datetimeFigureOut">
               <a:rPr lang="en-SG" smtClean="0"/>
-              <a:t>21/1/2022</a:t>
+              <a:t>21/3/2022</a:t>
             </a:fld>
             <a:endParaRPr lang="en-SG"/>
           </a:p>
@@ -2610,7 +2610,7 @@
           <a:p>
             <a:fld id="{3EE4F038-F769-451C-BBC3-FD9377DA62B8}" type="datetimeFigureOut">
               <a:rPr lang="en-SG" smtClean="0"/>
-              <a:t>21/1/2022</a:t>
+              <a:t>21/3/2022</a:t>
             </a:fld>
             <a:endParaRPr lang="en-SG"/>
           </a:p>
@@ -2923,7 +2923,7 @@
           <a:p>
             <a:fld id="{3EE4F038-F769-451C-BBC3-FD9377DA62B8}" type="datetimeFigureOut">
               <a:rPr lang="en-SG" smtClean="0"/>
-              <a:t>21/1/2022</a:t>
+              <a:t>21/3/2022</a:t>
             </a:fld>
             <a:endParaRPr lang="en-SG"/>
           </a:p>
@@ -3212,7 +3212,7 @@
           <a:p>
             <a:fld id="{3EE4F038-F769-451C-BBC3-FD9377DA62B8}" type="datetimeFigureOut">
               <a:rPr lang="en-SG" smtClean="0"/>
-              <a:t>21/1/2022</a:t>
+              <a:t>21/3/2022</a:t>
             </a:fld>
             <a:endParaRPr lang="en-SG"/>
           </a:p>
@@ -3455,7 +3455,7 @@
           <a:p>
             <a:fld id="{3EE4F038-F769-451C-BBC3-FD9377DA62B8}" type="datetimeFigureOut">
               <a:rPr lang="en-SG" smtClean="0"/>
-              <a:t>21/1/2022</a:t>
+              <a:t>21/3/2022</a:t>
             </a:fld>
             <a:endParaRPr lang="en-SG"/>
           </a:p>
@@ -5625,7 +5625,7 @@
         </p:nvCxnSpPr>
         <p:spPr>
           <a:xfrm>
-            <a:off x="1604378" y="3473871"/>
+            <a:off x="7769650" y="3153762"/>
             <a:ext cx="0" cy="533685"/>
           </a:xfrm>
           <a:prstGeom prst="straightConnector1">
@@ -6424,7 +6424,7 @@
         </p:nvSpPr>
         <p:spPr>
           <a:xfrm>
-            <a:off x="5364571" y="3280683"/>
+            <a:off x="11529843" y="2960574"/>
             <a:ext cx="1721071" cy="415291"/>
           </a:xfrm>
           <a:prstGeom prst="rect">

</xml_diff>

<commit_message>
update the design document and the readme file.
</commit_message>
<xml_diff>
--- a/doc/DesignDoc.pptx
+++ b/doc/DesignDoc.pptx
@@ -5,7 +5,7 @@
     <p:sldMasterId id="2147483648" r:id="rId1"/>
   </p:sldMasterIdLst>
   <p:notesMasterIdLst>
-    <p:notesMasterId r:id="rId7"/>
+    <p:notesMasterId r:id="rId9"/>
   </p:notesMasterIdLst>
   <p:sldIdLst>
     <p:sldId id="256" r:id="rId2"/>
@@ -13,6 +13,8 @@
     <p:sldId id="258" r:id="rId4"/>
     <p:sldId id="259" r:id="rId5"/>
     <p:sldId id="260" r:id="rId6"/>
+    <p:sldId id="261" r:id="rId7"/>
+    <p:sldId id="262" r:id="rId8"/>
   </p:sldIdLst>
   <p:sldSz cx="12192000" cy="6858000"/>
   <p:notesSz cx="6858000" cy="9144000"/>
@@ -201,7 +203,7 @@
           <a:p>
             <a:fld id="{7239669B-9393-4524-8478-58B4C4E08612}" type="datetimeFigureOut">
               <a:rPr lang="en-SG" smtClean="0"/>
-              <a:t>21/3/2022</a:t>
+              <a:t>10/12/2023</a:t>
             </a:fld>
             <a:endParaRPr lang="en-SG"/>
           </a:p>
@@ -786,7 +788,7 @@
           <a:p>
             <a:fld id="{3EE4F038-F769-451C-BBC3-FD9377DA62B8}" type="datetimeFigureOut">
               <a:rPr lang="en-SG" smtClean="0"/>
-              <a:t>21/3/2022</a:t>
+              <a:t>10/12/2023</a:t>
             </a:fld>
             <a:endParaRPr lang="en-SG"/>
           </a:p>
@@ -986,7 +988,7 @@
           <a:p>
             <a:fld id="{3EE4F038-F769-451C-BBC3-FD9377DA62B8}" type="datetimeFigureOut">
               <a:rPr lang="en-SG" smtClean="0"/>
-              <a:t>21/3/2022</a:t>
+              <a:t>10/12/2023</a:t>
             </a:fld>
             <a:endParaRPr lang="en-SG"/>
           </a:p>
@@ -1196,7 +1198,7 @@
           <a:p>
             <a:fld id="{3EE4F038-F769-451C-BBC3-FD9377DA62B8}" type="datetimeFigureOut">
               <a:rPr lang="en-SG" smtClean="0"/>
-              <a:t>21/3/2022</a:t>
+              <a:t>10/12/2023</a:t>
             </a:fld>
             <a:endParaRPr lang="en-SG"/>
           </a:p>
@@ -1396,7 +1398,7 @@
           <a:p>
             <a:fld id="{3EE4F038-F769-451C-BBC3-FD9377DA62B8}" type="datetimeFigureOut">
               <a:rPr lang="en-SG" smtClean="0"/>
-              <a:t>21/3/2022</a:t>
+              <a:t>10/12/2023</a:t>
             </a:fld>
             <a:endParaRPr lang="en-SG"/>
           </a:p>
@@ -1672,7 +1674,7 @@
           <a:p>
             <a:fld id="{3EE4F038-F769-451C-BBC3-FD9377DA62B8}" type="datetimeFigureOut">
               <a:rPr lang="en-SG" smtClean="0"/>
-              <a:t>21/3/2022</a:t>
+              <a:t>10/12/2023</a:t>
             </a:fld>
             <a:endParaRPr lang="en-SG"/>
           </a:p>
@@ -1940,7 +1942,7 @@
           <a:p>
             <a:fld id="{3EE4F038-F769-451C-BBC3-FD9377DA62B8}" type="datetimeFigureOut">
               <a:rPr lang="en-SG" smtClean="0"/>
-              <a:t>21/3/2022</a:t>
+              <a:t>10/12/2023</a:t>
             </a:fld>
             <a:endParaRPr lang="en-SG"/>
           </a:p>
@@ -2355,7 +2357,7 @@
           <a:p>
             <a:fld id="{3EE4F038-F769-451C-BBC3-FD9377DA62B8}" type="datetimeFigureOut">
               <a:rPr lang="en-SG" smtClean="0"/>
-              <a:t>21/3/2022</a:t>
+              <a:t>10/12/2023</a:t>
             </a:fld>
             <a:endParaRPr lang="en-SG"/>
           </a:p>
@@ -2497,7 +2499,7 @@
           <a:p>
             <a:fld id="{3EE4F038-F769-451C-BBC3-FD9377DA62B8}" type="datetimeFigureOut">
               <a:rPr lang="en-SG" smtClean="0"/>
-              <a:t>21/3/2022</a:t>
+              <a:t>10/12/2023</a:t>
             </a:fld>
             <a:endParaRPr lang="en-SG"/>
           </a:p>
@@ -2610,7 +2612,7 @@
           <a:p>
             <a:fld id="{3EE4F038-F769-451C-BBC3-FD9377DA62B8}" type="datetimeFigureOut">
               <a:rPr lang="en-SG" smtClean="0"/>
-              <a:t>21/3/2022</a:t>
+              <a:t>10/12/2023</a:t>
             </a:fld>
             <a:endParaRPr lang="en-SG"/>
           </a:p>
@@ -2923,7 +2925,7 @@
           <a:p>
             <a:fld id="{3EE4F038-F769-451C-BBC3-FD9377DA62B8}" type="datetimeFigureOut">
               <a:rPr lang="en-SG" smtClean="0"/>
-              <a:t>21/3/2022</a:t>
+              <a:t>10/12/2023</a:t>
             </a:fld>
             <a:endParaRPr lang="en-SG"/>
           </a:p>
@@ -3212,7 +3214,7 @@
           <a:p>
             <a:fld id="{3EE4F038-F769-451C-BBC3-FD9377DA62B8}" type="datetimeFigureOut">
               <a:rPr lang="en-SG" smtClean="0"/>
-              <a:t>21/3/2022</a:t>
+              <a:t>10/12/2023</a:t>
             </a:fld>
             <a:endParaRPr lang="en-SG"/>
           </a:p>
@@ -3455,7 +3457,7 @@
           <a:p>
             <a:fld id="{3EE4F038-F769-451C-BBC3-FD9377DA62B8}" type="datetimeFigureOut">
               <a:rPr lang="en-SG" smtClean="0"/>
-              <a:t>21/3/2022</a:t>
+              <a:t>10/12/2023</a:t>
             </a:fld>
             <a:endParaRPr lang="en-SG"/>
           </a:p>
@@ -5625,8 +5627,8 @@
         </p:nvCxnSpPr>
         <p:spPr>
           <a:xfrm>
-            <a:off x="7769650" y="3153762"/>
-            <a:ext cx="0" cy="533685"/>
+            <a:off x="8300002" y="2779604"/>
+            <a:ext cx="0" cy="348687"/>
           </a:xfrm>
           <a:prstGeom prst="straightConnector1">
             <a:avLst/>
@@ -5710,7 +5712,7 @@
         </p:nvSpPr>
         <p:spPr>
           <a:xfrm>
-            <a:off x="6498507" y="225848"/>
+            <a:off x="7089410" y="83678"/>
             <a:ext cx="979556" cy="553998"/>
           </a:xfrm>
           <a:prstGeom prst="rect">
@@ -5854,13 +5856,18 @@
         </p:blipFill>
         <p:spPr bwMode="auto">
           <a:xfrm>
-            <a:off x="5745879" y="225696"/>
-            <a:ext cx="745176" cy="745176"/>
+            <a:off x="5258673" y="318257"/>
+            <a:ext cx="553998" cy="553998"/>
           </a:xfrm>
           <a:prstGeom prst="rect">
             <a:avLst/>
           </a:prstGeom>
           <a:noFill/>
+          <a:ln w="9525">
+            <a:solidFill>
+              <a:schemeClr val="tx1"/>
+            </a:solidFill>
+          </a:ln>
           <a:extLst>
             <a:ext uri="{909E8E84-426E-40DD-AFC4-6F175D3DCCD1}">
               <a14:hiddenFill xmlns:a14="http://schemas.microsoft.com/office/drawing/2010/main">
@@ -5888,8 +5895,8 @@
         </p:nvCxnSpPr>
         <p:spPr>
           <a:xfrm>
-            <a:off x="6498507" y="598284"/>
-            <a:ext cx="935141" cy="0"/>
+            <a:off x="7107017" y="598284"/>
+            <a:ext cx="605312" cy="0"/>
           </a:xfrm>
           <a:prstGeom prst="straightConnector1">
             <a:avLst/>
@@ -5931,7 +5938,7 @@
         <p:spPr>
           <a:xfrm>
             <a:off x="5385947" y="1418473"/>
-            <a:ext cx="1721071" cy="415291"/>
+            <a:ext cx="1721071" cy="359283"/>
           </a:xfrm>
           <a:prstGeom prst="rect">
             <a:avLst/>
@@ -5952,16 +5959,12 @@
           <a:lstStyle/>
           <a:p>
             <a:r>
-              <a:rPr lang="en-SG" b="1" dirty="0" err="1">
+              <a:rPr lang="en-SG" sz="1600" b="1" dirty="0">
                 <a:effectLst/>
                 <a:latin typeface="Consolas" panose="020B0609020204030204" pitchFamily="49" charset="0"/>
               </a:rPr>
-              <a:t>PacketParser</a:t>
-            </a:r>
-            <a:endParaRPr lang="en-SG" b="1" dirty="0">
-              <a:effectLst/>
-              <a:latin typeface="Consolas" panose="020B0609020204030204" pitchFamily="49" charset="0"/>
-            </a:endParaRPr>
+              <a:t>Packet Parser</a:t>
+            </a:r>
           </a:p>
         </p:txBody>
       </p:sp>
@@ -5980,9 +5983,9 @@
           <p:nvPr/>
         </p:nvCxnSpPr>
         <p:spPr>
-          <a:xfrm flipH="1">
-            <a:off x="6097695" y="1871496"/>
-            <a:ext cx="3275" cy="384016"/>
+          <a:xfrm>
+            <a:off x="6305362" y="1777756"/>
+            <a:ext cx="0" cy="521859"/>
           </a:xfrm>
           <a:prstGeom prst="straightConnector1">
             <a:avLst/>
@@ -6023,8 +6026,8 @@
         </p:nvSpPr>
         <p:spPr>
           <a:xfrm>
-            <a:off x="7444791" y="216991"/>
-            <a:ext cx="3419855" cy="1938992"/>
+            <a:off x="7712329" y="336804"/>
+            <a:ext cx="3515418" cy="1938992"/>
           </a:xfrm>
           <a:prstGeom prst="rect">
             <a:avLst/>
@@ -6231,7 +6234,7 @@
         <p:spPr>
           <a:xfrm flipH="1">
             <a:off x="7107018" y="1574793"/>
-            <a:ext cx="245137" cy="0"/>
+            <a:ext cx="605311" cy="0"/>
           </a:xfrm>
           <a:prstGeom prst="straightConnector1">
             <a:avLst/>
@@ -6424,8 +6427,8 @@
         </p:nvSpPr>
         <p:spPr>
           <a:xfrm>
-            <a:off x="11529843" y="2960574"/>
-            <a:ext cx="1721071" cy="415291"/>
+            <a:off x="5395688" y="3221355"/>
+            <a:ext cx="1577909" cy="296898"/>
           </a:xfrm>
           <a:prstGeom prst="rect">
             <a:avLst/>
@@ -6446,18 +6449,12 @@
           <a:lstStyle/>
           <a:p>
             <a:r>
-              <a:rPr lang="en-US" b="1" dirty="0">
+              <a:rPr lang="en-SG" sz="1600" b="1" dirty="0">
                 <a:latin typeface="Consolas" panose="020B0609020204030204" pitchFamily="49" charset="0"/>
               </a:rPr>
-              <a:t>D</a:t>
-            </a:r>
-            <a:r>
-              <a:rPr lang="en-SG" b="1" dirty="0" err="1">
-                <a:latin typeface="Consolas" panose="020B0609020204030204" pitchFamily="49" charset="0"/>
-              </a:rPr>
-              <a:t>ataCounting</a:t>
-            </a:r>
-            <a:endParaRPr lang="en-SG" b="1" dirty="0">
+              <a:t>Data Counting</a:t>
+            </a:r>
+            <a:endParaRPr lang="en-SG" sz="1600" b="1" dirty="0">
               <a:effectLst/>
               <a:latin typeface="Consolas" panose="020B0609020204030204" pitchFamily="49" charset="0"/>
             </a:endParaRPr>
@@ -6522,7 +6519,7 @@
         </p:nvSpPr>
         <p:spPr>
           <a:xfrm>
-            <a:off x="5364571" y="3992872"/>
+            <a:off x="5445386" y="3855365"/>
             <a:ext cx="3928574" cy="1569660"/>
           </a:xfrm>
           <a:prstGeom prst="rect">
@@ -6779,7 +6776,7 @@
         </p:nvCxnSpPr>
         <p:spPr>
           <a:xfrm flipH="1">
-            <a:off x="6093815" y="3695974"/>
+            <a:off x="6093815" y="3569229"/>
             <a:ext cx="1" cy="296898"/>
           </a:xfrm>
           <a:prstGeom prst="straightConnector1">
@@ -6823,7 +6820,7 @@
         </p:nvCxnSpPr>
         <p:spPr>
           <a:xfrm flipH="1">
-            <a:off x="6100969" y="5595862"/>
+            <a:off x="6093814" y="5441341"/>
             <a:ext cx="1" cy="296898"/>
           </a:xfrm>
           <a:prstGeom prst="straightConnector1">
@@ -6865,8 +6862,8 @@
         </p:nvSpPr>
         <p:spPr>
           <a:xfrm>
-            <a:off x="5266947" y="5926090"/>
-            <a:ext cx="1840072" cy="376710"/>
+            <a:off x="5445386" y="5738239"/>
+            <a:ext cx="2052693" cy="296898"/>
           </a:xfrm>
           <a:prstGeom prst="rect">
             <a:avLst/>
@@ -6887,16 +6884,12 @@
           <a:lstStyle/>
           <a:p>
             <a:r>
-              <a:rPr lang="en-SG" b="1" dirty="0" err="1">
+              <a:rPr lang="en-SG" sz="1600" b="1" dirty="0">
                 <a:effectLst/>
                 <a:latin typeface="Consolas" panose="020B0609020204030204" pitchFamily="49" charset="0"/>
               </a:rPr>
-              <a:t>ProtocolCheker</a:t>
-            </a:r>
-            <a:endParaRPr lang="en-SG" b="1" dirty="0">
-              <a:effectLst/>
-              <a:latin typeface="Consolas" panose="020B0609020204030204" pitchFamily="49" charset="0"/>
-            </a:endParaRPr>
+              <a:t>Algorithm Checker</a:t>
+            </a:r>
           </a:p>
         </p:txBody>
       </p:sp>
@@ -6914,7 +6907,7 @@
         </p:nvSpPr>
         <p:spPr>
           <a:xfrm>
-            <a:off x="7478063" y="5683576"/>
+            <a:off x="7999689" y="5702256"/>
             <a:ext cx="3860729" cy="1077218"/>
           </a:xfrm>
           <a:prstGeom prst="rect">
@@ -7163,8 +7156,8 @@
         </p:nvCxnSpPr>
         <p:spPr>
           <a:xfrm>
-            <a:off x="7108149" y="6073736"/>
-            <a:ext cx="369914" cy="0"/>
+            <a:off x="7527372" y="6359335"/>
+            <a:ext cx="472317" cy="0"/>
           </a:xfrm>
           <a:prstGeom prst="straightConnector1">
             <a:avLst/>
@@ -7191,6 +7184,440 @@
           </a:fontRef>
         </p:style>
       </p:cxnSp>
+      <p:sp>
+        <p:nvSpPr>
+          <p:cNvPr id="2" name="TextBox 1">
+            <a:extLst>
+              <a:ext uri="{FF2B5EF4-FFF2-40B4-BE49-F238E27FC236}">
+                <a16:creationId xmlns:a16="http://schemas.microsoft.com/office/drawing/2014/main" id="{59A2B7D2-69F5-6767-76C5-173349CC1D6F}"/>
+              </a:ext>
+            </a:extLst>
+          </p:cNvPr>
+          <p:cNvSpPr txBox="1"/>
+          <p:nvPr/>
+        </p:nvSpPr>
+        <p:spPr>
+          <a:xfrm>
+            <a:off x="5838327" y="421199"/>
+            <a:ext cx="1268691" cy="310217"/>
+          </a:xfrm>
+          <a:prstGeom prst="rect">
+            <a:avLst/>
+          </a:prstGeom>
+          <a:solidFill>
+            <a:schemeClr val="bg1"/>
+          </a:solidFill>
+          <a:ln w="19050">
+            <a:solidFill>
+              <a:schemeClr val="tx1"/>
+            </a:solidFill>
+          </a:ln>
+        </p:spPr>
+        <p:txBody>
+          <a:bodyPr wrap="square" lIns="36000" tIns="36000" rIns="36000" bIns="36000" rtlCol="0">
+            <a:noAutofit/>
+          </a:bodyPr>
+          <a:lstStyle/>
+          <a:p>
+            <a:r>
+              <a:rPr lang="en-US" sz="1400" b="1" dirty="0" err="1">
+                <a:effectLst/>
+                <a:latin typeface="Consolas" panose="020B0609020204030204" pitchFamily="49" charset="0"/>
+              </a:rPr>
+              <a:t>Pcap</a:t>
+            </a:r>
+            <a:r>
+              <a:rPr lang="en-US" sz="1400" b="1" dirty="0">
+                <a:effectLst/>
+                <a:latin typeface="Consolas" panose="020B0609020204030204" pitchFamily="49" charset="0"/>
+              </a:rPr>
+              <a:t> filter </a:t>
+            </a:r>
+            <a:endParaRPr lang="en-SG" sz="1400" b="1" dirty="0">
+              <a:effectLst/>
+              <a:latin typeface="Consolas" panose="020B0609020204030204" pitchFamily="49" charset="0"/>
+            </a:endParaRPr>
+          </a:p>
+        </p:txBody>
+      </p:sp>
+      <p:sp>
+        <p:nvSpPr>
+          <p:cNvPr id="11" name="TextBox 10">
+            <a:extLst>
+              <a:ext uri="{FF2B5EF4-FFF2-40B4-BE49-F238E27FC236}">
+                <a16:creationId xmlns:a16="http://schemas.microsoft.com/office/drawing/2014/main" id="{79AA3827-BEB3-FF8F-56F7-F03A9D04BA1E}"/>
+              </a:ext>
+            </a:extLst>
+          </p:cNvPr>
+          <p:cNvSpPr txBox="1"/>
+          <p:nvPr/>
+        </p:nvSpPr>
+        <p:spPr>
+          <a:xfrm>
+            <a:off x="7999689" y="83678"/>
+            <a:ext cx="2817476" cy="276999"/>
+          </a:xfrm>
+          <a:prstGeom prst="rect">
+            <a:avLst/>
+          </a:prstGeom>
+          <a:noFill/>
+        </p:spPr>
+        <p:txBody>
+          <a:bodyPr wrap="square" rtlCol="0">
+            <a:spAutoFit/>
+          </a:bodyPr>
+          <a:lstStyle/>
+          <a:p>
+            <a:r>
+              <a:rPr lang="en-US" sz="1200" b="1" dirty="0">
+                <a:solidFill>
+                  <a:schemeClr val="accent1">
+                    <a:lumMod val="75000"/>
+                  </a:schemeClr>
+                </a:solidFill>
+              </a:rPr>
+              <a:t>Packet layer data detail information</a:t>
+            </a:r>
+            <a:endParaRPr lang="en-SG" sz="1200" b="1" dirty="0">
+              <a:solidFill>
+                <a:schemeClr val="accent1">
+                  <a:lumMod val="75000"/>
+                </a:schemeClr>
+              </a:solidFill>
+            </a:endParaRPr>
+          </a:p>
+        </p:txBody>
+      </p:sp>
+      <p:sp>
+        <p:nvSpPr>
+          <p:cNvPr id="24" name="TextBox 23">
+            <a:extLst>
+              <a:ext uri="{FF2B5EF4-FFF2-40B4-BE49-F238E27FC236}">
+                <a16:creationId xmlns:a16="http://schemas.microsoft.com/office/drawing/2014/main" id="{6FBCB3BE-B6A3-8C31-FA58-FA0BCBFCABDB}"/>
+              </a:ext>
+            </a:extLst>
+          </p:cNvPr>
+          <p:cNvSpPr txBox="1"/>
+          <p:nvPr/>
+        </p:nvSpPr>
+        <p:spPr>
+          <a:xfrm>
+            <a:off x="7190260" y="3221355"/>
+            <a:ext cx="2218167" cy="296898"/>
+          </a:xfrm>
+          <a:prstGeom prst="rect">
+            <a:avLst/>
+          </a:prstGeom>
+          <a:solidFill>
+            <a:schemeClr val="bg1"/>
+          </a:solidFill>
+          <a:ln w="19050">
+            <a:solidFill>
+              <a:schemeClr val="tx1"/>
+            </a:solidFill>
+          </a:ln>
+        </p:spPr>
+        <p:txBody>
+          <a:bodyPr wrap="square" lIns="36000" tIns="36000" rIns="36000" bIns="36000" rtlCol="0">
+            <a:noAutofit/>
+          </a:bodyPr>
+          <a:lstStyle/>
+          <a:p>
+            <a:r>
+              <a:rPr lang="en-US" sz="1600" b="1" dirty="0">
+                <a:effectLst/>
+                <a:latin typeface="Consolas" panose="020B0609020204030204" pitchFamily="49" charset="0"/>
+              </a:rPr>
+              <a:t>Data Categorization </a:t>
+            </a:r>
+            <a:endParaRPr lang="en-SG" sz="1600" b="1" dirty="0">
+              <a:effectLst/>
+              <a:latin typeface="Consolas" panose="020B0609020204030204" pitchFamily="49" charset="0"/>
+            </a:endParaRPr>
+          </a:p>
+        </p:txBody>
+      </p:sp>
+      <p:cxnSp>
+        <p:nvCxnSpPr>
+          <p:cNvPr id="25" name="Straight Arrow Connector 24">
+            <a:extLst>
+              <a:ext uri="{FF2B5EF4-FFF2-40B4-BE49-F238E27FC236}">
+                <a16:creationId xmlns:a16="http://schemas.microsoft.com/office/drawing/2014/main" id="{271AFF68-A4A6-4703-905D-2C167E6EDED4}"/>
+              </a:ext>
+            </a:extLst>
+          </p:cNvPr>
+          <p:cNvCxnSpPr>
+            <a:cxnSpLocks/>
+          </p:cNvCxnSpPr>
+          <p:nvPr/>
+        </p:nvCxnSpPr>
+        <p:spPr>
+          <a:xfrm flipH="1">
+            <a:off x="8299343" y="3546045"/>
+            <a:ext cx="1" cy="296898"/>
+          </a:xfrm>
+          <a:prstGeom prst="straightConnector1">
+            <a:avLst/>
+          </a:prstGeom>
+          <a:ln w="38100">
+            <a:solidFill>
+              <a:srgbClr val="7030A0"/>
+            </a:solidFill>
+            <a:tailEnd type="triangle"/>
+          </a:ln>
+        </p:spPr>
+        <p:style>
+          <a:lnRef idx="1">
+            <a:schemeClr val="accent1"/>
+          </a:lnRef>
+          <a:fillRef idx="0">
+            <a:schemeClr val="accent1"/>
+          </a:fillRef>
+          <a:effectRef idx="0">
+            <a:schemeClr val="accent1"/>
+          </a:effectRef>
+          <a:fontRef idx="minor">
+            <a:schemeClr val="tx1"/>
+          </a:fontRef>
+        </p:style>
+      </p:cxnSp>
+      <p:sp>
+        <p:nvSpPr>
+          <p:cNvPr id="26" name="TextBox 25">
+            <a:extLst>
+              <a:ext uri="{FF2B5EF4-FFF2-40B4-BE49-F238E27FC236}">
+                <a16:creationId xmlns:a16="http://schemas.microsoft.com/office/drawing/2014/main" id="{482B063E-CFD1-8BEF-9B9F-584840937ABD}"/>
+              </a:ext>
+            </a:extLst>
+          </p:cNvPr>
+          <p:cNvSpPr txBox="1"/>
+          <p:nvPr/>
+        </p:nvSpPr>
+        <p:spPr>
+          <a:xfrm>
+            <a:off x="5266947" y="2018332"/>
+            <a:ext cx="2817476" cy="276999"/>
+          </a:xfrm>
+          <a:prstGeom prst="rect">
+            <a:avLst/>
+          </a:prstGeom>
+          <a:noFill/>
+        </p:spPr>
+        <p:txBody>
+          <a:bodyPr wrap="square" rtlCol="0">
+            <a:spAutoFit/>
+          </a:bodyPr>
+          <a:lstStyle/>
+          <a:p>
+            <a:r>
+              <a:rPr lang="en-US" sz="1200" b="1" dirty="0">
+                <a:solidFill>
+                  <a:schemeClr val="accent1">
+                    <a:lumMod val="75000"/>
+                  </a:schemeClr>
+                </a:solidFill>
+              </a:rPr>
+              <a:t>Packet protocol detail information</a:t>
+            </a:r>
+            <a:endParaRPr lang="en-SG" sz="1200" b="1" dirty="0">
+              <a:solidFill>
+                <a:schemeClr val="accent1">
+                  <a:lumMod val="75000"/>
+                </a:schemeClr>
+              </a:solidFill>
+            </a:endParaRPr>
+          </a:p>
+        </p:txBody>
+      </p:sp>
+      <p:sp>
+        <p:nvSpPr>
+          <p:cNvPr id="28" name="TextBox 27">
+            <a:extLst>
+              <a:ext uri="{FF2B5EF4-FFF2-40B4-BE49-F238E27FC236}">
+                <a16:creationId xmlns:a16="http://schemas.microsoft.com/office/drawing/2014/main" id="{9A64D853-004A-4280-5163-2046F5BD8BD4}"/>
+              </a:ext>
+            </a:extLst>
+          </p:cNvPr>
+          <p:cNvSpPr txBox="1"/>
+          <p:nvPr/>
+        </p:nvSpPr>
+        <p:spPr>
+          <a:xfrm>
+            <a:off x="5445386" y="3588928"/>
+            <a:ext cx="3004824" cy="276999"/>
+          </a:xfrm>
+          <a:prstGeom prst="rect">
+            <a:avLst/>
+          </a:prstGeom>
+          <a:noFill/>
+        </p:spPr>
+        <p:txBody>
+          <a:bodyPr wrap="square" rtlCol="0">
+            <a:spAutoFit/>
+          </a:bodyPr>
+          <a:lstStyle/>
+          <a:p>
+            <a:r>
+              <a:rPr lang="en-US" sz="1200" b="1" dirty="0">
+                <a:solidFill>
+                  <a:schemeClr val="accent1">
+                    <a:lumMod val="75000"/>
+                  </a:schemeClr>
+                </a:solidFill>
+              </a:rPr>
+              <a:t>Communication encryption summary</a:t>
+            </a:r>
+            <a:endParaRPr lang="en-SG" sz="1200" b="1" dirty="0">
+              <a:solidFill>
+                <a:schemeClr val="accent1">
+                  <a:lumMod val="75000"/>
+                </a:schemeClr>
+              </a:solidFill>
+            </a:endParaRPr>
+          </a:p>
+        </p:txBody>
+      </p:sp>
+      <p:sp>
+        <p:nvSpPr>
+          <p:cNvPr id="30" name="TextBox 29">
+            <a:extLst>
+              <a:ext uri="{FF2B5EF4-FFF2-40B4-BE49-F238E27FC236}">
+                <a16:creationId xmlns:a16="http://schemas.microsoft.com/office/drawing/2014/main" id="{1EA18646-B8A5-8A6E-6446-36091280D72A}"/>
+              </a:ext>
+            </a:extLst>
+          </p:cNvPr>
+          <p:cNvSpPr txBox="1"/>
+          <p:nvPr/>
+        </p:nvSpPr>
+        <p:spPr>
+          <a:xfrm>
+            <a:off x="5464804" y="6309260"/>
+            <a:ext cx="2052693" cy="296898"/>
+          </a:xfrm>
+          <a:prstGeom prst="rect">
+            <a:avLst/>
+          </a:prstGeom>
+          <a:solidFill>
+            <a:schemeClr val="bg1"/>
+          </a:solidFill>
+          <a:ln w="19050">
+            <a:solidFill>
+              <a:schemeClr val="tx1"/>
+            </a:solidFill>
+          </a:ln>
+        </p:spPr>
+        <p:txBody>
+          <a:bodyPr wrap="square" lIns="36000" tIns="36000" rIns="36000" bIns="36000" rtlCol="0">
+            <a:noAutofit/>
+          </a:bodyPr>
+          <a:lstStyle/>
+          <a:p>
+            <a:r>
+              <a:rPr lang="en-US" sz="1600" b="1" dirty="0">
+                <a:effectLst/>
+                <a:latin typeface="Consolas" panose="020B0609020204030204" pitchFamily="49" charset="0"/>
+              </a:rPr>
+              <a:t>Result generator </a:t>
+            </a:r>
+            <a:endParaRPr lang="en-SG" sz="1600" b="1" dirty="0">
+              <a:effectLst/>
+              <a:latin typeface="Consolas" panose="020B0609020204030204" pitchFamily="49" charset="0"/>
+            </a:endParaRPr>
+          </a:p>
+        </p:txBody>
+      </p:sp>
+      <p:cxnSp>
+        <p:nvCxnSpPr>
+          <p:cNvPr id="31" name="Straight Arrow Connector 30">
+            <a:extLst>
+              <a:ext uri="{FF2B5EF4-FFF2-40B4-BE49-F238E27FC236}">
+                <a16:creationId xmlns:a16="http://schemas.microsoft.com/office/drawing/2014/main" id="{7E14BAF7-B04F-3178-D899-114E1FD9F5E7}"/>
+              </a:ext>
+            </a:extLst>
+          </p:cNvPr>
+          <p:cNvCxnSpPr>
+            <a:cxnSpLocks/>
+          </p:cNvCxnSpPr>
+          <p:nvPr/>
+        </p:nvCxnSpPr>
+        <p:spPr>
+          <a:xfrm flipH="1">
+            <a:off x="6093813" y="6035137"/>
+            <a:ext cx="1" cy="296898"/>
+          </a:xfrm>
+          <a:prstGeom prst="straightConnector1">
+            <a:avLst/>
+          </a:prstGeom>
+          <a:ln w="38100">
+            <a:solidFill>
+              <a:srgbClr val="7030A0"/>
+            </a:solidFill>
+            <a:tailEnd type="triangle"/>
+          </a:ln>
+        </p:spPr>
+        <p:style>
+          <a:lnRef idx="1">
+            <a:schemeClr val="accent1"/>
+          </a:lnRef>
+          <a:fillRef idx="0">
+            <a:schemeClr val="accent1"/>
+          </a:fillRef>
+          <a:effectRef idx="0">
+            <a:schemeClr val="accent1"/>
+          </a:effectRef>
+          <a:fontRef idx="minor">
+            <a:schemeClr val="tx1"/>
+          </a:fontRef>
+        </p:style>
+      </p:cxnSp>
+      <p:sp>
+        <p:nvSpPr>
+          <p:cNvPr id="34" name="TextBox 33">
+            <a:extLst>
+              <a:ext uri="{FF2B5EF4-FFF2-40B4-BE49-F238E27FC236}">
+                <a16:creationId xmlns:a16="http://schemas.microsoft.com/office/drawing/2014/main" id="{1B125351-FC17-CE60-8FFA-587FB814D957}"/>
+              </a:ext>
+            </a:extLst>
+          </p:cNvPr>
+          <p:cNvSpPr txBox="1"/>
+          <p:nvPr/>
+        </p:nvSpPr>
+        <p:spPr>
+          <a:xfrm>
+            <a:off x="7952645" y="5414560"/>
+            <a:ext cx="3658363" cy="276999"/>
+          </a:xfrm>
+          <a:prstGeom prst="rect">
+            <a:avLst/>
+          </a:prstGeom>
+          <a:noFill/>
+        </p:spPr>
+        <p:txBody>
+          <a:bodyPr wrap="square" rtlCol="0">
+            <a:spAutoFit/>
+          </a:bodyPr>
+          <a:lstStyle/>
+          <a:p>
+            <a:r>
+              <a:rPr lang="en-US" sz="1200" b="1" dirty="0">
+                <a:solidFill>
+                  <a:schemeClr val="accent1">
+                    <a:lumMod val="75000"/>
+                  </a:schemeClr>
+                </a:solidFill>
+              </a:rPr>
+              <a:t>PQC attack resistance score detail score information </a:t>
+            </a:r>
+            <a:endParaRPr lang="en-SG" sz="1200" b="1" dirty="0">
+              <a:solidFill>
+                <a:schemeClr val="accent1">
+                  <a:lumMod val="75000"/>
+                </a:schemeClr>
+              </a:solidFill>
+            </a:endParaRPr>
+          </a:p>
+        </p:txBody>
+      </p:sp>
     </p:spTree>
     <p:extLst>
       <p:ext uri="{BB962C8B-B14F-4D97-AF65-F5344CB8AC3E}">
@@ -8720,7 +9147,7 @@
         </p:nvCxnSpPr>
         <p:spPr>
           <a:xfrm rot="5400000" flipH="1" flipV="1">
-            <a:off x="4372659" y="2608057"/>
+            <a:off x="3824019" y="1721089"/>
             <a:ext cx="1989217" cy="1749949"/>
           </a:xfrm>
           <a:prstGeom prst="bentConnector3">
@@ -8782,7 +9209,7 @@
         </p:blipFill>
         <p:spPr bwMode="auto">
           <a:xfrm>
-            <a:off x="1827251" y="1608262"/>
+            <a:off x="1278611" y="721294"/>
             <a:ext cx="622998" cy="622998"/>
           </a:xfrm>
           <a:prstGeom prst="rect">
@@ -8814,7 +9241,7 @@
         </p:nvSpPr>
         <p:spPr>
           <a:xfrm>
-            <a:off x="2834727" y="1704622"/>
+            <a:off x="2286087" y="817654"/>
             <a:ext cx="1749449" cy="433370"/>
           </a:xfrm>
           <a:prstGeom prst="roundRect">
@@ -8957,7 +9384,7 @@
         </p:nvCxnSpPr>
         <p:spPr>
           <a:xfrm>
-            <a:off x="3672733" y="2137992"/>
+            <a:off x="3124093" y="1251024"/>
             <a:ext cx="0" cy="1643786"/>
           </a:xfrm>
           <a:prstGeom prst="straightConnector1">
@@ -8999,7 +9426,7 @@
         </p:nvCxnSpPr>
         <p:spPr>
           <a:xfrm>
-            <a:off x="2929092" y="2137992"/>
+            <a:off x="2380452" y="1251024"/>
             <a:ext cx="18359" cy="537475"/>
           </a:xfrm>
           <a:prstGeom prst="straightConnector1">
@@ -9041,7 +9468,7 @@
         </p:nvCxnSpPr>
         <p:spPr>
           <a:xfrm>
-            <a:off x="4453092" y="2137992"/>
+            <a:off x="3904452" y="1251024"/>
             <a:ext cx="18359" cy="537475"/>
           </a:xfrm>
           <a:prstGeom prst="straightConnector1">
@@ -9081,7 +9508,7 @@
         </p:nvSpPr>
         <p:spPr>
           <a:xfrm>
-            <a:off x="1496273" y="2706393"/>
+            <a:off x="947633" y="1819425"/>
             <a:ext cx="1596883" cy="722607"/>
           </a:xfrm>
           <a:prstGeom prst="roundRect">
@@ -9222,7 +9649,7 @@
         </p:nvSpPr>
         <p:spPr>
           <a:xfrm>
-            <a:off x="4284628" y="2706393"/>
+            <a:off x="3735988" y="1819425"/>
             <a:ext cx="1749449" cy="722606"/>
           </a:xfrm>
           <a:prstGeom prst="roundRect">
@@ -9363,7 +9790,7 @@
         </p:nvSpPr>
         <p:spPr>
           <a:xfrm>
-            <a:off x="6670751" y="2530221"/>
+            <a:off x="6122111" y="1643253"/>
             <a:ext cx="1049800" cy="537475"/>
           </a:xfrm>
           <a:prstGeom prst="cloud">
@@ -9413,7 +9840,7 @@
         </p:nvSpPr>
         <p:spPr>
           <a:xfrm>
-            <a:off x="6626385" y="3054951"/>
+            <a:off x="6077745" y="2167983"/>
             <a:ext cx="1286934" cy="578615"/>
           </a:xfrm>
           <a:prstGeom prst="flowChartMultidocument">
@@ -9466,7 +9893,7 @@
         </p:nvCxnSpPr>
         <p:spPr>
           <a:xfrm flipH="1">
-            <a:off x="6091173" y="2798959"/>
+            <a:off x="5542533" y="1911991"/>
             <a:ext cx="582834" cy="0"/>
           </a:xfrm>
           <a:prstGeom prst="straightConnector1">
@@ -9508,7 +9935,7 @@
         </p:nvCxnSpPr>
         <p:spPr>
           <a:xfrm flipH="1" flipV="1">
-            <a:off x="6091173" y="3344258"/>
+            <a:off x="5542533" y="2457290"/>
             <a:ext cx="535212" cy="1"/>
           </a:xfrm>
           <a:prstGeom prst="straightConnector1">
@@ -9547,7 +9974,7 @@
         </p:nvSpPr>
         <p:spPr>
           <a:xfrm>
-            <a:off x="2949934" y="3840419"/>
+            <a:off x="2401294" y="2953451"/>
             <a:ext cx="1521517" cy="722606"/>
           </a:xfrm>
           <a:prstGeom prst="roundRect">
@@ -9691,7 +10118,7 @@
         </p:nvCxnSpPr>
         <p:spPr>
           <a:xfrm rot="5400000">
-            <a:off x="4429041" y="3471409"/>
+            <a:off x="3880401" y="2584441"/>
             <a:ext cx="772723" cy="687902"/>
           </a:xfrm>
           <a:prstGeom prst="bentConnector2">
@@ -9730,7 +10157,7 @@
         </p:nvSpPr>
         <p:spPr>
           <a:xfrm>
-            <a:off x="5205421" y="3690026"/>
+            <a:off x="4656781" y="2803058"/>
             <a:ext cx="1017743" cy="481230"/>
           </a:xfrm>
           <a:prstGeom prst="rect">
@@ -9773,7 +10200,7 @@
         </p:nvCxnSpPr>
         <p:spPr>
           <a:xfrm flipV="1">
-            <a:off x="3093156" y="3067696"/>
+            <a:off x="2544516" y="2180728"/>
             <a:ext cx="1191472" cy="1"/>
           </a:xfrm>
           <a:prstGeom prst="straightConnector1">
@@ -9812,7 +10239,7 @@
         </p:nvSpPr>
         <p:spPr>
           <a:xfrm>
-            <a:off x="3116696" y="2821378"/>
+            <a:off x="2568056" y="1934410"/>
             <a:ext cx="1017743" cy="481230"/>
           </a:xfrm>
           <a:prstGeom prst="rect">
@@ -9853,7 +10280,7 @@
         </p:nvCxnSpPr>
         <p:spPr>
           <a:xfrm>
-            <a:off x="2266841" y="3473441"/>
+            <a:off x="1718201" y="2586473"/>
             <a:ext cx="16209" cy="1730737"/>
           </a:xfrm>
           <a:prstGeom prst="straightConnector1">
@@ -9895,7 +10322,7 @@
         </p:nvCxnSpPr>
         <p:spPr>
           <a:xfrm flipH="1" flipV="1">
-            <a:off x="2262031" y="4050683"/>
+            <a:off x="1713391" y="3163715"/>
             <a:ext cx="667061" cy="1"/>
           </a:xfrm>
           <a:prstGeom prst="straightConnector1">
@@ -9934,7 +10361,7 @@
         </p:nvSpPr>
         <p:spPr>
           <a:xfrm>
-            <a:off x="1719071" y="3796161"/>
+            <a:off x="1170431" y="2909193"/>
             <a:ext cx="1285349" cy="295011"/>
           </a:xfrm>
           <a:prstGeom prst="rect">
@@ -9974,7 +10401,7 @@
         </p:nvCxnSpPr>
         <p:spPr>
           <a:xfrm flipH="1" flipV="1">
-            <a:off x="2268538" y="4383705"/>
+            <a:off x="1719898" y="3496737"/>
             <a:ext cx="667061" cy="1"/>
           </a:xfrm>
           <a:prstGeom prst="straightConnector1">
@@ -10016,7 +10443,7 @@
         </p:nvCxnSpPr>
         <p:spPr>
           <a:xfrm rot="5400000">
-            <a:off x="2843352" y="3988216"/>
+            <a:off x="2294712" y="3101248"/>
             <a:ext cx="292533" cy="1442151"/>
           </a:xfrm>
           <a:prstGeom prst="bentConnector2">
@@ -10055,7 +10482,7 @@
         </p:nvSpPr>
         <p:spPr>
           <a:xfrm>
-            <a:off x="930747" y="4144949"/>
+            <a:off x="382107" y="3257981"/>
             <a:ext cx="2027429" cy="395856"/>
           </a:xfrm>
           <a:prstGeom prst="rect">
@@ -10093,7 +10520,7 @@
         </p:nvSpPr>
         <p:spPr>
           <a:xfrm>
-            <a:off x="1507786" y="4602772"/>
+            <a:off x="959146" y="3715804"/>
             <a:ext cx="1855349" cy="297227"/>
           </a:xfrm>
           <a:prstGeom prst="rect">
@@ -10133,7 +10560,7 @@
         </p:nvCxnSpPr>
         <p:spPr>
           <a:xfrm flipH="1">
-            <a:off x="3688892" y="2399071"/>
+            <a:off x="3140252" y="1512103"/>
             <a:ext cx="2111938" cy="0"/>
           </a:xfrm>
           <a:prstGeom prst="straightConnector1">
@@ -10172,7 +10599,7 @@
         </p:nvSpPr>
         <p:spPr>
           <a:xfrm>
-            <a:off x="5813733" y="2124706"/>
+            <a:off x="5265093" y="1237738"/>
             <a:ext cx="857018" cy="363716"/>
           </a:xfrm>
           <a:prstGeom prst="flowChartMagneticDisk">
@@ -10222,7 +10649,7 @@
         </p:nvSpPr>
         <p:spPr>
           <a:xfrm>
-            <a:off x="3779628" y="2157950"/>
+            <a:off x="3230988" y="1270982"/>
             <a:ext cx="2102768" cy="297227"/>
           </a:xfrm>
           <a:prstGeom prst="rect">
@@ -10260,7 +10687,7 @@
         </p:nvSpPr>
         <p:spPr>
           <a:xfrm>
-            <a:off x="4938758" y="4478987"/>
+            <a:off x="4390118" y="3592019"/>
             <a:ext cx="1749949" cy="273721"/>
           </a:xfrm>
           <a:prstGeom prst="rect">
@@ -10298,7 +10725,7 @@
         </p:nvSpPr>
         <p:spPr>
           <a:xfrm>
-            <a:off x="1719071" y="5204178"/>
+            <a:off x="1170431" y="4317210"/>
             <a:ext cx="1173367" cy="420869"/>
           </a:xfrm>
           <a:prstGeom prst="roundRect">
@@ -10449,7 +10876,7 @@
         </p:nvCxnSpPr>
         <p:spPr>
           <a:xfrm>
-            <a:off x="2450249" y="1919761"/>
+            <a:off x="1901609" y="1032793"/>
             <a:ext cx="384478" cy="1546"/>
           </a:xfrm>
           <a:prstGeom prst="straightConnector1">
@@ -10479,6 +10906,3321 @@
     <p:extLst>
       <p:ext uri="{BB962C8B-B14F-4D97-AF65-F5344CB8AC3E}">
         <p14:creationId xmlns:p14="http://schemas.microsoft.com/office/powerpoint/2010/main" val="3386787923"/>
+      </p:ext>
+    </p:extLst>
+  </p:cSld>
+  <p:clrMapOvr>
+    <a:masterClrMapping/>
+  </p:clrMapOvr>
+</p:sld>
+</file>
+
+<file path=ppt/slides/slide6.xml><?xml version="1.0" encoding="utf-8"?>
+<p:sld xmlns:a="http://schemas.openxmlformats.org/drawingml/2006/main" xmlns:r="http://schemas.openxmlformats.org/officeDocument/2006/relationships" xmlns:p="http://schemas.openxmlformats.org/presentationml/2006/main">
+  <p:cSld>
+    <p:spTree>
+      <p:nvGrpSpPr>
+        <p:cNvPr id="1" name=""/>
+        <p:cNvGrpSpPr/>
+        <p:nvPr/>
+      </p:nvGrpSpPr>
+      <p:grpSpPr>
+        <a:xfrm>
+          <a:off x="0" y="0"/>
+          <a:ext cx="0" cy="0"/>
+          <a:chOff x="0" y="0"/>
+          <a:chExt cx="0" cy="0"/>
+        </a:xfrm>
+      </p:grpSpPr>
+      <p:sp>
+        <p:nvSpPr>
+          <p:cNvPr id="4" name="Rectangle 3">
+            <a:extLst>
+              <a:ext uri="{FF2B5EF4-FFF2-40B4-BE49-F238E27FC236}">
+                <a16:creationId xmlns:a16="http://schemas.microsoft.com/office/drawing/2014/main" id="{876365D6-ED77-D9CC-2AC9-B87B19097D7D}"/>
+              </a:ext>
+            </a:extLst>
+          </p:cNvPr>
+          <p:cNvSpPr/>
+          <p:nvPr/>
+        </p:nvSpPr>
+        <p:spPr>
+          <a:xfrm>
+            <a:off x="2096641" y="1010364"/>
+            <a:ext cx="1023748" cy="279253"/>
+          </a:xfrm>
+          <a:prstGeom prst="rect">
+            <a:avLst/>
+          </a:prstGeom>
+          <a:solidFill>
+            <a:schemeClr val="accent6">
+              <a:lumMod val="75000"/>
+            </a:schemeClr>
+          </a:solidFill>
+        </p:spPr>
+        <p:style>
+          <a:lnRef idx="2">
+            <a:schemeClr val="accent1">
+              <a:shade val="50000"/>
+            </a:schemeClr>
+          </a:lnRef>
+          <a:fillRef idx="1">
+            <a:schemeClr val="accent1"/>
+          </a:fillRef>
+          <a:effectRef idx="0">
+            <a:schemeClr val="accent1"/>
+          </a:effectRef>
+          <a:fontRef idx="minor">
+            <a:schemeClr val="lt1"/>
+          </a:fontRef>
+        </p:style>
+        <p:txBody>
+          <a:bodyPr rtlCol="0" anchor="ctr"/>
+          <a:lstStyle/>
+          <a:p>
+            <a:r>
+              <a:rPr lang="en-US" sz="1200" b="1" dirty="0"/>
+              <a:t>Program </a:t>
+            </a:r>
+            <a:r>
+              <a:rPr lang="en-US" sz="1200" b="1" dirty="0" err="1"/>
+              <a:t>init</a:t>
+            </a:r>
+            <a:endParaRPr lang="en-SG" sz="1200" b="1" dirty="0"/>
+          </a:p>
+        </p:txBody>
+      </p:sp>
+      <p:cxnSp>
+        <p:nvCxnSpPr>
+          <p:cNvPr id="5" name="Straight Arrow Connector 4">
+            <a:extLst>
+              <a:ext uri="{FF2B5EF4-FFF2-40B4-BE49-F238E27FC236}">
+                <a16:creationId xmlns:a16="http://schemas.microsoft.com/office/drawing/2014/main" id="{D19CACB3-1947-DD6D-5D1D-35F0C8CF3CE1}"/>
+              </a:ext>
+            </a:extLst>
+          </p:cNvPr>
+          <p:cNvCxnSpPr>
+            <a:cxnSpLocks/>
+            <a:stCxn id="4" idx="2"/>
+          </p:cNvCxnSpPr>
+          <p:nvPr/>
+        </p:nvCxnSpPr>
+        <p:spPr>
+          <a:xfrm>
+            <a:off x="2608515" y="1289617"/>
+            <a:ext cx="0" cy="939947"/>
+          </a:xfrm>
+          <a:prstGeom prst="straightConnector1">
+            <a:avLst/>
+          </a:prstGeom>
+          <a:ln>
+            <a:solidFill>
+              <a:schemeClr val="accent6">
+                <a:lumMod val="50000"/>
+              </a:schemeClr>
+            </a:solidFill>
+            <a:tailEnd type="triangle"/>
+          </a:ln>
+        </p:spPr>
+        <p:style>
+          <a:lnRef idx="1">
+            <a:schemeClr val="accent1"/>
+          </a:lnRef>
+          <a:fillRef idx="0">
+            <a:schemeClr val="accent1"/>
+          </a:fillRef>
+          <a:effectRef idx="0">
+            <a:schemeClr val="accent1"/>
+          </a:effectRef>
+          <a:fontRef idx="minor">
+            <a:schemeClr val="tx1"/>
+          </a:fontRef>
+        </p:style>
+      </p:cxnSp>
+      <p:sp>
+        <p:nvSpPr>
+          <p:cNvPr id="6" name="TextBox 5">
+            <a:extLst>
+              <a:ext uri="{FF2B5EF4-FFF2-40B4-BE49-F238E27FC236}">
+                <a16:creationId xmlns:a16="http://schemas.microsoft.com/office/drawing/2014/main" id="{B2B6C0D1-59E9-D5DC-F910-B778DA42B1DC}"/>
+              </a:ext>
+            </a:extLst>
+          </p:cNvPr>
+          <p:cNvSpPr txBox="1"/>
+          <p:nvPr/>
+        </p:nvSpPr>
+        <p:spPr>
+          <a:xfrm>
+            <a:off x="2230527" y="1512368"/>
+            <a:ext cx="1023748" cy="276999"/>
+          </a:xfrm>
+          <a:prstGeom prst="rect">
+            <a:avLst/>
+          </a:prstGeom>
+          <a:noFill/>
+        </p:spPr>
+        <p:txBody>
+          <a:bodyPr wrap="square" rtlCol="0">
+            <a:spAutoFit/>
+          </a:bodyPr>
+          <a:lstStyle/>
+          <a:p>
+            <a:r>
+              <a:rPr lang="en-SG" sz="1200" b="1" dirty="0">
+                <a:solidFill>
+                  <a:schemeClr val="accent6">
+                    <a:lumMod val="75000"/>
+                  </a:schemeClr>
+                </a:solidFill>
+              </a:rPr>
+              <a:t>Main thread</a:t>
+            </a:r>
+          </a:p>
+        </p:txBody>
+      </p:sp>
+      <p:sp>
+        <p:nvSpPr>
+          <p:cNvPr id="8" name="Rectangle 7">
+            <a:extLst>
+              <a:ext uri="{FF2B5EF4-FFF2-40B4-BE49-F238E27FC236}">
+                <a16:creationId xmlns:a16="http://schemas.microsoft.com/office/drawing/2014/main" id="{70C58D5A-D77F-ABBB-C79F-86377D7FE708}"/>
+              </a:ext>
+            </a:extLst>
+          </p:cNvPr>
+          <p:cNvSpPr/>
+          <p:nvPr/>
+        </p:nvSpPr>
+        <p:spPr>
+          <a:xfrm>
+            <a:off x="2020977" y="2274728"/>
+            <a:ext cx="1367184" cy="593579"/>
+          </a:xfrm>
+          <a:prstGeom prst="rect">
+            <a:avLst/>
+          </a:prstGeom>
+          <a:solidFill>
+            <a:schemeClr val="accent6">
+              <a:lumMod val="75000"/>
+            </a:schemeClr>
+          </a:solidFill>
+        </p:spPr>
+        <p:style>
+          <a:lnRef idx="2">
+            <a:schemeClr val="accent1">
+              <a:shade val="50000"/>
+            </a:schemeClr>
+          </a:lnRef>
+          <a:fillRef idx="1">
+            <a:schemeClr val="accent1"/>
+          </a:fillRef>
+          <a:effectRef idx="0">
+            <a:schemeClr val="accent1"/>
+          </a:effectRef>
+          <a:fontRef idx="minor">
+            <a:schemeClr val="lt1"/>
+          </a:fontRef>
+        </p:style>
+        <p:txBody>
+          <a:bodyPr rtlCol="0" anchor="ctr"/>
+          <a:lstStyle/>
+          <a:p>
+            <a:r>
+              <a:rPr lang="en-US" sz="1200" b="1" dirty="0"/>
+              <a:t>Network PQC Attack Resistance Evaluator  UI</a:t>
+            </a:r>
+            <a:endParaRPr lang="en-SG" sz="1200" b="1" dirty="0"/>
+          </a:p>
+        </p:txBody>
+      </p:sp>
+      <p:cxnSp>
+        <p:nvCxnSpPr>
+          <p:cNvPr id="9" name="Straight Arrow Connector 8">
+            <a:extLst>
+              <a:ext uri="{FF2B5EF4-FFF2-40B4-BE49-F238E27FC236}">
+                <a16:creationId xmlns:a16="http://schemas.microsoft.com/office/drawing/2014/main" id="{47F36648-FE61-A1BC-CED8-6CCBDD50A718}"/>
+              </a:ext>
+            </a:extLst>
+          </p:cNvPr>
+          <p:cNvCxnSpPr>
+            <a:cxnSpLocks/>
+          </p:cNvCxnSpPr>
+          <p:nvPr/>
+        </p:nvCxnSpPr>
+        <p:spPr>
+          <a:xfrm>
+            <a:off x="2608515" y="2868307"/>
+            <a:ext cx="0" cy="939947"/>
+          </a:xfrm>
+          <a:prstGeom prst="straightConnector1">
+            <a:avLst/>
+          </a:prstGeom>
+          <a:ln>
+            <a:solidFill>
+              <a:schemeClr val="accent6">
+                <a:lumMod val="50000"/>
+              </a:schemeClr>
+            </a:solidFill>
+            <a:tailEnd type="triangle"/>
+          </a:ln>
+        </p:spPr>
+        <p:style>
+          <a:lnRef idx="1">
+            <a:schemeClr val="accent1"/>
+          </a:lnRef>
+          <a:fillRef idx="0">
+            <a:schemeClr val="accent1"/>
+          </a:fillRef>
+          <a:effectRef idx="0">
+            <a:schemeClr val="accent1"/>
+          </a:effectRef>
+          <a:fontRef idx="minor">
+            <a:schemeClr val="tx1"/>
+          </a:fontRef>
+        </p:style>
+      </p:cxnSp>
+      <p:sp>
+        <p:nvSpPr>
+          <p:cNvPr id="10" name="TextBox 9">
+            <a:extLst>
+              <a:ext uri="{FF2B5EF4-FFF2-40B4-BE49-F238E27FC236}">
+                <a16:creationId xmlns:a16="http://schemas.microsoft.com/office/drawing/2014/main" id="{1DD7F7AC-36EA-7D66-AE0A-DD303F4CD439}"/>
+              </a:ext>
+            </a:extLst>
+          </p:cNvPr>
+          <p:cNvSpPr txBox="1"/>
+          <p:nvPr/>
+        </p:nvSpPr>
+        <p:spPr>
+          <a:xfrm>
+            <a:off x="2164817" y="3122835"/>
+            <a:ext cx="1155165" cy="461665"/>
+          </a:xfrm>
+          <a:prstGeom prst="rect">
+            <a:avLst/>
+          </a:prstGeom>
+          <a:noFill/>
+        </p:spPr>
+        <p:txBody>
+          <a:bodyPr wrap="square" rtlCol="0">
+            <a:spAutoFit/>
+          </a:bodyPr>
+          <a:lstStyle/>
+          <a:p>
+            <a:r>
+              <a:rPr lang="en-SG" sz="1200" b="1" dirty="0">
+                <a:solidFill>
+                  <a:schemeClr val="accent6">
+                    <a:lumMod val="75000"/>
+                  </a:schemeClr>
+                </a:solidFill>
+              </a:rPr>
+              <a:t>User interface thread</a:t>
+            </a:r>
+          </a:p>
+        </p:txBody>
+      </p:sp>
+      <p:sp>
+        <p:nvSpPr>
+          <p:cNvPr id="11" name="Rectangle 10">
+            <a:extLst>
+              <a:ext uri="{FF2B5EF4-FFF2-40B4-BE49-F238E27FC236}">
+                <a16:creationId xmlns:a16="http://schemas.microsoft.com/office/drawing/2014/main" id="{BC53F59E-C60F-D0F6-9A9E-79730E63F44E}"/>
+              </a:ext>
+            </a:extLst>
+          </p:cNvPr>
+          <p:cNvSpPr/>
+          <p:nvPr/>
+        </p:nvSpPr>
+        <p:spPr>
+          <a:xfrm>
+            <a:off x="2058807" y="3867133"/>
+            <a:ext cx="1367183" cy="376534"/>
+          </a:xfrm>
+          <a:prstGeom prst="rect">
+            <a:avLst/>
+          </a:prstGeom>
+          <a:noFill/>
+          <a:ln w="19050">
+            <a:solidFill>
+              <a:schemeClr val="tx1"/>
+            </a:solidFill>
+            <a:prstDash val="sysDash"/>
+          </a:ln>
+        </p:spPr>
+        <p:style>
+          <a:lnRef idx="2">
+            <a:schemeClr val="accent1">
+              <a:shade val="50000"/>
+            </a:schemeClr>
+          </a:lnRef>
+          <a:fillRef idx="1">
+            <a:schemeClr val="accent1"/>
+          </a:fillRef>
+          <a:effectRef idx="0">
+            <a:schemeClr val="accent1"/>
+          </a:effectRef>
+          <a:fontRef idx="minor">
+            <a:schemeClr val="lt1"/>
+          </a:fontRef>
+        </p:style>
+        <p:txBody>
+          <a:bodyPr rtlCol="0" anchor="ctr"/>
+          <a:lstStyle/>
+          <a:p>
+            <a:r>
+              <a:rPr lang="en-US" sz="1200" b="1" dirty="0">
+                <a:solidFill>
+                  <a:schemeClr val="tx1"/>
+                </a:solidFill>
+              </a:rPr>
+              <a:t>User action handler functions</a:t>
+            </a:r>
+            <a:endParaRPr lang="en-SG" sz="1200" b="1" dirty="0">
+              <a:solidFill>
+                <a:schemeClr val="tx1"/>
+              </a:solidFill>
+            </a:endParaRPr>
+          </a:p>
+        </p:txBody>
+      </p:sp>
+      <p:sp>
+        <p:nvSpPr>
+          <p:cNvPr id="13" name="Rectangle 12">
+            <a:extLst>
+              <a:ext uri="{FF2B5EF4-FFF2-40B4-BE49-F238E27FC236}">
+                <a16:creationId xmlns:a16="http://schemas.microsoft.com/office/drawing/2014/main" id="{C1D902E4-CDB0-C44E-EE4E-9374414F7D7F}"/>
+              </a:ext>
+            </a:extLst>
+          </p:cNvPr>
+          <p:cNvSpPr/>
+          <p:nvPr/>
+        </p:nvSpPr>
+        <p:spPr>
+          <a:xfrm>
+            <a:off x="1950253" y="5548311"/>
+            <a:ext cx="1233298" cy="376534"/>
+          </a:xfrm>
+          <a:prstGeom prst="rect">
+            <a:avLst/>
+          </a:prstGeom>
+          <a:solidFill>
+            <a:schemeClr val="accent6">
+              <a:lumMod val="75000"/>
+            </a:schemeClr>
+          </a:solidFill>
+        </p:spPr>
+        <p:style>
+          <a:lnRef idx="2">
+            <a:schemeClr val="accent1">
+              <a:shade val="50000"/>
+            </a:schemeClr>
+          </a:lnRef>
+          <a:fillRef idx="1">
+            <a:schemeClr val="accent1"/>
+          </a:fillRef>
+          <a:effectRef idx="0">
+            <a:schemeClr val="accent1"/>
+          </a:effectRef>
+          <a:fontRef idx="minor">
+            <a:schemeClr val="lt1"/>
+          </a:fontRef>
+        </p:style>
+        <p:txBody>
+          <a:bodyPr rtlCol="0" anchor="ctr"/>
+          <a:lstStyle/>
+          <a:p>
+            <a:r>
+              <a:rPr lang="en-US" sz="1200" b="1" dirty="0"/>
+              <a:t>Evaluation Result Display </a:t>
+            </a:r>
+            <a:endParaRPr lang="en-SG" sz="1200" b="1" dirty="0"/>
+          </a:p>
+        </p:txBody>
+      </p:sp>
+      <p:cxnSp>
+        <p:nvCxnSpPr>
+          <p:cNvPr id="14" name="Straight Arrow Connector 13">
+            <a:extLst>
+              <a:ext uri="{FF2B5EF4-FFF2-40B4-BE49-F238E27FC236}">
+                <a16:creationId xmlns:a16="http://schemas.microsoft.com/office/drawing/2014/main" id="{8992E5A4-9756-F6D5-C6D6-71910F0F85A3}"/>
+              </a:ext>
+            </a:extLst>
+          </p:cNvPr>
+          <p:cNvCxnSpPr>
+            <a:cxnSpLocks/>
+            <a:endCxn id="13" idx="0"/>
+          </p:cNvCxnSpPr>
+          <p:nvPr/>
+        </p:nvCxnSpPr>
+        <p:spPr>
+          <a:xfrm>
+            <a:off x="2566902" y="4243667"/>
+            <a:ext cx="0" cy="1304644"/>
+          </a:xfrm>
+          <a:prstGeom prst="straightConnector1">
+            <a:avLst/>
+          </a:prstGeom>
+          <a:ln>
+            <a:solidFill>
+              <a:schemeClr val="accent6">
+                <a:lumMod val="50000"/>
+              </a:schemeClr>
+            </a:solidFill>
+            <a:tailEnd type="triangle"/>
+          </a:ln>
+        </p:spPr>
+        <p:style>
+          <a:lnRef idx="1">
+            <a:schemeClr val="accent1"/>
+          </a:lnRef>
+          <a:fillRef idx="0">
+            <a:schemeClr val="accent1"/>
+          </a:fillRef>
+          <a:effectRef idx="0">
+            <a:schemeClr val="accent1"/>
+          </a:effectRef>
+          <a:fontRef idx="minor">
+            <a:schemeClr val="tx1"/>
+          </a:fontRef>
+        </p:style>
+      </p:cxnSp>
+      <p:pic>
+        <p:nvPicPr>
+          <p:cNvPr id="17" name="Picture 16">
+            <a:extLst>
+              <a:ext uri="{FF2B5EF4-FFF2-40B4-BE49-F238E27FC236}">
+                <a16:creationId xmlns:a16="http://schemas.microsoft.com/office/drawing/2014/main" id="{20088232-AAD2-CD1B-8603-ECB8CA558B49}"/>
+              </a:ext>
+            </a:extLst>
+          </p:cNvPr>
+          <p:cNvPicPr>
+            <a:picLocks noChangeAspect="1"/>
+          </p:cNvPicPr>
+          <p:nvPr/>
+        </p:nvPicPr>
+        <p:blipFill>
+          <a:blip r:embed="rId2"/>
+          <a:stretch>
+            <a:fillRect/>
+          </a:stretch>
+        </p:blipFill>
+        <p:spPr>
+          <a:xfrm>
+            <a:off x="7393664" y="1961370"/>
+            <a:ext cx="386965" cy="378553"/>
+          </a:xfrm>
+          <a:prstGeom prst="rect">
+            <a:avLst/>
+          </a:prstGeom>
+        </p:spPr>
+      </p:pic>
+      <p:sp>
+        <p:nvSpPr>
+          <p:cNvPr id="18" name="Flowchart: Magnetic Disk 17">
+            <a:extLst>
+              <a:ext uri="{FF2B5EF4-FFF2-40B4-BE49-F238E27FC236}">
+                <a16:creationId xmlns:a16="http://schemas.microsoft.com/office/drawing/2014/main" id="{8C173A79-5D8A-3481-6FC7-AB70ED495966}"/>
+              </a:ext>
+            </a:extLst>
+          </p:cNvPr>
+          <p:cNvSpPr/>
+          <p:nvPr/>
+        </p:nvSpPr>
+        <p:spPr>
+          <a:xfrm>
+            <a:off x="4743736" y="538473"/>
+            <a:ext cx="686537" cy="360934"/>
+          </a:xfrm>
+          <a:prstGeom prst="flowChartMagneticDisk">
+            <a:avLst/>
+          </a:prstGeom>
+        </p:spPr>
+        <p:style>
+          <a:lnRef idx="2">
+            <a:schemeClr val="accent1">
+              <a:shade val="50000"/>
+            </a:schemeClr>
+          </a:lnRef>
+          <a:fillRef idx="1">
+            <a:schemeClr val="accent1"/>
+          </a:fillRef>
+          <a:effectRef idx="0">
+            <a:schemeClr val="accent1"/>
+          </a:effectRef>
+          <a:fontRef idx="minor">
+            <a:schemeClr val="lt1"/>
+          </a:fontRef>
+        </p:style>
+        <p:txBody>
+          <a:bodyPr rtlCol="0" anchor="ctr"/>
+          <a:lstStyle/>
+          <a:p>
+            <a:pPr algn="ctr"/>
+            <a:r>
+              <a:rPr lang="en-US" sz="900" b="1" dirty="0"/>
+              <a:t>Database</a:t>
+            </a:r>
+            <a:endParaRPr lang="en-SG" sz="900" b="1" dirty="0"/>
+          </a:p>
+        </p:txBody>
+      </p:sp>
+      <p:cxnSp>
+        <p:nvCxnSpPr>
+          <p:cNvPr id="19" name="Connector: Elbow 18">
+            <a:extLst>
+              <a:ext uri="{FF2B5EF4-FFF2-40B4-BE49-F238E27FC236}">
+                <a16:creationId xmlns:a16="http://schemas.microsoft.com/office/drawing/2014/main" id="{59C4A7D7-104A-677B-C8C0-5D8D57D9EF81}"/>
+              </a:ext>
+            </a:extLst>
+          </p:cNvPr>
+          <p:cNvCxnSpPr>
+            <a:cxnSpLocks/>
+            <a:stCxn id="4" idx="3"/>
+            <a:endCxn id="22" idx="0"/>
+          </p:cNvCxnSpPr>
+          <p:nvPr/>
+        </p:nvCxnSpPr>
+        <p:spPr>
+          <a:xfrm>
+            <a:off x="3120389" y="1149991"/>
+            <a:ext cx="1396344" cy="1117860"/>
+          </a:xfrm>
+          <a:prstGeom prst="bentConnector2">
+            <a:avLst/>
+          </a:prstGeom>
+          <a:ln>
+            <a:tailEnd type="triangle"/>
+          </a:ln>
+        </p:spPr>
+        <p:style>
+          <a:lnRef idx="1">
+            <a:schemeClr val="dk1"/>
+          </a:lnRef>
+          <a:fillRef idx="0">
+            <a:schemeClr val="dk1"/>
+          </a:fillRef>
+          <a:effectRef idx="0">
+            <a:schemeClr val="dk1"/>
+          </a:effectRef>
+          <a:fontRef idx="minor">
+            <a:schemeClr val="tx1"/>
+          </a:fontRef>
+        </p:style>
+      </p:cxnSp>
+      <p:sp>
+        <p:nvSpPr>
+          <p:cNvPr id="22" name="Rectangle 21">
+            <a:extLst>
+              <a:ext uri="{FF2B5EF4-FFF2-40B4-BE49-F238E27FC236}">
+                <a16:creationId xmlns:a16="http://schemas.microsoft.com/office/drawing/2014/main" id="{5371E4DF-273C-6C9B-2B38-1E4AE1F91F92}"/>
+              </a:ext>
+            </a:extLst>
+          </p:cNvPr>
+          <p:cNvSpPr/>
+          <p:nvPr/>
+        </p:nvSpPr>
+        <p:spPr>
+          <a:xfrm>
+            <a:off x="3833141" y="2267851"/>
+            <a:ext cx="1367184" cy="454014"/>
+          </a:xfrm>
+          <a:prstGeom prst="rect">
+            <a:avLst/>
+          </a:prstGeom>
+          <a:solidFill>
+            <a:schemeClr val="accent6">
+              <a:lumMod val="75000"/>
+            </a:schemeClr>
+          </a:solidFill>
+        </p:spPr>
+        <p:style>
+          <a:lnRef idx="2">
+            <a:schemeClr val="accent1">
+              <a:shade val="50000"/>
+            </a:schemeClr>
+          </a:lnRef>
+          <a:fillRef idx="1">
+            <a:schemeClr val="accent1"/>
+          </a:fillRef>
+          <a:effectRef idx="0">
+            <a:schemeClr val="accent1"/>
+          </a:effectRef>
+          <a:fontRef idx="minor">
+            <a:schemeClr val="lt1"/>
+          </a:fontRef>
+        </p:style>
+        <p:txBody>
+          <a:bodyPr rtlCol="0" anchor="ctr"/>
+          <a:lstStyle/>
+          <a:p>
+            <a:r>
+              <a:rPr lang="en-US" sz="1200" b="1" dirty="0"/>
+              <a:t>Packet encryption protocol evaluator </a:t>
+            </a:r>
+            <a:endParaRPr lang="en-SG" sz="1200" b="1" dirty="0"/>
+          </a:p>
+        </p:txBody>
+      </p:sp>
+      <p:sp>
+        <p:nvSpPr>
+          <p:cNvPr id="26" name="TextBox 25">
+            <a:extLst>
+              <a:ext uri="{FF2B5EF4-FFF2-40B4-BE49-F238E27FC236}">
+                <a16:creationId xmlns:a16="http://schemas.microsoft.com/office/drawing/2014/main" id="{6EF15A9E-5905-FB8E-C4E1-618DF35D798A}"/>
+              </a:ext>
+            </a:extLst>
+          </p:cNvPr>
+          <p:cNvSpPr txBox="1"/>
+          <p:nvPr/>
+        </p:nvSpPr>
+        <p:spPr>
+          <a:xfrm>
+            <a:off x="4063257" y="1475947"/>
+            <a:ext cx="1023748" cy="461665"/>
+          </a:xfrm>
+          <a:prstGeom prst="rect">
+            <a:avLst/>
+          </a:prstGeom>
+          <a:noFill/>
+        </p:spPr>
+        <p:txBody>
+          <a:bodyPr wrap="square" rtlCol="0">
+            <a:spAutoFit/>
+          </a:bodyPr>
+          <a:lstStyle/>
+          <a:p>
+            <a:r>
+              <a:rPr lang="en-SG" sz="1200" b="1" dirty="0">
+                <a:solidFill>
+                  <a:schemeClr val="accent6">
+                    <a:lumMod val="75000"/>
+                  </a:schemeClr>
+                </a:solidFill>
+              </a:rPr>
+              <a:t>Evaluation thread</a:t>
+            </a:r>
+          </a:p>
+        </p:txBody>
+      </p:sp>
+      <p:cxnSp>
+        <p:nvCxnSpPr>
+          <p:cNvPr id="27" name="Connector: Elbow 26">
+            <a:extLst>
+              <a:ext uri="{FF2B5EF4-FFF2-40B4-BE49-F238E27FC236}">
+                <a16:creationId xmlns:a16="http://schemas.microsoft.com/office/drawing/2014/main" id="{6F99D8CF-066A-4D1D-0A84-111CC240449C}"/>
+              </a:ext>
+            </a:extLst>
+          </p:cNvPr>
+          <p:cNvCxnSpPr>
+            <a:cxnSpLocks/>
+            <a:stCxn id="71" idx="3"/>
+            <a:endCxn id="18" idx="3"/>
+          </p:cNvCxnSpPr>
+          <p:nvPr/>
+        </p:nvCxnSpPr>
+        <p:spPr>
+          <a:xfrm flipH="1" flipV="1">
+            <a:off x="5087005" y="899407"/>
+            <a:ext cx="113319" cy="3604702"/>
+          </a:xfrm>
+          <a:prstGeom prst="bentConnector4">
+            <a:avLst>
+              <a:gd name="adj1" fmla="val -201731"/>
+              <a:gd name="adj2" fmla="val 68400"/>
+            </a:avLst>
+          </a:prstGeom>
+          <a:ln w="19050">
+            <a:solidFill>
+              <a:srgbClr val="0070C0"/>
+            </a:solidFill>
+            <a:tailEnd type="triangle"/>
+          </a:ln>
+        </p:spPr>
+        <p:style>
+          <a:lnRef idx="1">
+            <a:schemeClr val="accent1"/>
+          </a:lnRef>
+          <a:fillRef idx="0">
+            <a:schemeClr val="accent1"/>
+          </a:fillRef>
+          <a:effectRef idx="0">
+            <a:schemeClr val="accent1"/>
+          </a:effectRef>
+          <a:fontRef idx="minor">
+            <a:schemeClr val="tx1"/>
+          </a:fontRef>
+        </p:style>
+      </p:cxnSp>
+      <p:cxnSp>
+        <p:nvCxnSpPr>
+          <p:cNvPr id="39" name="Connector: Elbow 38">
+            <a:extLst>
+              <a:ext uri="{FF2B5EF4-FFF2-40B4-BE49-F238E27FC236}">
+                <a16:creationId xmlns:a16="http://schemas.microsoft.com/office/drawing/2014/main" id="{459254D3-373D-69D6-EED4-3519485E96E0}"/>
+              </a:ext>
+            </a:extLst>
+          </p:cNvPr>
+          <p:cNvCxnSpPr>
+            <a:cxnSpLocks/>
+            <a:endCxn id="42" idx="0"/>
+          </p:cNvCxnSpPr>
+          <p:nvPr/>
+        </p:nvCxnSpPr>
+        <p:spPr>
+          <a:xfrm>
+            <a:off x="3134003" y="1249144"/>
+            <a:ext cx="3068178" cy="1014047"/>
+          </a:xfrm>
+          <a:prstGeom prst="bentConnector2">
+            <a:avLst/>
+          </a:prstGeom>
+          <a:ln>
+            <a:tailEnd type="triangle"/>
+          </a:ln>
+        </p:spPr>
+        <p:style>
+          <a:lnRef idx="1">
+            <a:schemeClr val="dk1"/>
+          </a:lnRef>
+          <a:fillRef idx="0">
+            <a:schemeClr val="dk1"/>
+          </a:fillRef>
+          <a:effectRef idx="0">
+            <a:schemeClr val="dk1"/>
+          </a:effectRef>
+          <a:fontRef idx="minor">
+            <a:schemeClr val="tx1"/>
+          </a:fontRef>
+        </p:style>
+      </p:cxnSp>
+      <p:sp>
+        <p:nvSpPr>
+          <p:cNvPr id="42" name="Rectangle 41">
+            <a:extLst>
+              <a:ext uri="{FF2B5EF4-FFF2-40B4-BE49-F238E27FC236}">
+                <a16:creationId xmlns:a16="http://schemas.microsoft.com/office/drawing/2014/main" id="{4F0A8697-0B33-4B5F-B5F6-B5C130EE2C2B}"/>
+              </a:ext>
+            </a:extLst>
+          </p:cNvPr>
+          <p:cNvSpPr/>
+          <p:nvPr/>
+        </p:nvSpPr>
+        <p:spPr>
+          <a:xfrm>
+            <a:off x="5578139" y="2263191"/>
+            <a:ext cx="1248084" cy="454014"/>
+          </a:xfrm>
+          <a:prstGeom prst="rect">
+            <a:avLst/>
+          </a:prstGeom>
+          <a:solidFill>
+            <a:schemeClr val="accent6">
+              <a:lumMod val="75000"/>
+            </a:schemeClr>
+          </a:solidFill>
+        </p:spPr>
+        <p:style>
+          <a:lnRef idx="2">
+            <a:schemeClr val="accent1">
+              <a:shade val="50000"/>
+            </a:schemeClr>
+          </a:lnRef>
+          <a:fillRef idx="1">
+            <a:schemeClr val="accent1"/>
+          </a:fillRef>
+          <a:effectRef idx="0">
+            <a:schemeClr val="accent1"/>
+          </a:effectRef>
+          <a:fontRef idx="minor">
+            <a:schemeClr val="lt1"/>
+          </a:fontRef>
+        </p:style>
+        <p:txBody>
+          <a:bodyPr rtlCol="0" anchor="ctr"/>
+          <a:lstStyle/>
+          <a:p>
+            <a:r>
+              <a:rPr lang="en-US" sz="1200" b="1" dirty="0"/>
+              <a:t>Network data capture module </a:t>
+            </a:r>
+            <a:endParaRPr lang="en-SG" sz="1200" b="1" dirty="0"/>
+          </a:p>
+        </p:txBody>
+      </p:sp>
+      <p:sp>
+        <p:nvSpPr>
+          <p:cNvPr id="44" name="TextBox 43">
+            <a:extLst>
+              <a:ext uri="{FF2B5EF4-FFF2-40B4-BE49-F238E27FC236}">
+                <a16:creationId xmlns:a16="http://schemas.microsoft.com/office/drawing/2014/main" id="{3B9CF817-6D76-2FD1-2339-F5BB5B823EE9}"/>
+              </a:ext>
+            </a:extLst>
+          </p:cNvPr>
+          <p:cNvSpPr txBox="1"/>
+          <p:nvPr/>
+        </p:nvSpPr>
+        <p:spPr>
+          <a:xfrm>
+            <a:off x="7780629" y="1898789"/>
+            <a:ext cx="1952651" cy="461665"/>
+          </a:xfrm>
+          <a:prstGeom prst="rect">
+            <a:avLst/>
+          </a:prstGeom>
+          <a:noFill/>
+        </p:spPr>
+        <p:txBody>
+          <a:bodyPr wrap="square" rtlCol="0">
+            <a:spAutoFit/>
+          </a:bodyPr>
+          <a:lstStyle/>
+          <a:p>
+            <a:r>
+              <a:rPr lang="en-US" sz="1200" b="1" dirty="0"/>
+              <a:t>Pre-captured network packet file (</a:t>
+            </a:r>
+            <a:r>
+              <a:rPr lang="en-US" sz="1200" b="1" dirty="0" err="1"/>
+              <a:t>pcap</a:t>
+            </a:r>
+            <a:r>
+              <a:rPr lang="en-US" sz="1200" b="1" dirty="0"/>
+              <a:t>/</a:t>
+            </a:r>
+            <a:r>
+              <a:rPr lang="en-US" sz="1200" b="1" dirty="0" err="1"/>
+              <a:t>tcp</a:t>
+            </a:r>
+            <a:r>
+              <a:rPr lang="en-US" sz="1200" b="1" dirty="0"/>
+              <a:t> dump)</a:t>
+            </a:r>
+            <a:endParaRPr lang="en-SG" sz="1200" b="1" dirty="0"/>
+          </a:p>
+        </p:txBody>
+      </p:sp>
+      <p:sp>
+        <p:nvSpPr>
+          <p:cNvPr id="45" name="Cloud 44">
+            <a:extLst>
+              <a:ext uri="{FF2B5EF4-FFF2-40B4-BE49-F238E27FC236}">
+                <a16:creationId xmlns:a16="http://schemas.microsoft.com/office/drawing/2014/main" id="{F5CBC119-6BBB-5372-15D0-25452BCBD4CE}"/>
+              </a:ext>
+            </a:extLst>
+          </p:cNvPr>
+          <p:cNvSpPr/>
+          <p:nvPr/>
+        </p:nvSpPr>
+        <p:spPr>
+          <a:xfrm>
+            <a:off x="7374586" y="2600044"/>
+            <a:ext cx="1457920" cy="537475"/>
+          </a:xfrm>
+          <a:prstGeom prst="cloud">
+            <a:avLst/>
+          </a:prstGeom>
+        </p:spPr>
+        <p:style>
+          <a:lnRef idx="2">
+            <a:schemeClr val="accent1">
+              <a:shade val="50000"/>
+            </a:schemeClr>
+          </a:lnRef>
+          <a:fillRef idx="1">
+            <a:schemeClr val="accent1"/>
+          </a:fillRef>
+          <a:effectRef idx="0">
+            <a:schemeClr val="accent1"/>
+          </a:effectRef>
+          <a:fontRef idx="minor">
+            <a:schemeClr val="lt1"/>
+          </a:fontRef>
+        </p:style>
+        <p:txBody>
+          <a:bodyPr rtlCol="0" anchor="ctr"/>
+          <a:lstStyle/>
+          <a:p>
+            <a:pPr algn="ctr"/>
+            <a:r>
+              <a:rPr lang="en-US" sz="1100" dirty="0"/>
+              <a:t>Real time network data </a:t>
+            </a:r>
+            <a:endParaRPr lang="en-SG" sz="1100" dirty="0"/>
+          </a:p>
+        </p:txBody>
+      </p:sp>
+      <p:cxnSp>
+        <p:nvCxnSpPr>
+          <p:cNvPr id="46" name="Connector: Elbow 45">
+            <a:extLst>
+              <a:ext uri="{FF2B5EF4-FFF2-40B4-BE49-F238E27FC236}">
+                <a16:creationId xmlns:a16="http://schemas.microsoft.com/office/drawing/2014/main" id="{CA771BA7-7A8A-FFAC-7897-7475E6D0B010}"/>
+              </a:ext>
+            </a:extLst>
+          </p:cNvPr>
+          <p:cNvCxnSpPr>
+            <a:cxnSpLocks/>
+            <a:stCxn id="17" idx="1"/>
+            <a:endCxn id="42" idx="3"/>
+          </p:cNvCxnSpPr>
+          <p:nvPr/>
+        </p:nvCxnSpPr>
+        <p:spPr>
+          <a:xfrm rot="10800000" flipV="1">
+            <a:off x="6826224" y="2150646"/>
+            <a:ext cx="567441" cy="339551"/>
+          </a:xfrm>
+          <a:prstGeom prst="bentConnector3">
+            <a:avLst>
+              <a:gd name="adj1" fmla="val 50000"/>
+            </a:avLst>
+          </a:prstGeom>
+          <a:ln w="19050">
+            <a:solidFill>
+              <a:srgbClr val="0070C0"/>
+            </a:solidFill>
+            <a:tailEnd type="triangle"/>
+          </a:ln>
+        </p:spPr>
+        <p:style>
+          <a:lnRef idx="1">
+            <a:schemeClr val="accent1"/>
+          </a:lnRef>
+          <a:fillRef idx="0">
+            <a:schemeClr val="accent1"/>
+          </a:fillRef>
+          <a:effectRef idx="0">
+            <a:schemeClr val="accent1"/>
+          </a:effectRef>
+          <a:fontRef idx="minor">
+            <a:schemeClr val="tx1"/>
+          </a:fontRef>
+        </p:style>
+      </p:cxnSp>
+      <p:cxnSp>
+        <p:nvCxnSpPr>
+          <p:cNvPr id="49" name="Connector: Elbow 48">
+            <a:extLst>
+              <a:ext uri="{FF2B5EF4-FFF2-40B4-BE49-F238E27FC236}">
+                <a16:creationId xmlns:a16="http://schemas.microsoft.com/office/drawing/2014/main" id="{CE2721CA-4B75-9060-BCDC-31A3DF4BE284}"/>
+              </a:ext>
+            </a:extLst>
+          </p:cNvPr>
+          <p:cNvCxnSpPr>
+            <a:cxnSpLocks/>
+            <a:stCxn id="45" idx="2"/>
+            <a:endCxn id="42" idx="3"/>
+          </p:cNvCxnSpPr>
+          <p:nvPr/>
+        </p:nvCxnSpPr>
+        <p:spPr>
+          <a:xfrm rot="10800000">
+            <a:off x="6826224" y="2490198"/>
+            <a:ext cx="552885" cy="378584"/>
+          </a:xfrm>
+          <a:prstGeom prst="bentConnector3">
+            <a:avLst>
+              <a:gd name="adj1" fmla="val 50000"/>
+            </a:avLst>
+          </a:prstGeom>
+          <a:ln w="19050">
+            <a:solidFill>
+              <a:srgbClr val="0070C0"/>
+            </a:solidFill>
+            <a:tailEnd type="triangle"/>
+          </a:ln>
+        </p:spPr>
+        <p:style>
+          <a:lnRef idx="1">
+            <a:schemeClr val="accent1"/>
+          </a:lnRef>
+          <a:fillRef idx="0">
+            <a:schemeClr val="accent1"/>
+          </a:fillRef>
+          <a:effectRef idx="0">
+            <a:schemeClr val="accent1"/>
+          </a:effectRef>
+          <a:fontRef idx="minor">
+            <a:schemeClr val="tx1"/>
+          </a:fontRef>
+        </p:style>
+      </p:cxnSp>
+      <p:sp>
+        <p:nvSpPr>
+          <p:cNvPr id="56" name="TextBox 55">
+            <a:extLst>
+              <a:ext uri="{FF2B5EF4-FFF2-40B4-BE49-F238E27FC236}">
+                <a16:creationId xmlns:a16="http://schemas.microsoft.com/office/drawing/2014/main" id="{C5A77517-0388-D2FE-3D98-38FA7368FA9B}"/>
+              </a:ext>
+            </a:extLst>
+          </p:cNvPr>
+          <p:cNvSpPr txBox="1"/>
+          <p:nvPr/>
+        </p:nvSpPr>
+        <p:spPr>
+          <a:xfrm>
+            <a:off x="5335818" y="1244078"/>
+            <a:ext cx="1360881" cy="461665"/>
+          </a:xfrm>
+          <a:prstGeom prst="rect">
+            <a:avLst/>
+          </a:prstGeom>
+          <a:noFill/>
+        </p:spPr>
+        <p:txBody>
+          <a:bodyPr wrap="square" rtlCol="0">
+            <a:spAutoFit/>
+          </a:bodyPr>
+          <a:lstStyle/>
+          <a:p>
+            <a:r>
+              <a:rPr lang="en-US" sz="1200" b="1" dirty="0">
+                <a:solidFill>
+                  <a:schemeClr val="accent6">
+                    <a:lumMod val="75000"/>
+                  </a:schemeClr>
+                </a:solidFill>
+              </a:rPr>
+              <a:t>Data source processing thread</a:t>
+            </a:r>
+            <a:endParaRPr lang="en-SG" sz="1200" b="1" dirty="0">
+              <a:solidFill>
+                <a:schemeClr val="accent6">
+                  <a:lumMod val="75000"/>
+                </a:schemeClr>
+              </a:solidFill>
+            </a:endParaRPr>
+          </a:p>
+        </p:txBody>
+      </p:sp>
+      <p:sp>
+        <p:nvSpPr>
+          <p:cNvPr id="57" name="Rectangle 56">
+            <a:extLst>
+              <a:ext uri="{FF2B5EF4-FFF2-40B4-BE49-F238E27FC236}">
+                <a16:creationId xmlns:a16="http://schemas.microsoft.com/office/drawing/2014/main" id="{9FAB0915-4852-9257-4835-DCFED8FA87FA}"/>
+              </a:ext>
+            </a:extLst>
+          </p:cNvPr>
+          <p:cNvSpPr/>
+          <p:nvPr/>
+        </p:nvSpPr>
+        <p:spPr>
+          <a:xfrm>
+            <a:off x="5596621" y="3032839"/>
+            <a:ext cx="1100078" cy="305441"/>
+          </a:xfrm>
+          <a:prstGeom prst="rect">
+            <a:avLst/>
+          </a:prstGeom>
+          <a:solidFill>
+            <a:schemeClr val="accent6">
+              <a:lumMod val="75000"/>
+            </a:schemeClr>
+          </a:solidFill>
+        </p:spPr>
+        <p:style>
+          <a:lnRef idx="2">
+            <a:schemeClr val="accent1">
+              <a:shade val="50000"/>
+            </a:schemeClr>
+          </a:lnRef>
+          <a:fillRef idx="1">
+            <a:schemeClr val="accent1"/>
+          </a:fillRef>
+          <a:effectRef idx="0">
+            <a:schemeClr val="accent1"/>
+          </a:effectRef>
+          <a:fontRef idx="minor">
+            <a:schemeClr val="lt1"/>
+          </a:fontRef>
+        </p:style>
+        <p:txBody>
+          <a:bodyPr rtlCol="0" anchor="ctr"/>
+          <a:lstStyle/>
+          <a:p>
+            <a:r>
+              <a:rPr lang="en-US" sz="1200" b="1" dirty="0"/>
+              <a:t>Packet filter</a:t>
+            </a:r>
+            <a:endParaRPr lang="en-SG" sz="1200" b="1" dirty="0"/>
+          </a:p>
+        </p:txBody>
+      </p:sp>
+      <p:cxnSp>
+        <p:nvCxnSpPr>
+          <p:cNvPr id="58" name="Straight Arrow Connector 57">
+            <a:extLst>
+              <a:ext uri="{FF2B5EF4-FFF2-40B4-BE49-F238E27FC236}">
+                <a16:creationId xmlns:a16="http://schemas.microsoft.com/office/drawing/2014/main" id="{FFD65802-8B77-EAC1-8D46-A3C56BFDA7AB}"/>
+              </a:ext>
+            </a:extLst>
+          </p:cNvPr>
+          <p:cNvCxnSpPr>
+            <a:cxnSpLocks/>
+            <a:endCxn id="57" idx="0"/>
+          </p:cNvCxnSpPr>
+          <p:nvPr/>
+        </p:nvCxnSpPr>
+        <p:spPr>
+          <a:xfrm flipH="1">
+            <a:off x="6146660" y="2692374"/>
+            <a:ext cx="0" cy="340465"/>
+          </a:xfrm>
+          <a:prstGeom prst="straightConnector1">
+            <a:avLst/>
+          </a:prstGeom>
+          <a:ln>
+            <a:solidFill>
+              <a:schemeClr val="accent6">
+                <a:lumMod val="50000"/>
+              </a:schemeClr>
+            </a:solidFill>
+            <a:tailEnd type="triangle"/>
+          </a:ln>
+        </p:spPr>
+        <p:style>
+          <a:lnRef idx="1">
+            <a:schemeClr val="accent1"/>
+          </a:lnRef>
+          <a:fillRef idx="0">
+            <a:schemeClr val="accent1"/>
+          </a:fillRef>
+          <a:effectRef idx="0">
+            <a:schemeClr val="accent1"/>
+          </a:effectRef>
+          <a:fontRef idx="minor">
+            <a:schemeClr val="tx1"/>
+          </a:fontRef>
+        </p:style>
+      </p:cxnSp>
+      <p:sp>
+        <p:nvSpPr>
+          <p:cNvPr id="60" name="Rectangle 59">
+            <a:extLst>
+              <a:ext uri="{FF2B5EF4-FFF2-40B4-BE49-F238E27FC236}">
+                <a16:creationId xmlns:a16="http://schemas.microsoft.com/office/drawing/2014/main" id="{619B1DB7-69A3-2F36-1F7F-FD8FEEC8898E}"/>
+              </a:ext>
+            </a:extLst>
+          </p:cNvPr>
+          <p:cNvSpPr/>
+          <p:nvPr/>
+        </p:nvSpPr>
+        <p:spPr>
+          <a:xfrm>
+            <a:off x="5596621" y="3713655"/>
+            <a:ext cx="1100078" cy="305441"/>
+          </a:xfrm>
+          <a:prstGeom prst="rect">
+            <a:avLst/>
+          </a:prstGeom>
+          <a:solidFill>
+            <a:schemeClr val="accent6">
+              <a:lumMod val="75000"/>
+            </a:schemeClr>
+          </a:solidFill>
+        </p:spPr>
+        <p:style>
+          <a:lnRef idx="2">
+            <a:schemeClr val="accent1">
+              <a:shade val="50000"/>
+            </a:schemeClr>
+          </a:lnRef>
+          <a:fillRef idx="1">
+            <a:schemeClr val="accent1"/>
+          </a:fillRef>
+          <a:effectRef idx="0">
+            <a:schemeClr val="accent1"/>
+          </a:effectRef>
+          <a:fontRef idx="minor">
+            <a:schemeClr val="lt1"/>
+          </a:fontRef>
+        </p:style>
+        <p:txBody>
+          <a:bodyPr rtlCol="0" anchor="ctr"/>
+          <a:lstStyle/>
+          <a:p>
+            <a:r>
+              <a:rPr lang="en-US" sz="1200" b="1" dirty="0"/>
+              <a:t>Packet parser </a:t>
+            </a:r>
+            <a:endParaRPr lang="en-SG" sz="1200" b="1" dirty="0"/>
+          </a:p>
+        </p:txBody>
+      </p:sp>
+      <p:cxnSp>
+        <p:nvCxnSpPr>
+          <p:cNvPr id="61" name="Straight Arrow Connector 60">
+            <a:extLst>
+              <a:ext uri="{FF2B5EF4-FFF2-40B4-BE49-F238E27FC236}">
+                <a16:creationId xmlns:a16="http://schemas.microsoft.com/office/drawing/2014/main" id="{2687B98F-53A2-F0AC-BC14-A8FEE1064D5F}"/>
+              </a:ext>
+            </a:extLst>
+          </p:cNvPr>
+          <p:cNvCxnSpPr>
+            <a:cxnSpLocks/>
+          </p:cNvCxnSpPr>
+          <p:nvPr/>
+        </p:nvCxnSpPr>
+        <p:spPr>
+          <a:xfrm flipH="1">
+            <a:off x="6146660" y="3353667"/>
+            <a:ext cx="0" cy="340465"/>
+          </a:xfrm>
+          <a:prstGeom prst="straightConnector1">
+            <a:avLst/>
+          </a:prstGeom>
+          <a:ln>
+            <a:solidFill>
+              <a:schemeClr val="accent6">
+                <a:lumMod val="50000"/>
+              </a:schemeClr>
+            </a:solidFill>
+            <a:tailEnd type="triangle"/>
+          </a:ln>
+        </p:spPr>
+        <p:style>
+          <a:lnRef idx="1">
+            <a:schemeClr val="accent1"/>
+          </a:lnRef>
+          <a:fillRef idx="0">
+            <a:schemeClr val="accent1"/>
+          </a:fillRef>
+          <a:effectRef idx="0">
+            <a:schemeClr val="accent1"/>
+          </a:effectRef>
+          <a:fontRef idx="minor">
+            <a:schemeClr val="tx1"/>
+          </a:fontRef>
+        </p:style>
+      </p:cxnSp>
+      <p:sp>
+        <p:nvSpPr>
+          <p:cNvPr id="62" name="Rectangle 61">
+            <a:extLst>
+              <a:ext uri="{FF2B5EF4-FFF2-40B4-BE49-F238E27FC236}">
+                <a16:creationId xmlns:a16="http://schemas.microsoft.com/office/drawing/2014/main" id="{9288F9B2-0EBA-D044-A6C7-032C2CD39662}"/>
+              </a:ext>
+            </a:extLst>
+          </p:cNvPr>
+          <p:cNvSpPr/>
+          <p:nvPr/>
+        </p:nvSpPr>
+        <p:spPr>
+          <a:xfrm>
+            <a:off x="3833141" y="3296892"/>
+            <a:ext cx="1367184" cy="454014"/>
+          </a:xfrm>
+          <a:prstGeom prst="rect">
+            <a:avLst/>
+          </a:prstGeom>
+          <a:solidFill>
+            <a:schemeClr val="accent6">
+              <a:lumMod val="75000"/>
+            </a:schemeClr>
+          </a:solidFill>
+        </p:spPr>
+        <p:style>
+          <a:lnRef idx="2">
+            <a:schemeClr val="accent1">
+              <a:shade val="50000"/>
+            </a:schemeClr>
+          </a:lnRef>
+          <a:fillRef idx="1">
+            <a:schemeClr val="accent1"/>
+          </a:fillRef>
+          <a:effectRef idx="0">
+            <a:schemeClr val="accent1"/>
+          </a:effectRef>
+          <a:fontRef idx="minor">
+            <a:schemeClr val="lt1"/>
+          </a:fontRef>
+        </p:style>
+        <p:txBody>
+          <a:bodyPr rtlCol="0" anchor="ctr"/>
+          <a:lstStyle/>
+          <a:p>
+            <a:r>
+              <a:rPr lang="en-US" sz="1200" b="1" dirty="0"/>
+              <a:t>Packet encryption algo checker  </a:t>
+            </a:r>
+            <a:endParaRPr lang="en-SG" sz="1200" b="1" dirty="0"/>
+          </a:p>
+        </p:txBody>
+      </p:sp>
+      <p:sp>
+        <p:nvSpPr>
+          <p:cNvPr id="63" name="TextBox 62">
+            <a:extLst>
+              <a:ext uri="{FF2B5EF4-FFF2-40B4-BE49-F238E27FC236}">
+                <a16:creationId xmlns:a16="http://schemas.microsoft.com/office/drawing/2014/main" id="{A83008BD-495F-37BC-4948-6C3E0D065BB0}"/>
+              </a:ext>
+            </a:extLst>
+          </p:cNvPr>
+          <p:cNvSpPr txBox="1"/>
+          <p:nvPr/>
+        </p:nvSpPr>
+        <p:spPr>
+          <a:xfrm>
+            <a:off x="5535904" y="376417"/>
+            <a:ext cx="1506766" cy="297227"/>
+          </a:xfrm>
+          <a:prstGeom prst="rect">
+            <a:avLst/>
+          </a:prstGeom>
+          <a:noFill/>
+          <a:ln w="3175">
+            <a:noFill/>
+          </a:ln>
+        </p:spPr>
+        <p:txBody>
+          <a:bodyPr wrap="square" lIns="36000" tIns="36000" rIns="36000" bIns="36000" rtlCol="0">
+            <a:noAutofit/>
+          </a:bodyPr>
+          <a:lstStyle/>
+          <a:p>
+            <a:r>
+              <a:rPr lang="en-SG" sz="1200" b="1" dirty="0"/>
+              <a:t>Encryption Quantum attack resistance  evaluation Info DB </a:t>
+            </a:r>
+          </a:p>
+        </p:txBody>
+      </p:sp>
+      <p:cxnSp>
+        <p:nvCxnSpPr>
+          <p:cNvPr id="67" name="Straight Arrow Connector 66">
+            <a:extLst>
+              <a:ext uri="{FF2B5EF4-FFF2-40B4-BE49-F238E27FC236}">
+                <a16:creationId xmlns:a16="http://schemas.microsoft.com/office/drawing/2014/main" id="{82B7248B-F3F3-8BB1-6ACA-CA47C434F619}"/>
+              </a:ext>
+            </a:extLst>
+          </p:cNvPr>
+          <p:cNvCxnSpPr>
+            <a:cxnSpLocks/>
+          </p:cNvCxnSpPr>
+          <p:nvPr/>
+        </p:nvCxnSpPr>
+        <p:spPr>
+          <a:xfrm>
+            <a:off x="4894515" y="899407"/>
+            <a:ext cx="0" cy="1363784"/>
+          </a:xfrm>
+          <a:prstGeom prst="straightConnector1">
+            <a:avLst/>
+          </a:prstGeom>
+          <a:ln w="19050">
+            <a:solidFill>
+              <a:srgbClr val="0070C0"/>
+            </a:solidFill>
+            <a:tailEnd type="triangle"/>
+          </a:ln>
+        </p:spPr>
+        <p:style>
+          <a:lnRef idx="1">
+            <a:schemeClr val="accent1"/>
+          </a:lnRef>
+          <a:fillRef idx="0">
+            <a:schemeClr val="accent1"/>
+          </a:fillRef>
+          <a:effectRef idx="0">
+            <a:schemeClr val="accent1"/>
+          </a:effectRef>
+          <a:fontRef idx="minor">
+            <a:schemeClr val="tx1"/>
+          </a:fontRef>
+        </p:style>
+      </p:cxnSp>
+      <p:cxnSp>
+        <p:nvCxnSpPr>
+          <p:cNvPr id="69" name="Straight Arrow Connector 68">
+            <a:extLst>
+              <a:ext uri="{FF2B5EF4-FFF2-40B4-BE49-F238E27FC236}">
+                <a16:creationId xmlns:a16="http://schemas.microsoft.com/office/drawing/2014/main" id="{2DD00708-EFEC-8E12-68B5-4416D5C858EC}"/>
+              </a:ext>
+            </a:extLst>
+          </p:cNvPr>
+          <p:cNvCxnSpPr>
+            <a:cxnSpLocks/>
+          </p:cNvCxnSpPr>
+          <p:nvPr/>
+        </p:nvCxnSpPr>
+        <p:spPr>
+          <a:xfrm>
+            <a:off x="4516733" y="2728184"/>
+            <a:ext cx="0" cy="568708"/>
+          </a:xfrm>
+          <a:prstGeom prst="straightConnector1">
+            <a:avLst/>
+          </a:prstGeom>
+          <a:ln>
+            <a:solidFill>
+              <a:schemeClr val="accent6">
+                <a:lumMod val="50000"/>
+              </a:schemeClr>
+            </a:solidFill>
+            <a:tailEnd type="triangle"/>
+          </a:ln>
+        </p:spPr>
+        <p:style>
+          <a:lnRef idx="1">
+            <a:schemeClr val="accent1"/>
+          </a:lnRef>
+          <a:fillRef idx="0">
+            <a:schemeClr val="accent1"/>
+          </a:fillRef>
+          <a:effectRef idx="0">
+            <a:schemeClr val="accent1"/>
+          </a:effectRef>
+          <a:fontRef idx="minor">
+            <a:schemeClr val="tx1"/>
+          </a:fontRef>
+        </p:style>
+      </p:cxnSp>
+      <p:sp>
+        <p:nvSpPr>
+          <p:cNvPr id="71" name="Rectangle 70">
+            <a:extLst>
+              <a:ext uri="{FF2B5EF4-FFF2-40B4-BE49-F238E27FC236}">
+                <a16:creationId xmlns:a16="http://schemas.microsoft.com/office/drawing/2014/main" id="{C35F4064-6F4C-2265-B3CE-728A6D02BB17}"/>
+              </a:ext>
+            </a:extLst>
+          </p:cNvPr>
+          <p:cNvSpPr/>
+          <p:nvPr/>
+        </p:nvSpPr>
+        <p:spPr>
+          <a:xfrm>
+            <a:off x="3833141" y="4173292"/>
+            <a:ext cx="1367183" cy="661633"/>
+          </a:xfrm>
+          <a:prstGeom prst="rect">
+            <a:avLst/>
+          </a:prstGeom>
+          <a:solidFill>
+            <a:schemeClr val="accent6">
+              <a:lumMod val="75000"/>
+            </a:schemeClr>
+          </a:solidFill>
+        </p:spPr>
+        <p:style>
+          <a:lnRef idx="2">
+            <a:schemeClr val="accent1">
+              <a:shade val="50000"/>
+            </a:schemeClr>
+          </a:lnRef>
+          <a:fillRef idx="1">
+            <a:schemeClr val="accent1"/>
+          </a:fillRef>
+          <a:effectRef idx="0">
+            <a:schemeClr val="accent1"/>
+          </a:effectRef>
+          <a:fontRef idx="minor">
+            <a:schemeClr val="lt1"/>
+          </a:fontRef>
+        </p:style>
+        <p:txBody>
+          <a:bodyPr rtlCol="0" anchor="ctr"/>
+          <a:lstStyle/>
+          <a:p>
+            <a:r>
+              <a:rPr lang="en-US" sz="1200" b="1" dirty="0"/>
+              <a:t>Quantum attack resistance score generator </a:t>
+            </a:r>
+            <a:endParaRPr lang="en-SG" sz="1200" b="1" dirty="0"/>
+          </a:p>
+        </p:txBody>
+      </p:sp>
+      <p:cxnSp>
+        <p:nvCxnSpPr>
+          <p:cNvPr id="72" name="Straight Arrow Connector 71">
+            <a:extLst>
+              <a:ext uri="{FF2B5EF4-FFF2-40B4-BE49-F238E27FC236}">
+                <a16:creationId xmlns:a16="http://schemas.microsoft.com/office/drawing/2014/main" id="{63713DD7-6860-FDF3-D54A-694B845A80E9}"/>
+              </a:ext>
+            </a:extLst>
+          </p:cNvPr>
+          <p:cNvCxnSpPr>
+            <a:cxnSpLocks/>
+            <a:endCxn id="71" idx="0"/>
+          </p:cNvCxnSpPr>
+          <p:nvPr/>
+        </p:nvCxnSpPr>
+        <p:spPr>
+          <a:xfrm>
+            <a:off x="4458335" y="3759832"/>
+            <a:ext cx="0" cy="413460"/>
+          </a:xfrm>
+          <a:prstGeom prst="straightConnector1">
+            <a:avLst/>
+          </a:prstGeom>
+          <a:ln>
+            <a:solidFill>
+              <a:schemeClr val="accent6">
+                <a:lumMod val="50000"/>
+              </a:schemeClr>
+            </a:solidFill>
+            <a:tailEnd type="triangle"/>
+          </a:ln>
+        </p:spPr>
+        <p:style>
+          <a:lnRef idx="1">
+            <a:schemeClr val="accent1"/>
+          </a:lnRef>
+          <a:fillRef idx="0">
+            <a:schemeClr val="accent1"/>
+          </a:fillRef>
+          <a:effectRef idx="0">
+            <a:schemeClr val="accent1"/>
+          </a:effectRef>
+          <a:fontRef idx="minor">
+            <a:schemeClr val="tx1"/>
+          </a:fontRef>
+        </p:style>
+      </p:cxnSp>
+      <p:cxnSp>
+        <p:nvCxnSpPr>
+          <p:cNvPr id="81" name="Connector: Elbow 80">
+            <a:extLst>
+              <a:ext uri="{FF2B5EF4-FFF2-40B4-BE49-F238E27FC236}">
+                <a16:creationId xmlns:a16="http://schemas.microsoft.com/office/drawing/2014/main" id="{DC8D11C6-5383-00D3-EBC7-E8C2FF84890C}"/>
+              </a:ext>
+            </a:extLst>
+          </p:cNvPr>
+          <p:cNvCxnSpPr>
+            <a:cxnSpLocks/>
+          </p:cNvCxnSpPr>
+          <p:nvPr/>
+        </p:nvCxnSpPr>
+        <p:spPr>
+          <a:xfrm rot="10800000" flipV="1">
+            <a:off x="5195560" y="4027548"/>
+            <a:ext cx="765157" cy="575714"/>
+          </a:xfrm>
+          <a:prstGeom prst="bentConnector3">
+            <a:avLst>
+              <a:gd name="adj1" fmla="val 2198"/>
+            </a:avLst>
+          </a:prstGeom>
+          <a:ln w="28575">
+            <a:solidFill>
+              <a:schemeClr val="accent1">
+                <a:lumMod val="40000"/>
+                <a:lumOff val="60000"/>
+              </a:schemeClr>
+            </a:solidFill>
+            <a:tailEnd type="triangle"/>
+          </a:ln>
+        </p:spPr>
+        <p:style>
+          <a:lnRef idx="1">
+            <a:schemeClr val="accent1"/>
+          </a:lnRef>
+          <a:fillRef idx="0">
+            <a:schemeClr val="accent1"/>
+          </a:fillRef>
+          <a:effectRef idx="0">
+            <a:schemeClr val="accent1"/>
+          </a:effectRef>
+          <a:fontRef idx="minor">
+            <a:schemeClr val="tx1"/>
+          </a:fontRef>
+        </p:style>
+      </p:cxnSp>
+      <p:sp>
+        <p:nvSpPr>
+          <p:cNvPr id="85" name="TextBox 84">
+            <a:extLst>
+              <a:ext uri="{FF2B5EF4-FFF2-40B4-BE49-F238E27FC236}">
+                <a16:creationId xmlns:a16="http://schemas.microsoft.com/office/drawing/2014/main" id="{54E7D89D-1A71-16FB-9EB7-2462602EE764}"/>
+              </a:ext>
+            </a:extLst>
+          </p:cNvPr>
+          <p:cNvSpPr txBox="1"/>
+          <p:nvPr/>
+        </p:nvSpPr>
+        <p:spPr>
+          <a:xfrm>
+            <a:off x="5308878" y="4596135"/>
+            <a:ext cx="1506766" cy="477580"/>
+          </a:xfrm>
+          <a:prstGeom prst="rect">
+            <a:avLst/>
+          </a:prstGeom>
+          <a:noFill/>
+          <a:ln w="3175">
+            <a:noFill/>
+          </a:ln>
+        </p:spPr>
+        <p:txBody>
+          <a:bodyPr wrap="square" lIns="36000" tIns="36000" rIns="36000" bIns="36000" rtlCol="0">
+            <a:noAutofit/>
+          </a:bodyPr>
+          <a:lstStyle/>
+          <a:p>
+            <a:r>
+              <a:rPr lang="en-US" sz="1200" dirty="0"/>
+              <a:t>Normalized packet data summary </a:t>
+            </a:r>
+            <a:endParaRPr lang="en-SG" sz="1200" dirty="0"/>
+          </a:p>
+        </p:txBody>
+      </p:sp>
+      <p:sp>
+        <p:nvSpPr>
+          <p:cNvPr id="86" name="TextBox 85">
+            <a:extLst>
+              <a:ext uri="{FF2B5EF4-FFF2-40B4-BE49-F238E27FC236}">
+                <a16:creationId xmlns:a16="http://schemas.microsoft.com/office/drawing/2014/main" id="{7081CAA7-E8BF-1F7F-EC78-1544A69B9217}"/>
+              </a:ext>
+            </a:extLst>
+          </p:cNvPr>
+          <p:cNvSpPr txBox="1"/>
+          <p:nvPr/>
+        </p:nvSpPr>
+        <p:spPr>
+          <a:xfrm>
+            <a:off x="4947579" y="3753827"/>
+            <a:ext cx="893458" cy="273721"/>
+          </a:xfrm>
+          <a:prstGeom prst="rect">
+            <a:avLst/>
+          </a:prstGeom>
+          <a:noFill/>
+          <a:ln w="3175">
+            <a:noFill/>
+          </a:ln>
+        </p:spPr>
+        <p:txBody>
+          <a:bodyPr wrap="square" lIns="36000" tIns="36000" rIns="36000" bIns="36000" rtlCol="0">
+            <a:noAutofit/>
+          </a:bodyPr>
+          <a:lstStyle/>
+          <a:p>
+            <a:r>
+              <a:rPr lang="en-SG" sz="1200" dirty="0"/>
+              <a:t>History record data  </a:t>
+            </a:r>
+          </a:p>
+        </p:txBody>
+      </p:sp>
+      <p:cxnSp>
+        <p:nvCxnSpPr>
+          <p:cNvPr id="87" name="Connector: Elbow 86">
+            <a:extLst>
+              <a:ext uri="{FF2B5EF4-FFF2-40B4-BE49-F238E27FC236}">
+                <a16:creationId xmlns:a16="http://schemas.microsoft.com/office/drawing/2014/main" id="{72D059A7-E024-76AA-AD67-BACF095235C9}"/>
+              </a:ext>
+            </a:extLst>
+          </p:cNvPr>
+          <p:cNvCxnSpPr>
+            <a:cxnSpLocks/>
+            <a:stCxn id="71" idx="2"/>
+            <a:endCxn id="13" idx="3"/>
+          </p:cNvCxnSpPr>
+          <p:nvPr/>
+        </p:nvCxnSpPr>
+        <p:spPr>
+          <a:xfrm rot="5400000">
+            <a:off x="3399316" y="4619160"/>
+            <a:ext cx="901653" cy="1333182"/>
+          </a:xfrm>
+          <a:prstGeom prst="bentConnector2">
+            <a:avLst/>
+          </a:prstGeom>
+          <a:ln w="28575">
+            <a:solidFill>
+              <a:schemeClr val="accent1">
+                <a:lumMod val="40000"/>
+                <a:lumOff val="60000"/>
+              </a:schemeClr>
+            </a:solidFill>
+            <a:tailEnd type="triangle"/>
+          </a:ln>
+        </p:spPr>
+        <p:style>
+          <a:lnRef idx="1">
+            <a:schemeClr val="accent1"/>
+          </a:lnRef>
+          <a:fillRef idx="0">
+            <a:schemeClr val="accent1"/>
+          </a:fillRef>
+          <a:effectRef idx="0">
+            <a:schemeClr val="accent1"/>
+          </a:effectRef>
+          <a:fontRef idx="minor">
+            <a:schemeClr val="tx1"/>
+          </a:fontRef>
+        </p:style>
+      </p:cxnSp>
+      <p:cxnSp>
+        <p:nvCxnSpPr>
+          <p:cNvPr id="95" name="Connector: Elbow 94">
+            <a:extLst>
+              <a:ext uri="{FF2B5EF4-FFF2-40B4-BE49-F238E27FC236}">
+                <a16:creationId xmlns:a16="http://schemas.microsoft.com/office/drawing/2014/main" id="{0A966BBF-BF05-F6D6-1481-C91BC3C6A2FC}"/>
+              </a:ext>
+            </a:extLst>
+          </p:cNvPr>
+          <p:cNvCxnSpPr>
+            <a:cxnSpLocks/>
+            <a:stCxn id="60" idx="2"/>
+          </p:cNvCxnSpPr>
+          <p:nvPr/>
+        </p:nvCxnSpPr>
+        <p:spPr>
+          <a:xfrm rot="5400000">
+            <a:off x="3854857" y="2759257"/>
+            <a:ext cx="1031964" cy="3551643"/>
+          </a:xfrm>
+          <a:prstGeom prst="bentConnector2">
+            <a:avLst/>
+          </a:prstGeom>
+          <a:ln w="28575">
+            <a:solidFill>
+              <a:schemeClr val="accent1">
+                <a:lumMod val="40000"/>
+                <a:lumOff val="60000"/>
+              </a:schemeClr>
+            </a:solidFill>
+            <a:tailEnd type="triangle"/>
+          </a:ln>
+        </p:spPr>
+        <p:style>
+          <a:lnRef idx="1">
+            <a:schemeClr val="accent1"/>
+          </a:lnRef>
+          <a:fillRef idx="0">
+            <a:schemeClr val="accent1"/>
+          </a:fillRef>
+          <a:effectRef idx="0">
+            <a:schemeClr val="accent1"/>
+          </a:effectRef>
+          <a:fontRef idx="minor">
+            <a:schemeClr val="tx1"/>
+          </a:fontRef>
+        </p:style>
+      </p:cxnSp>
+      <p:sp>
+        <p:nvSpPr>
+          <p:cNvPr id="98" name="TextBox 97">
+            <a:extLst>
+              <a:ext uri="{FF2B5EF4-FFF2-40B4-BE49-F238E27FC236}">
+                <a16:creationId xmlns:a16="http://schemas.microsoft.com/office/drawing/2014/main" id="{F4F49CB6-2BE5-367D-5A80-0A427CCC7912}"/>
+              </a:ext>
+            </a:extLst>
+          </p:cNvPr>
+          <p:cNvSpPr txBox="1"/>
+          <p:nvPr/>
+        </p:nvSpPr>
+        <p:spPr>
+          <a:xfrm>
+            <a:off x="2566902" y="5077644"/>
+            <a:ext cx="2052333" cy="376534"/>
+          </a:xfrm>
+          <a:prstGeom prst="rect">
+            <a:avLst/>
+          </a:prstGeom>
+          <a:noFill/>
+          <a:ln w="3175">
+            <a:noFill/>
+          </a:ln>
+        </p:spPr>
+        <p:txBody>
+          <a:bodyPr wrap="square" lIns="36000" tIns="36000" rIns="36000" bIns="36000" rtlCol="0">
+            <a:noAutofit/>
+          </a:bodyPr>
+          <a:lstStyle/>
+          <a:p>
+            <a:r>
+              <a:rPr lang="en-SG" sz="1200" dirty="0"/>
+              <a:t>Protocol network Layer data  </a:t>
+            </a:r>
+          </a:p>
+        </p:txBody>
+      </p:sp>
+      <p:cxnSp>
+        <p:nvCxnSpPr>
+          <p:cNvPr id="99" name="Connector: Elbow 98">
+            <a:extLst>
+              <a:ext uri="{FF2B5EF4-FFF2-40B4-BE49-F238E27FC236}">
+                <a16:creationId xmlns:a16="http://schemas.microsoft.com/office/drawing/2014/main" id="{F12CF872-7968-A4F6-4BA7-334F80757B69}"/>
+              </a:ext>
+            </a:extLst>
+          </p:cNvPr>
+          <p:cNvCxnSpPr>
+            <a:cxnSpLocks/>
+            <a:stCxn id="71" idx="1"/>
+          </p:cNvCxnSpPr>
+          <p:nvPr/>
+        </p:nvCxnSpPr>
+        <p:spPr>
+          <a:xfrm rot="10800000" flipV="1">
+            <a:off x="2595017" y="4504109"/>
+            <a:ext cx="1238125" cy="259780"/>
+          </a:xfrm>
+          <a:prstGeom prst="bentConnector3">
+            <a:avLst>
+              <a:gd name="adj1" fmla="val 50000"/>
+            </a:avLst>
+          </a:prstGeom>
+          <a:ln w="28575">
+            <a:solidFill>
+              <a:schemeClr val="accent1">
+                <a:lumMod val="40000"/>
+                <a:lumOff val="60000"/>
+              </a:schemeClr>
+            </a:solidFill>
+            <a:tailEnd type="triangle"/>
+          </a:ln>
+        </p:spPr>
+        <p:style>
+          <a:lnRef idx="1">
+            <a:schemeClr val="accent1"/>
+          </a:lnRef>
+          <a:fillRef idx="0">
+            <a:schemeClr val="accent1"/>
+          </a:fillRef>
+          <a:effectRef idx="0">
+            <a:schemeClr val="accent1"/>
+          </a:effectRef>
+          <a:fontRef idx="minor">
+            <a:schemeClr val="tx1"/>
+          </a:fontRef>
+        </p:style>
+      </p:cxnSp>
+      <p:sp>
+        <p:nvSpPr>
+          <p:cNvPr id="103" name="TextBox 102">
+            <a:extLst>
+              <a:ext uri="{FF2B5EF4-FFF2-40B4-BE49-F238E27FC236}">
+                <a16:creationId xmlns:a16="http://schemas.microsoft.com/office/drawing/2014/main" id="{1C865A82-3FB8-CB25-A6AD-3B05CEC95C28}"/>
+              </a:ext>
+            </a:extLst>
+          </p:cNvPr>
+          <p:cNvSpPr txBox="1"/>
+          <p:nvPr/>
+        </p:nvSpPr>
+        <p:spPr>
+          <a:xfrm>
+            <a:off x="2870990" y="4293223"/>
+            <a:ext cx="1333183" cy="376534"/>
+          </a:xfrm>
+          <a:prstGeom prst="rect">
+            <a:avLst/>
+          </a:prstGeom>
+          <a:noFill/>
+          <a:ln w="3175">
+            <a:noFill/>
+          </a:ln>
+        </p:spPr>
+        <p:txBody>
+          <a:bodyPr wrap="square" lIns="36000" tIns="36000" rIns="36000" bIns="36000" rtlCol="0">
+            <a:noAutofit/>
+          </a:bodyPr>
+          <a:lstStyle/>
+          <a:p>
+            <a:r>
+              <a:rPr lang="en-SG" sz="1200" dirty="0"/>
+              <a:t>Encryption algorithm data  </a:t>
+            </a:r>
+          </a:p>
+        </p:txBody>
+      </p:sp>
+      <p:sp>
+        <p:nvSpPr>
+          <p:cNvPr id="104" name="TextBox 103">
+            <a:extLst>
+              <a:ext uri="{FF2B5EF4-FFF2-40B4-BE49-F238E27FC236}">
+                <a16:creationId xmlns:a16="http://schemas.microsoft.com/office/drawing/2014/main" id="{A6EF8E58-4165-652B-C177-A96EA10F4281}"/>
+              </a:ext>
+            </a:extLst>
+          </p:cNvPr>
+          <p:cNvSpPr txBox="1"/>
+          <p:nvPr/>
+        </p:nvSpPr>
+        <p:spPr>
+          <a:xfrm>
+            <a:off x="3370103" y="5772574"/>
+            <a:ext cx="1132002" cy="376534"/>
+          </a:xfrm>
+          <a:prstGeom prst="rect">
+            <a:avLst/>
+          </a:prstGeom>
+          <a:noFill/>
+          <a:ln w="3175">
+            <a:noFill/>
+          </a:ln>
+        </p:spPr>
+        <p:txBody>
+          <a:bodyPr wrap="square" lIns="36000" tIns="36000" rIns="36000" bIns="36000" rtlCol="0">
+            <a:noAutofit/>
+          </a:bodyPr>
+          <a:lstStyle/>
+          <a:p>
+            <a:r>
+              <a:rPr lang="en-US" sz="1200" dirty="0"/>
+              <a:t>Quantum attack resistance score</a:t>
+            </a:r>
+            <a:endParaRPr lang="en-SG" sz="1200" dirty="0"/>
+          </a:p>
+        </p:txBody>
+      </p:sp>
+      <p:pic>
+        <p:nvPicPr>
+          <p:cNvPr id="105" name="Picture 4">
+            <a:extLst>
+              <a:ext uri="{FF2B5EF4-FFF2-40B4-BE49-F238E27FC236}">
+                <a16:creationId xmlns:a16="http://schemas.microsoft.com/office/drawing/2014/main" id="{874C1780-8059-4131-69DB-AD728272EA12}"/>
+              </a:ext>
+            </a:extLst>
+          </p:cNvPr>
+          <p:cNvPicPr>
+            <a:picLocks noChangeAspect="1" noChangeArrowheads="1"/>
+          </p:cNvPicPr>
+          <p:nvPr/>
+        </p:nvPicPr>
+        <p:blipFill>
+          <a:blip r:embed="rId3">
+            <a:extLst>
+              <a:ext uri="{28A0092B-C50C-407E-A947-70E740481C1C}">
+                <a14:useLocalDpi xmlns:a14="http://schemas.microsoft.com/office/drawing/2010/main" val="0"/>
+              </a:ext>
+            </a:extLst>
+          </a:blip>
+          <a:srcRect/>
+          <a:stretch>
+            <a:fillRect/>
+          </a:stretch>
+        </p:blipFill>
+        <p:spPr bwMode="auto">
+          <a:xfrm>
+            <a:off x="1183693" y="4337800"/>
+            <a:ext cx="426090" cy="426090"/>
+          </a:xfrm>
+          <a:prstGeom prst="rect">
+            <a:avLst/>
+          </a:prstGeom>
+          <a:noFill/>
+          <a:extLst>
+            <a:ext uri="{909E8E84-426E-40DD-AFC4-6F175D3DCCD1}">
+              <a14:hiddenFill xmlns:a14="http://schemas.microsoft.com/office/drawing/2010/main">
+                <a:solidFill>
+                  <a:srgbClr val="FFFFFF"/>
+                </a:solidFill>
+              </a14:hiddenFill>
+            </a:ext>
+          </a:extLst>
+        </p:spPr>
+      </p:pic>
+      <p:sp>
+        <p:nvSpPr>
+          <p:cNvPr id="106" name="TextBox 105">
+            <a:extLst>
+              <a:ext uri="{FF2B5EF4-FFF2-40B4-BE49-F238E27FC236}">
+                <a16:creationId xmlns:a16="http://schemas.microsoft.com/office/drawing/2014/main" id="{86396BB4-EB6D-E42E-EB78-07738AAE88EF}"/>
+              </a:ext>
+            </a:extLst>
+          </p:cNvPr>
+          <p:cNvSpPr txBox="1"/>
+          <p:nvPr/>
+        </p:nvSpPr>
+        <p:spPr>
+          <a:xfrm>
+            <a:off x="1180509" y="4015408"/>
+            <a:ext cx="580416" cy="297227"/>
+          </a:xfrm>
+          <a:prstGeom prst="rect">
+            <a:avLst/>
+          </a:prstGeom>
+          <a:noFill/>
+          <a:ln w="3175">
+            <a:noFill/>
+          </a:ln>
+        </p:spPr>
+        <p:txBody>
+          <a:bodyPr wrap="square" lIns="36000" tIns="36000" rIns="36000" bIns="36000" rtlCol="0">
+            <a:noAutofit/>
+          </a:bodyPr>
+          <a:lstStyle/>
+          <a:p>
+            <a:r>
+              <a:rPr lang="en-US" sz="1200" b="1" dirty="0"/>
+              <a:t>User</a:t>
+            </a:r>
+            <a:endParaRPr lang="en-SG" sz="1200" b="1" dirty="0"/>
+          </a:p>
+        </p:txBody>
+      </p:sp>
+      <p:cxnSp>
+        <p:nvCxnSpPr>
+          <p:cNvPr id="107" name="Connector: Elbow 106">
+            <a:extLst>
+              <a:ext uri="{FF2B5EF4-FFF2-40B4-BE49-F238E27FC236}">
+                <a16:creationId xmlns:a16="http://schemas.microsoft.com/office/drawing/2014/main" id="{E1A9D4C9-BDF3-157E-63A0-CEE9BF41D383}"/>
+              </a:ext>
+            </a:extLst>
+          </p:cNvPr>
+          <p:cNvCxnSpPr>
+            <a:cxnSpLocks/>
+            <a:stCxn id="105" idx="3"/>
+            <a:endCxn id="11" idx="1"/>
+          </p:cNvCxnSpPr>
+          <p:nvPr/>
+        </p:nvCxnSpPr>
+        <p:spPr>
+          <a:xfrm flipV="1">
+            <a:off x="1609783" y="4055400"/>
+            <a:ext cx="449024" cy="495445"/>
+          </a:xfrm>
+          <a:prstGeom prst="bentConnector3">
+            <a:avLst>
+              <a:gd name="adj1" fmla="val 50000"/>
+            </a:avLst>
+          </a:prstGeom>
+          <a:ln w="28575">
+            <a:solidFill>
+              <a:srgbClr val="FAB733"/>
+            </a:solidFill>
+            <a:tailEnd type="triangle"/>
+          </a:ln>
+        </p:spPr>
+        <p:style>
+          <a:lnRef idx="1">
+            <a:schemeClr val="accent1"/>
+          </a:lnRef>
+          <a:fillRef idx="0">
+            <a:schemeClr val="accent1"/>
+          </a:fillRef>
+          <a:effectRef idx="0">
+            <a:schemeClr val="accent1"/>
+          </a:effectRef>
+          <a:fontRef idx="minor">
+            <a:schemeClr val="tx1"/>
+          </a:fontRef>
+        </p:style>
+      </p:cxnSp>
+      <p:cxnSp>
+        <p:nvCxnSpPr>
+          <p:cNvPr id="111" name="Connector: Elbow 110">
+            <a:extLst>
+              <a:ext uri="{FF2B5EF4-FFF2-40B4-BE49-F238E27FC236}">
+                <a16:creationId xmlns:a16="http://schemas.microsoft.com/office/drawing/2014/main" id="{40ABAA86-F951-0340-A867-15AA4FC3E3E0}"/>
+              </a:ext>
+            </a:extLst>
+          </p:cNvPr>
+          <p:cNvCxnSpPr>
+            <a:cxnSpLocks/>
+            <a:stCxn id="105" idx="2"/>
+            <a:endCxn id="13" idx="1"/>
+          </p:cNvCxnSpPr>
+          <p:nvPr/>
+        </p:nvCxnSpPr>
+        <p:spPr>
+          <a:xfrm rot="16200000" flipH="1">
+            <a:off x="1187151" y="4973476"/>
+            <a:ext cx="972688" cy="553515"/>
+          </a:xfrm>
+          <a:prstGeom prst="bentConnector2">
+            <a:avLst/>
+          </a:prstGeom>
+          <a:ln w="28575">
+            <a:solidFill>
+              <a:srgbClr val="FAB733"/>
+            </a:solidFill>
+            <a:tailEnd type="triangle"/>
+          </a:ln>
+        </p:spPr>
+        <p:style>
+          <a:lnRef idx="1">
+            <a:schemeClr val="accent1"/>
+          </a:lnRef>
+          <a:fillRef idx="0">
+            <a:schemeClr val="accent1"/>
+          </a:fillRef>
+          <a:effectRef idx="0">
+            <a:schemeClr val="accent1"/>
+          </a:effectRef>
+          <a:fontRef idx="minor">
+            <a:schemeClr val="tx1"/>
+          </a:fontRef>
+        </p:style>
+      </p:cxnSp>
+      <p:cxnSp>
+        <p:nvCxnSpPr>
+          <p:cNvPr id="114" name="Straight Arrow Connector 113">
+            <a:extLst>
+              <a:ext uri="{FF2B5EF4-FFF2-40B4-BE49-F238E27FC236}">
+                <a16:creationId xmlns:a16="http://schemas.microsoft.com/office/drawing/2014/main" id="{BDAE19A4-D3BF-738E-241B-4E3BFDB801D0}"/>
+              </a:ext>
+            </a:extLst>
+          </p:cNvPr>
+          <p:cNvCxnSpPr>
+            <a:cxnSpLocks/>
+          </p:cNvCxnSpPr>
+          <p:nvPr/>
+        </p:nvCxnSpPr>
+        <p:spPr>
+          <a:xfrm>
+            <a:off x="7430631" y="3509469"/>
+            <a:ext cx="420881" cy="0"/>
+          </a:xfrm>
+          <a:prstGeom prst="straightConnector1">
+            <a:avLst/>
+          </a:prstGeom>
+          <a:ln w="19050">
+            <a:prstDash val="dash"/>
+            <a:tailEnd type="triangle"/>
+          </a:ln>
+        </p:spPr>
+        <p:style>
+          <a:lnRef idx="1">
+            <a:schemeClr val="dk1"/>
+          </a:lnRef>
+          <a:fillRef idx="0">
+            <a:schemeClr val="dk1"/>
+          </a:fillRef>
+          <a:effectRef idx="0">
+            <a:schemeClr val="dk1"/>
+          </a:effectRef>
+          <a:fontRef idx="minor">
+            <a:schemeClr val="tx1"/>
+          </a:fontRef>
+        </p:style>
+      </p:cxnSp>
+      <p:cxnSp>
+        <p:nvCxnSpPr>
+          <p:cNvPr id="115" name="Straight Arrow Connector 114">
+            <a:extLst>
+              <a:ext uri="{FF2B5EF4-FFF2-40B4-BE49-F238E27FC236}">
+                <a16:creationId xmlns:a16="http://schemas.microsoft.com/office/drawing/2014/main" id="{88D4327F-6E9F-B275-CDB5-B4A408BE616C}"/>
+              </a:ext>
+            </a:extLst>
+          </p:cNvPr>
+          <p:cNvCxnSpPr>
+            <a:cxnSpLocks/>
+          </p:cNvCxnSpPr>
+          <p:nvPr/>
+        </p:nvCxnSpPr>
+        <p:spPr>
+          <a:xfrm>
+            <a:off x="7408427" y="3755732"/>
+            <a:ext cx="469642" cy="0"/>
+          </a:xfrm>
+          <a:prstGeom prst="straightConnector1">
+            <a:avLst/>
+          </a:prstGeom>
+          <a:ln>
+            <a:tailEnd type="triangle"/>
+          </a:ln>
+        </p:spPr>
+        <p:style>
+          <a:lnRef idx="1">
+            <a:schemeClr val="dk1"/>
+          </a:lnRef>
+          <a:fillRef idx="0">
+            <a:schemeClr val="dk1"/>
+          </a:fillRef>
+          <a:effectRef idx="0">
+            <a:schemeClr val="dk1"/>
+          </a:effectRef>
+          <a:fontRef idx="minor">
+            <a:schemeClr val="tx1"/>
+          </a:fontRef>
+        </p:style>
+      </p:cxnSp>
+      <p:sp>
+        <p:nvSpPr>
+          <p:cNvPr id="116" name="TextBox 115">
+            <a:extLst>
+              <a:ext uri="{FF2B5EF4-FFF2-40B4-BE49-F238E27FC236}">
+                <a16:creationId xmlns:a16="http://schemas.microsoft.com/office/drawing/2014/main" id="{4806E429-36E8-D037-7A5E-61CDF8962F10}"/>
+              </a:ext>
+            </a:extLst>
+          </p:cNvPr>
+          <p:cNvSpPr txBox="1"/>
+          <p:nvPr/>
+        </p:nvSpPr>
+        <p:spPr>
+          <a:xfrm>
+            <a:off x="7993421" y="3397640"/>
+            <a:ext cx="1111526" cy="461665"/>
+          </a:xfrm>
+          <a:prstGeom prst="rect">
+            <a:avLst/>
+          </a:prstGeom>
+          <a:noFill/>
+        </p:spPr>
+        <p:txBody>
+          <a:bodyPr wrap="square" rtlCol="0">
+            <a:spAutoFit/>
+          </a:bodyPr>
+          <a:lstStyle/>
+          <a:p>
+            <a:r>
+              <a:rPr lang="en-SG" sz="1200" b="1" dirty="0"/>
+              <a:t>Program internal flow</a:t>
+            </a:r>
+          </a:p>
+        </p:txBody>
+      </p:sp>
+      <p:sp>
+        <p:nvSpPr>
+          <p:cNvPr id="117" name="Rectangle 116">
+            <a:extLst>
+              <a:ext uri="{FF2B5EF4-FFF2-40B4-BE49-F238E27FC236}">
+                <a16:creationId xmlns:a16="http://schemas.microsoft.com/office/drawing/2014/main" id="{809BB635-278C-8B30-515F-8B01596A360F}"/>
+              </a:ext>
+            </a:extLst>
+          </p:cNvPr>
+          <p:cNvSpPr/>
+          <p:nvPr/>
+        </p:nvSpPr>
+        <p:spPr>
+          <a:xfrm>
+            <a:off x="7396022" y="4194962"/>
+            <a:ext cx="597399" cy="258946"/>
+          </a:xfrm>
+          <a:prstGeom prst="rect">
+            <a:avLst/>
+          </a:prstGeom>
+          <a:noFill/>
+          <a:ln w="19050">
+            <a:solidFill>
+              <a:schemeClr val="accent6">
+                <a:lumMod val="50000"/>
+              </a:schemeClr>
+            </a:solidFill>
+            <a:prstDash val="sysDash"/>
+          </a:ln>
+        </p:spPr>
+        <p:style>
+          <a:lnRef idx="2">
+            <a:schemeClr val="accent1">
+              <a:shade val="50000"/>
+            </a:schemeClr>
+          </a:lnRef>
+          <a:fillRef idx="1">
+            <a:schemeClr val="accent1"/>
+          </a:fillRef>
+          <a:effectRef idx="0">
+            <a:schemeClr val="accent1"/>
+          </a:effectRef>
+          <a:fontRef idx="minor">
+            <a:schemeClr val="lt1"/>
+          </a:fontRef>
+        </p:style>
+        <p:txBody>
+          <a:bodyPr rtlCol="0" anchor="ctr"/>
+          <a:lstStyle/>
+          <a:p>
+            <a:endParaRPr lang="en-SG" sz="1200" dirty="0">
+              <a:solidFill>
+                <a:schemeClr val="accent6">
+                  <a:lumMod val="50000"/>
+                </a:schemeClr>
+              </a:solidFill>
+            </a:endParaRPr>
+          </a:p>
+        </p:txBody>
+      </p:sp>
+      <p:sp>
+        <p:nvSpPr>
+          <p:cNvPr id="118" name="TextBox 117">
+            <a:extLst>
+              <a:ext uri="{FF2B5EF4-FFF2-40B4-BE49-F238E27FC236}">
+                <a16:creationId xmlns:a16="http://schemas.microsoft.com/office/drawing/2014/main" id="{DEABBAB3-61CB-C91C-93F2-F3B3BF1913F5}"/>
+              </a:ext>
+            </a:extLst>
+          </p:cNvPr>
+          <p:cNvSpPr txBox="1"/>
+          <p:nvPr/>
+        </p:nvSpPr>
+        <p:spPr>
+          <a:xfrm>
+            <a:off x="7993421" y="4173292"/>
+            <a:ext cx="1304535" cy="276999"/>
+          </a:xfrm>
+          <a:prstGeom prst="rect">
+            <a:avLst/>
+          </a:prstGeom>
+          <a:noFill/>
+        </p:spPr>
+        <p:txBody>
+          <a:bodyPr wrap="square" rtlCol="0">
+            <a:spAutoFit/>
+          </a:bodyPr>
+          <a:lstStyle/>
+          <a:p>
+            <a:r>
+              <a:rPr lang="en-SG" sz="1200" b="1" dirty="0"/>
+              <a:t>Condition station</a:t>
+            </a:r>
+          </a:p>
+        </p:txBody>
+      </p:sp>
+      <p:cxnSp>
+        <p:nvCxnSpPr>
+          <p:cNvPr id="119" name="Straight Arrow Connector 118">
+            <a:extLst>
+              <a:ext uri="{FF2B5EF4-FFF2-40B4-BE49-F238E27FC236}">
+                <a16:creationId xmlns:a16="http://schemas.microsoft.com/office/drawing/2014/main" id="{EB6D3816-687E-5130-F5BD-88BCCE4228BA}"/>
+              </a:ext>
+            </a:extLst>
+          </p:cNvPr>
+          <p:cNvCxnSpPr>
+            <a:cxnSpLocks/>
+          </p:cNvCxnSpPr>
+          <p:nvPr/>
+        </p:nvCxnSpPr>
+        <p:spPr>
+          <a:xfrm>
+            <a:off x="7430631" y="4888114"/>
+            <a:ext cx="463558" cy="0"/>
+          </a:xfrm>
+          <a:prstGeom prst="straightConnector1">
+            <a:avLst/>
+          </a:prstGeom>
+          <a:ln w="28575">
+            <a:tailEnd type="triangle"/>
+          </a:ln>
+        </p:spPr>
+        <p:style>
+          <a:lnRef idx="1">
+            <a:schemeClr val="accent1"/>
+          </a:lnRef>
+          <a:fillRef idx="0">
+            <a:schemeClr val="accent1"/>
+          </a:fillRef>
+          <a:effectRef idx="0">
+            <a:schemeClr val="accent1"/>
+          </a:effectRef>
+          <a:fontRef idx="minor">
+            <a:schemeClr val="tx1"/>
+          </a:fontRef>
+        </p:style>
+      </p:cxnSp>
+      <p:sp>
+        <p:nvSpPr>
+          <p:cNvPr id="120" name="TextBox 119">
+            <a:extLst>
+              <a:ext uri="{FF2B5EF4-FFF2-40B4-BE49-F238E27FC236}">
+                <a16:creationId xmlns:a16="http://schemas.microsoft.com/office/drawing/2014/main" id="{AC26351B-EA78-3352-DC8A-0591B505F76E}"/>
+              </a:ext>
+            </a:extLst>
+          </p:cNvPr>
+          <p:cNvSpPr txBox="1"/>
+          <p:nvPr/>
+        </p:nvSpPr>
+        <p:spPr>
+          <a:xfrm>
+            <a:off x="7993421" y="4633999"/>
+            <a:ext cx="1111526" cy="461665"/>
+          </a:xfrm>
+          <a:prstGeom prst="rect">
+            <a:avLst/>
+          </a:prstGeom>
+          <a:noFill/>
+        </p:spPr>
+        <p:txBody>
+          <a:bodyPr wrap="square" rtlCol="0">
+            <a:spAutoFit/>
+          </a:bodyPr>
+          <a:lstStyle/>
+          <a:p>
+            <a:r>
+              <a:rPr lang="en-SG" sz="1200" b="1" dirty="0"/>
+              <a:t>File I/O ( load or wite )</a:t>
+            </a:r>
+          </a:p>
+        </p:txBody>
+      </p:sp>
+      <p:cxnSp>
+        <p:nvCxnSpPr>
+          <p:cNvPr id="121" name="Connector: Elbow 120">
+            <a:extLst>
+              <a:ext uri="{FF2B5EF4-FFF2-40B4-BE49-F238E27FC236}">
+                <a16:creationId xmlns:a16="http://schemas.microsoft.com/office/drawing/2014/main" id="{A81459C4-02C0-9874-31F0-C439210DF59C}"/>
+              </a:ext>
+            </a:extLst>
+          </p:cNvPr>
+          <p:cNvCxnSpPr>
+            <a:cxnSpLocks/>
+          </p:cNvCxnSpPr>
+          <p:nvPr/>
+        </p:nvCxnSpPr>
+        <p:spPr>
+          <a:xfrm>
+            <a:off x="7444272" y="5289782"/>
+            <a:ext cx="500898" cy="167427"/>
+          </a:xfrm>
+          <a:prstGeom prst="bentConnector3">
+            <a:avLst>
+              <a:gd name="adj1" fmla="val 50000"/>
+            </a:avLst>
+          </a:prstGeom>
+          <a:ln w="28575">
+            <a:solidFill>
+              <a:schemeClr val="accent1">
+                <a:lumMod val="40000"/>
+                <a:lumOff val="60000"/>
+              </a:schemeClr>
+            </a:solidFill>
+            <a:tailEnd type="triangle"/>
+          </a:ln>
+        </p:spPr>
+        <p:style>
+          <a:lnRef idx="1">
+            <a:schemeClr val="accent1"/>
+          </a:lnRef>
+          <a:fillRef idx="0">
+            <a:schemeClr val="accent1"/>
+          </a:fillRef>
+          <a:effectRef idx="0">
+            <a:schemeClr val="accent1"/>
+          </a:effectRef>
+          <a:fontRef idx="minor">
+            <a:schemeClr val="tx1"/>
+          </a:fontRef>
+        </p:style>
+      </p:cxnSp>
+      <p:sp>
+        <p:nvSpPr>
+          <p:cNvPr id="123" name="TextBox 122">
+            <a:extLst>
+              <a:ext uri="{FF2B5EF4-FFF2-40B4-BE49-F238E27FC236}">
+                <a16:creationId xmlns:a16="http://schemas.microsoft.com/office/drawing/2014/main" id="{EB44510F-508B-EADE-2978-CAEBC699F786}"/>
+              </a:ext>
+            </a:extLst>
+          </p:cNvPr>
+          <p:cNvSpPr txBox="1"/>
+          <p:nvPr/>
+        </p:nvSpPr>
+        <p:spPr>
+          <a:xfrm>
+            <a:off x="7993420" y="5248660"/>
+            <a:ext cx="1333183" cy="276999"/>
+          </a:xfrm>
+          <a:prstGeom prst="rect">
+            <a:avLst/>
+          </a:prstGeom>
+          <a:noFill/>
+        </p:spPr>
+        <p:txBody>
+          <a:bodyPr wrap="square" rtlCol="0">
+            <a:spAutoFit/>
+          </a:bodyPr>
+          <a:lstStyle/>
+          <a:p>
+            <a:r>
+              <a:rPr lang="en-US" sz="1200" b="1" dirty="0"/>
+              <a:t>Internal</a:t>
+            </a:r>
+            <a:r>
+              <a:rPr lang="en-SG" sz="1200" b="1" dirty="0"/>
+              <a:t> data flow </a:t>
+            </a:r>
+          </a:p>
+        </p:txBody>
+      </p:sp>
+      <p:cxnSp>
+        <p:nvCxnSpPr>
+          <p:cNvPr id="124" name="Connector: Elbow 123">
+            <a:extLst>
+              <a:ext uri="{FF2B5EF4-FFF2-40B4-BE49-F238E27FC236}">
+                <a16:creationId xmlns:a16="http://schemas.microsoft.com/office/drawing/2014/main" id="{EECF27B9-BFA0-4240-977C-7C8231C29FEC}"/>
+              </a:ext>
+            </a:extLst>
+          </p:cNvPr>
+          <p:cNvCxnSpPr>
+            <a:cxnSpLocks/>
+          </p:cNvCxnSpPr>
+          <p:nvPr/>
+        </p:nvCxnSpPr>
+        <p:spPr>
+          <a:xfrm flipV="1">
+            <a:off x="7452509" y="5772574"/>
+            <a:ext cx="449024" cy="205213"/>
+          </a:xfrm>
+          <a:prstGeom prst="bentConnector3">
+            <a:avLst>
+              <a:gd name="adj1" fmla="val 50000"/>
+            </a:avLst>
+          </a:prstGeom>
+          <a:ln w="28575">
+            <a:solidFill>
+              <a:srgbClr val="FAB733"/>
+            </a:solidFill>
+            <a:tailEnd type="triangle"/>
+          </a:ln>
+        </p:spPr>
+        <p:style>
+          <a:lnRef idx="1">
+            <a:schemeClr val="accent1"/>
+          </a:lnRef>
+          <a:fillRef idx="0">
+            <a:schemeClr val="accent1"/>
+          </a:fillRef>
+          <a:effectRef idx="0">
+            <a:schemeClr val="accent1"/>
+          </a:effectRef>
+          <a:fontRef idx="minor">
+            <a:schemeClr val="tx1"/>
+          </a:fontRef>
+        </p:style>
+      </p:cxnSp>
+      <p:sp>
+        <p:nvSpPr>
+          <p:cNvPr id="126" name="TextBox 125">
+            <a:extLst>
+              <a:ext uri="{FF2B5EF4-FFF2-40B4-BE49-F238E27FC236}">
+                <a16:creationId xmlns:a16="http://schemas.microsoft.com/office/drawing/2014/main" id="{D6DE9631-1E5C-91B7-1018-23B447319D5D}"/>
+              </a:ext>
+            </a:extLst>
+          </p:cNvPr>
+          <p:cNvSpPr txBox="1"/>
+          <p:nvPr/>
+        </p:nvSpPr>
+        <p:spPr>
+          <a:xfrm>
+            <a:off x="7993420" y="5707393"/>
+            <a:ext cx="1333183" cy="276999"/>
+          </a:xfrm>
+          <a:prstGeom prst="rect">
+            <a:avLst/>
+          </a:prstGeom>
+          <a:noFill/>
+        </p:spPr>
+        <p:txBody>
+          <a:bodyPr wrap="square" rtlCol="0">
+            <a:spAutoFit/>
+          </a:bodyPr>
+          <a:lstStyle/>
+          <a:p>
+            <a:r>
+              <a:rPr lang="en-US" sz="1200" b="1" dirty="0"/>
+              <a:t>User action</a:t>
+            </a:r>
+            <a:endParaRPr lang="en-SG" sz="1200" b="1" dirty="0"/>
+          </a:p>
+        </p:txBody>
+      </p:sp>
+      <p:sp>
+        <p:nvSpPr>
+          <p:cNvPr id="128" name="TextBox 127">
+            <a:extLst>
+              <a:ext uri="{FF2B5EF4-FFF2-40B4-BE49-F238E27FC236}">
+                <a16:creationId xmlns:a16="http://schemas.microsoft.com/office/drawing/2014/main" id="{C90BFD1A-1212-8DE1-933A-268F4DEAFDE5}"/>
+              </a:ext>
+            </a:extLst>
+          </p:cNvPr>
+          <p:cNvSpPr txBox="1"/>
+          <p:nvPr/>
+        </p:nvSpPr>
+        <p:spPr>
+          <a:xfrm>
+            <a:off x="760657" y="346612"/>
+            <a:ext cx="3819524" cy="584775"/>
+          </a:xfrm>
+          <a:prstGeom prst="rect">
+            <a:avLst/>
+          </a:prstGeom>
+          <a:noFill/>
+        </p:spPr>
+        <p:txBody>
+          <a:bodyPr wrap="square" rtlCol="0">
+            <a:spAutoFit/>
+          </a:bodyPr>
+          <a:lstStyle/>
+          <a:p>
+            <a:r>
+              <a:rPr lang="en-SG" sz="1600" b="1" dirty="0">
+                <a:solidFill>
+                  <a:srgbClr val="333333"/>
+                </a:solidFill>
+                <a:effectLst/>
+                <a:ea typeface="DengXian" panose="02010600030101010101" pitchFamily="2" charset="-122"/>
+                <a:cs typeface="Times New Roman" panose="02020603050405020304" pitchFamily="18" charset="0"/>
+              </a:rPr>
+              <a:t>Network PQC Attack Resistance Evaluator Program workflow </a:t>
+            </a:r>
+            <a:endParaRPr lang="en-SG" sz="1600" b="1" dirty="0">
+              <a:effectLst/>
+              <a:ea typeface="DengXian" panose="02010600030101010101" pitchFamily="2" charset="-122"/>
+              <a:cs typeface="Times New Roman" panose="02020603050405020304" pitchFamily="18" charset="0"/>
+            </a:endParaRPr>
+          </a:p>
+        </p:txBody>
+      </p:sp>
+    </p:spTree>
+    <p:extLst>
+      <p:ext uri="{BB962C8B-B14F-4D97-AF65-F5344CB8AC3E}">
+        <p14:creationId xmlns:p14="http://schemas.microsoft.com/office/powerpoint/2010/main" val="3946044501"/>
+      </p:ext>
+    </p:extLst>
+  </p:cSld>
+  <p:clrMapOvr>
+    <a:masterClrMapping/>
+  </p:clrMapOvr>
+</p:sld>
+</file>
+
+<file path=ppt/slides/slide7.xml><?xml version="1.0" encoding="utf-8"?>
+<p:sld xmlns:a="http://schemas.openxmlformats.org/drawingml/2006/main" xmlns:r="http://schemas.openxmlformats.org/officeDocument/2006/relationships" xmlns:p="http://schemas.openxmlformats.org/presentationml/2006/main">
+  <p:cSld>
+    <p:spTree>
+      <p:nvGrpSpPr>
+        <p:cNvPr id="1" name=""/>
+        <p:cNvGrpSpPr/>
+        <p:nvPr/>
+      </p:nvGrpSpPr>
+      <p:grpSpPr>
+        <a:xfrm>
+          <a:off x="0" y="0"/>
+          <a:ext cx="0" cy="0"/>
+          <a:chOff x="0" y="0"/>
+          <a:chExt cx="0" cy="0"/>
+        </a:xfrm>
+      </p:grpSpPr>
+      <p:pic>
+        <p:nvPicPr>
+          <p:cNvPr id="5" name="Picture 4">
+            <a:extLst>
+              <a:ext uri="{FF2B5EF4-FFF2-40B4-BE49-F238E27FC236}">
+                <a16:creationId xmlns:a16="http://schemas.microsoft.com/office/drawing/2014/main" id="{7274A2B7-1D68-6109-CB4A-FDDF17A9E8CD}"/>
+              </a:ext>
+            </a:extLst>
+          </p:cNvPr>
+          <p:cNvPicPr>
+            <a:picLocks noChangeAspect="1"/>
+          </p:cNvPicPr>
+          <p:nvPr/>
+        </p:nvPicPr>
+        <p:blipFill>
+          <a:blip r:embed="rId2"/>
+          <a:stretch>
+            <a:fillRect/>
+          </a:stretch>
+        </p:blipFill>
+        <p:spPr>
+          <a:xfrm>
+            <a:off x="2485223" y="1308942"/>
+            <a:ext cx="5696916" cy="4298055"/>
+          </a:xfrm>
+          <a:prstGeom prst="rect">
+            <a:avLst/>
+          </a:prstGeom>
+        </p:spPr>
+      </p:pic>
+      <p:cxnSp>
+        <p:nvCxnSpPr>
+          <p:cNvPr id="6" name="Straight Arrow Connector 5">
+            <a:extLst>
+              <a:ext uri="{FF2B5EF4-FFF2-40B4-BE49-F238E27FC236}">
+                <a16:creationId xmlns:a16="http://schemas.microsoft.com/office/drawing/2014/main" id="{46973AD8-6695-B096-0851-11E4B170F6A6}"/>
+              </a:ext>
+            </a:extLst>
+          </p:cNvPr>
+          <p:cNvCxnSpPr>
+            <a:cxnSpLocks/>
+          </p:cNvCxnSpPr>
+          <p:nvPr/>
+        </p:nvCxnSpPr>
+        <p:spPr>
+          <a:xfrm>
+            <a:off x="2730435" y="1188720"/>
+            <a:ext cx="0" cy="339511"/>
+          </a:xfrm>
+          <a:prstGeom prst="straightConnector1">
+            <a:avLst/>
+          </a:prstGeom>
+          <a:ln w="28575">
+            <a:solidFill>
+              <a:srgbClr val="FF0D0D"/>
+            </a:solidFill>
+            <a:tailEnd type="triangle"/>
+          </a:ln>
+        </p:spPr>
+        <p:style>
+          <a:lnRef idx="1">
+            <a:schemeClr val="accent1"/>
+          </a:lnRef>
+          <a:fillRef idx="0">
+            <a:schemeClr val="accent1"/>
+          </a:fillRef>
+          <a:effectRef idx="0">
+            <a:schemeClr val="accent1"/>
+          </a:effectRef>
+          <a:fontRef idx="minor">
+            <a:schemeClr val="tx1"/>
+          </a:fontRef>
+        </p:style>
+      </p:cxnSp>
+      <p:sp>
+        <p:nvSpPr>
+          <p:cNvPr id="10" name="TextBox 9">
+            <a:extLst>
+              <a:ext uri="{FF2B5EF4-FFF2-40B4-BE49-F238E27FC236}">
+                <a16:creationId xmlns:a16="http://schemas.microsoft.com/office/drawing/2014/main" id="{02E3AA6A-B56A-AB80-C5EE-AE7AE2495DBC}"/>
+              </a:ext>
+            </a:extLst>
+          </p:cNvPr>
+          <p:cNvSpPr txBox="1"/>
+          <p:nvPr/>
+        </p:nvSpPr>
+        <p:spPr>
+          <a:xfrm>
+            <a:off x="2439374" y="960368"/>
+            <a:ext cx="2350937" cy="456703"/>
+          </a:xfrm>
+          <a:prstGeom prst="rect">
+            <a:avLst/>
+          </a:prstGeom>
+          <a:noFill/>
+          <a:ln w="3175">
+            <a:noFill/>
+          </a:ln>
+        </p:spPr>
+        <p:txBody>
+          <a:bodyPr wrap="square" lIns="36000" tIns="36000" rIns="36000" bIns="36000" rtlCol="0">
+            <a:noAutofit/>
+          </a:bodyPr>
+          <a:lstStyle/>
+          <a:p>
+            <a:r>
+              <a:rPr lang="en-US" sz="1200" b="1" dirty="0"/>
+              <a:t>Source selection drop menu button</a:t>
+            </a:r>
+            <a:endParaRPr lang="en-SG" sz="1200" b="1" dirty="0"/>
+          </a:p>
+        </p:txBody>
+      </p:sp>
+      <p:cxnSp>
+        <p:nvCxnSpPr>
+          <p:cNvPr id="11" name="Straight Arrow Connector 10">
+            <a:extLst>
+              <a:ext uri="{FF2B5EF4-FFF2-40B4-BE49-F238E27FC236}">
+                <a16:creationId xmlns:a16="http://schemas.microsoft.com/office/drawing/2014/main" id="{91264EDA-A337-BD74-4C88-0F5C589AE75F}"/>
+              </a:ext>
+            </a:extLst>
+          </p:cNvPr>
+          <p:cNvCxnSpPr>
+            <a:cxnSpLocks/>
+          </p:cNvCxnSpPr>
+          <p:nvPr/>
+        </p:nvCxnSpPr>
+        <p:spPr>
+          <a:xfrm>
+            <a:off x="5310756" y="1188720"/>
+            <a:ext cx="0" cy="546942"/>
+          </a:xfrm>
+          <a:prstGeom prst="straightConnector1">
+            <a:avLst/>
+          </a:prstGeom>
+          <a:ln w="28575">
+            <a:solidFill>
+              <a:srgbClr val="FF0D0D"/>
+            </a:solidFill>
+            <a:tailEnd type="triangle"/>
+          </a:ln>
+        </p:spPr>
+        <p:style>
+          <a:lnRef idx="1">
+            <a:schemeClr val="accent1"/>
+          </a:lnRef>
+          <a:fillRef idx="0">
+            <a:schemeClr val="accent1"/>
+          </a:fillRef>
+          <a:effectRef idx="0">
+            <a:schemeClr val="accent1"/>
+          </a:effectRef>
+          <a:fontRef idx="minor">
+            <a:schemeClr val="tx1"/>
+          </a:fontRef>
+        </p:style>
+      </p:cxnSp>
+      <p:sp>
+        <p:nvSpPr>
+          <p:cNvPr id="13" name="TextBox 12">
+            <a:extLst>
+              <a:ext uri="{FF2B5EF4-FFF2-40B4-BE49-F238E27FC236}">
+                <a16:creationId xmlns:a16="http://schemas.microsoft.com/office/drawing/2014/main" id="{23C784AD-FDE3-C53B-B7F7-DB3F3690E647}"/>
+              </a:ext>
+            </a:extLst>
+          </p:cNvPr>
+          <p:cNvSpPr txBox="1"/>
+          <p:nvPr/>
+        </p:nvSpPr>
+        <p:spPr>
+          <a:xfrm>
+            <a:off x="5162514" y="960367"/>
+            <a:ext cx="2239177" cy="456703"/>
+          </a:xfrm>
+          <a:prstGeom prst="rect">
+            <a:avLst/>
+          </a:prstGeom>
+          <a:noFill/>
+          <a:ln w="3175">
+            <a:noFill/>
+          </a:ln>
+        </p:spPr>
+        <p:txBody>
+          <a:bodyPr wrap="square" lIns="36000" tIns="36000" rIns="36000" bIns="36000" rtlCol="0">
+            <a:noAutofit/>
+          </a:bodyPr>
+          <a:lstStyle/>
+          <a:p>
+            <a:r>
+              <a:rPr lang="en-US" sz="1200" b="1" dirty="0"/>
+              <a:t>Source detail information </a:t>
+            </a:r>
+            <a:endParaRPr lang="en-SG" sz="1200" b="1" dirty="0"/>
+          </a:p>
+        </p:txBody>
+      </p:sp>
+      <p:cxnSp>
+        <p:nvCxnSpPr>
+          <p:cNvPr id="14" name="Straight Arrow Connector 13">
+            <a:extLst>
+              <a:ext uri="{FF2B5EF4-FFF2-40B4-BE49-F238E27FC236}">
+                <a16:creationId xmlns:a16="http://schemas.microsoft.com/office/drawing/2014/main" id="{0B9333B9-002B-DE42-3E6C-D9EF0DBE5997}"/>
+              </a:ext>
+            </a:extLst>
+          </p:cNvPr>
+          <p:cNvCxnSpPr>
+            <a:cxnSpLocks/>
+          </p:cNvCxnSpPr>
+          <p:nvPr/>
+        </p:nvCxnSpPr>
+        <p:spPr>
+          <a:xfrm flipH="1">
+            <a:off x="7650480" y="1818640"/>
+            <a:ext cx="679901" cy="0"/>
+          </a:xfrm>
+          <a:prstGeom prst="straightConnector1">
+            <a:avLst/>
+          </a:prstGeom>
+          <a:ln w="28575">
+            <a:solidFill>
+              <a:srgbClr val="FF0D0D"/>
+            </a:solidFill>
+            <a:tailEnd type="triangle"/>
+          </a:ln>
+        </p:spPr>
+        <p:style>
+          <a:lnRef idx="1">
+            <a:schemeClr val="accent1"/>
+          </a:lnRef>
+          <a:fillRef idx="0">
+            <a:schemeClr val="accent1"/>
+          </a:fillRef>
+          <a:effectRef idx="0">
+            <a:schemeClr val="accent1"/>
+          </a:effectRef>
+          <a:fontRef idx="minor">
+            <a:schemeClr val="tx1"/>
+          </a:fontRef>
+        </p:style>
+      </p:cxnSp>
+      <p:sp>
+        <p:nvSpPr>
+          <p:cNvPr id="17" name="TextBox 16">
+            <a:extLst>
+              <a:ext uri="{FF2B5EF4-FFF2-40B4-BE49-F238E27FC236}">
+                <a16:creationId xmlns:a16="http://schemas.microsoft.com/office/drawing/2014/main" id="{C4FF34E5-2332-727E-E2A2-A8855F826A34}"/>
+              </a:ext>
+            </a:extLst>
+          </p:cNvPr>
+          <p:cNvSpPr txBox="1"/>
+          <p:nvPr/>
+        </p:nvSpPr>
+        <p:spPr>
+          <a:xfrm>
+            <a:off x="8330381" y="1590288"/>
+            <a:ext cx="1228762" cy="456703"/>
+          </a:xfrm>
+          <a:prstGeom prst="rect">
+            <a:avLst/>
+          </a:prstGeom>
+          <a:noFill/>
+          <a:ln w="3175">
+            <a:noFill/>
+          </a:ln>
+        </p:spPr>
+        <p:txBody>
+          <a:bodyPr wrap="square" lIns="36000" tIns="36000" rIns="36000" bIns="36000" rtlCol="0">
+            <a:noAutofit/>
+          </a:bodyPr>
+          <a:lstStyle/>
+          <a:p>
+            <a:r>
+              <a:rPr lang="en-US" sz="1200" b="1" dirty="0"/>
+              <a:t>Process start button</a:t>
+            </a:r>
+            <a:endParaRPr lang="en-SG" sz="1200" b="1" dirty="0"/>
+          </a:p>
+        </p:txBody>
+      </p:sp>
+      <p:cxnSp>
+        <p:nvCxnSpPr>
+          <p:cNvPr id="18" name="Straight Arrow Connector 17">
+            <a:extLst>
+              <a:ext uri="{FF2B5EF4-FFF2-40B4-BE49-F238E27FC236}">
+                <a16:creationId xmlns:a16="http://schemas.microsoft.com/office/drawing/2014/main" id="{2E825C08-76FC-9C78-29EF-47CC6A36F4CE}"/>
+              </a:ext>
+            </a:extLst>
+          </p:cNvPr>
+          <p:cNvCxnSpPr>
+            <a:cxnSpLocks/>
+          </p:cNvCxnSpPr>
+          <p:nvPr/>
+        </p:nvCxnSpPr>
+        <p:spPr>
+          <a:xfrm flipH="1">
+            <a:off x="7990430" y="2600960"/>
+            <a:ext cx="339951" cy="0"/>
+          </a:xfrm>
+          <a:prstGeom prst="straightConnector1">
+            <a:avLst/>
+          </a:prstGeom>
+          <a:ln w="28575">
+            <a:solidFill>
+              <a:srgbClr val="FF0D0D"/>
+            </a:solidFill>
+            <a:tailEnd type="triangle"/>
+          </a:ln>
+        </p:spPr>
+        <p:style>
+          <a:lnRef idx="1">
+            <a:schemeClr val="accent1"/>
+          </a:lnRef>
+          <a:fillRef idx="0">
+            <a:schemeClr val="accent1"/>
+          </a:fillRef>
+          <a:effectRef idx="0">
+            <a:schemeClr val="accent1"/>
+          </a:effectRef>
+          <a:fontRef idx="minor">
+            <a:schemeClr val="tx1"/>
+          </a:fontRef>
+        </p:style>
+      </p:cxnSp>
+      <p:sp>
+        <p:nvSpPr>
+          <p:cNvPr id="19" name="Rectangle 18">
+            <a:extLst>
+              <a:ext uri="{FF2B5EF4-FFF2-40B4-BE49-F238E27FC236}">
+                <a16:creationId xmlns:a16="http://schemas.microsoft.com/office/drawing/2014/main" id="{1F009D1F-9C9E-CF06-E929-CAB20FF59D80}"/>
+              </a:ext>
+            </a:extLst>
+          </p:cNvPr>
+          <p:cNvSpPr/>
+          <p:nvPr/>
+        </p:nvSpPr>
+        <p:spPr>
+          <a:xfrm>
+            <a:off x="5527040" y="2046991"/>
+            <a:ext cx="2463390" cy="2281166"/>
+          </a:xfrm>
+          <a:prstGeom prst="rect">
+            <a:avLst/>
+          </a:prstGeom>
+          <a:noFill/>
+          <a:ln w="28575">
+            <a:solidFill>
+              <a:srgbClr val="FF4911"/>
+            </a:solidFill>
+            <a:prstDash val="sysDash"/>
+          </a:ln>
+        </p:spPr>
+        <p:style>
+          <a:lnRef idx="2">
+            <a:schemeClr val="accent6"/>
+          </a:lnRef>
+          <a:fillRef idx="1">
+            <a:schemeClr val="lt1"/>
+          </a:fillRef>
+          <a:effectRef idx="0">
+            <a:schemeClr val="accent6"/>
+          </a:effectRef>
+          <a:fontRef idx="minor">
+            <a:schemeClr val="dk1"/>
+          </a:fontRef>
+        </p:style>
+        <p:txBody>
+          <a:bodyPr rtlCol="0" anchor="ctr"/>
+          <a:lstStyle/>
+          <a:p>
+            <a:pPr algn="ctr"/>
+            <a:endParaRPr lang="en-SG"/>
+          </a:p>
+        </p:txBody>
+      </p:sp>
+      <p:sp>
+        <p:nvSpPr>
+          <p:cNvPr id="20" name="TextBox 19">
+            <a:extLst>
+              <a:ext uri="{FF2B5EF4-FFF2-40B4-BE49-F238E27FC236}">
+                <a16:creationId xmlns:a16="http://schemas.microsoft.com/office/drawing/2014/main" id="{55DA9B96-99E4-C09F-F0FC-0D0F4B8AB31A}"/>
+              </a:ext>
+            </a:extLst>
+          </p:cNvPr>
+          <p:cNvSpPr txBox="1"/>
+          <p:nvPr/>
+        </p:nvSpPr>
+        <p:spPr>
+          <a:xfrm>
+            <a:off x="8355047" y="2372608"/>
+            <a:ext cx="1228762" cy="456703"/>
+          </a:xfrm>
+          <a:prstGeom prst="rect">
+            <a:avLst/>
+          </a:prstGeom>
+          <a:noFill/>
+          <a:ln w="3175">
+            <a:noFill/>
+          </a:ln>
+        </p:spPr>
+        <p:txBody>
+          <a:bodyPr wrap="square" lIns="36000" tIns="36000" rIns="36000" bIns="36000" rtlCol="0">
+            <a:noAutofit/>
+          </a:bodyPr>
+          <a:lstStyle/>
+          <a:p>
+            <a:r>
+              <a:rPr lang="en-US" sz="1200" b="1" dirty="0"/>
+              <a:t>Peer to peer</a:t>
+            </a:r>
+          </a:p>
+          <a:p>
+            <a:r>
+              <a:rPr lang="en-US" sz="1200" b="1" dirty="0"/>
+              <a:t>Communication detail display </a:t>
+            </a:r>
+            <a:endParaRPr lang="en-SG" sz="1200" b="1" dirty="0"/>
+          </a:p>
+        </p:txBody>
+      </p:sp>
+      <p:sp>
+        <p:nvSpPr>
+          <p:cNvPr id="21" name="Rectangle 20">
+            <a:extLst>
+              <a:ext uri="{FF2B5EF4-FFF2-40B4-BE49-F238E27FC236}">
+                <a16:creationId xmlns:a16="http://schemas.microsoft.com/office/drawing/2014/main" id="{26989037-132E-FC38-E956-9F1254DDFEB2}"/>
+              </a:ext>
+            </a:extLst>
+          </p:cNvPr>
+          <p:cNvSpPr/>
+          <p:nvPr/>
+        </p:nvSpPr>
+        <p:spPr>
+          <a:xfrm>
+            <a:off x="2510213" y="2031998"/>
+            <a:ext cx="2868586" cy="2468881"/>
+          </a:xfrm>
+          <a:prstGeom prst="rect">
+            <a:avLst/>
+          </a:prstGeom>
+          <a:noFill/>
+          <a:ln w="28575">
+            <a:solidFill>
+              <a:srgbClr val="FF4911"/>
+            </a:solidFill>
+            <a:prstDash val="sysDash"/>
+          </a:ln>
+        </p:spPr>
+        <p:style>
+          <a:lnRef idx="2">
+            <a:schemeClr val="accent6"/>
+          </a:lnRef>
+          <a:fillRef idx="1">
+            <a:schemeClr val="lt1"/>
+          </a:fillRef>
+          <a:effectRef idx="0">
+            <a:schemeClr val="accent6"/>
+          </a:effectRef>
+          <a:fontRef idx="minor">
+            <a:schemeClr val="dk1"/>
+          </a:fontRef>
+        </p:style>
+        <p:txBody>
+          <a:bodyPr rtlCol="0" anchor="ctr"/>
+          <a:lstStyle/>
+          <a:p>
+            <a:pPr algn="ctr"/>
+            <a:endParaRPr lang="en-SG"/>
+          </a:p>
+        </p:txBody>
+      </p:sp>
+      <p:cxnSp>
+        <p:nvCxnSpPr>
+          <p:cNvPr id="22" name="Straight Arrow Connector 21">
+            <a:extLst>
+              <a:ext uri="{FF2B5EF4-FFF2-40B4-BE49-F238E27FC236}">
+                <a16:creationId xmlns:a16="http://schemas.microsoft.com/office/drawing/2014/main" id="{8DE60FEC-2F59-352A-80CC-0106C0A9F143}"/>
+              </a:ext>
+            </a:extLst>
+          </p:cNvPr>
+          <p:cNvCxnSpPr>
+            <a:cxnSpLocks/>
+          </p:cNvCxnSpPr>
+          <p:nvPr/>
+        </p:nvCxnSpPr>
+        <p:spPr>
+          <a:xfrm flipH="1">
+            <a:off x="5378799" y="4500879"/>
+            <a:ext cx="2976248" cy="0"/>
+          </a:xfrm>
+          <a:prstGeom prst="straightConnector1">
+            <a:avLst/>
+          </a:prstGeom>
+          <a:ln w="28575">
+            <a:solidFill>
+              <a:srgbClr val="FF0D0D"/>
+            </a:solidFill>
+            <a:tailEnd type="triangle"/>
+          </a:ln>
+        </p:spPr>
+        <p:style>
+          <a:lnRef idx="1">
+            <a:schemeClr val="accent1"/>
+          </a:lnRef>
+          <a:fillRef idx="0">
+            <a:schemeClr val="accent1"/>
+          </a:fillRef>
+          <a:effectRef idx="0">
+            <a:schemeClr val="accent1"/>
+          </a:effectRef>
+          <a:fontRef idx="minor">
+            <a:schemeClr val="tx1"/>
+          </a:fontRef>
+        </p:style>
+      </p:cxnSp>
+      <p:sp>
+        <p:nvSpPr>
+          <p:cNvPr id="26" name="TextBox 25">
+            <a:extLst>
+              <a:ext uri="{FF2B5EF4-FFF2-40B4-BE49-F238E27FC236}">
+                <a16:creationId xmlns:a16="http://schemas.microsoft.com/office/drawing/2014/main" id="{F69F2121-1BDD-F2E8-C441-983F9474F2EC}"/>
+              </a:ext>
+            </a:extLst>
+          </p:cNvPr>
+          <p:cNvSpPr txBox="1"/>
+          <p:nvPr/>
+        </p:nvSpPr>
+        <p:spPr>
+          <a:xfrm>
+            <a:off x="8355047" y="4028690"/>
+            <a:ext cx="1228762" cy="456703"/>
+          </a:xfrm>
+          <a:prstGeom prst="rect">
+            <a:avLst/>
+          </a:prstGeom>
+          <a:noFill/>
+          <a:ln w="3175">
+            <a:noFill/>
+          </a:ln>
+        </p:spPr>
+        <p:txBody>
+          <a:bodyPr wrap="square" lIns="36000" tIns="36000" rIns="36000" bIns="36000" rtlCol="0">
+            <a:noAutofit/>
+          </a:bodyPr>
+          <a:lstStyle/>
+          <a:p>
+            <a:r>
+              <a:rPr lang="en-US" sz="1200" b="1" dirty="0"/>
+              <a:t>All connection score summary table </a:t>
+            </a:r>
+            <a:endParaRPr lang="en-SG" sz="1200" b="1" dirty="0"/>
+          </a:p>
+        </p:txBody>
+      </p:sp>
+      <p:cxnSp>
+        <p:nvCxnSpPr>
+          <p:cNvPr id="27" name="Straight Arrow Connector 26">
+            <a:extLst>
+              <a:ext uri="{FF2B5EF4-FFF2-40B4-BE49-F238E27FC236}">
+                <a16:creationId xmlns:a16="http://schemas.microsoft.com/office/drawing/2014/main" id="{56DF558A-A3FD-6347-84A4-4AAB75D1A268}"/>
+              </a:ext>
+            </a:extLst>
+          </p:cNvPr>
+          <p:cNvCxnSpPr>
+            <a:cxnSpLocks/>
+          </p:cNvCxnSpPr>
+          <p:nvPr/>
+        </p:nvCxnSpPr>
+        <p:spPr>
+          <a:xfrm flipH="1">
+            <a:off x="7911801" y="5201919"/>
+            <a:ext cx="497208" cy="0"/>
+          </a:xfrm>
+          <a:prstGeom prst="straightConnector1">
+            <a:avLst/>
+          </a:prstGeom>
+          <a:ln w="28575">
+            <a:solidFill>
+              <a:srgbClr val="FF0D0D"/>
+            </a:solidFill>
+            <a:tailEnd type="triangle"/>
+          </a:ln>
+        </p:spPr>
+        <p:style>
+          <a:lnRef idx="1">
+            <a:schemeClr val="accent1"/>
+          </a:lnRef>
+          <a:fillRef idx="0">
+            <a:schemeClr val="accent1"/>
+          </a:fillRef>
+          <a:effectRef idx="0">
+            <a:schemeClr val="accent1"/>
+          </a:effectRef>
+          <a:fontRef idx="minor">
+            <a:schemeClr val="tx1"/>
+          </a:fontRef>
+        </p:style>
+      </p:cxnSp>
+      <p:sp>
+        <p:nvSpPr>
+          <p:cNvPr id="29" name="TextBox 28">
+            <a:extLst>
+              <a:ext uri="{FF2B5EF4-FFF2-40B4-BE49-F238E27FC236}">
+                <a16:creationId xmlns:a16="http://schemas.microsoft.com/office/drawing/2014/main" id="{EEAECEB8-1C6D-ECA3-5648-EE7E1F46897A}"/>
+              </a:ext>
+            </a:extLst>
+          </p:cNvPr>
+          <p:cNvSpPr txBox="1"/>
+          <p:nvPr/>
+        </p:nvSpPr>
+        <p:spPr>
+          <a:xfrm>
+            <a:off x="8478015" y="5039360"/>
+            <a:ext cx="1228762" cy="456703"/>
+          </a:xfrm>
+          <a:prstGeom prst="rect">
+            <a:avLst/>
+          </a:prstGeom>
+          <a:noFill/>
+          <a:ln w="3175">
+            <a:noFill/>
+          </a:ln>
+        </p:spPr>
+        <p:txBody>
+          <a:bodyPr wrap="square" lIns="36000" tIns="36000" rIns="36000" bIns="36000" rtlCol="0">
+            <a:noAutofit/>
+          </a:bodyPr>
+          <a:lstStyle/>
+          <a:p>
+            <a:r>
+              <a:rPr lang="en-US" sz="1200" b="1" dirty="0"/>
+              <a:t>Score example </a:t>
+            </a:r>
+            <a:endParaRPr lang="en-SG" sz="1200" b="1" dirty="0"/>
+          </a:p>
+        </p:txBody>
+      </p:sp>
+    </p:spTree>
+    <p:extLst>
+      <p:ext uri="{BB962C8B-B14F-4D97-AF65-F5344CB8AC3E}">
+        <p14:creationId xmlns:p14="http://schemas.microsoft.com/office/powerpoint/2010/main" val="712238535"/>
       </p:ext>
     </p:extLst>
   </p:cSld>

</xml_diff>